<commit_message>
Updates to Data Compression
Minor edits, Add abstract
</commit_message>
<xml_diff>
--- a/Demystifying-Data-Compression/Data_Compression.pptx
+++ b/Demystifying-Data-Compression/Data_Compression.pptx
@@ -5,7 +5,7 @@
     <p:sldMasterId id="2147483709" r:id="rId1"/>
   </p:sldMasterIdLst>
   <p:notesMasterIdLst>
-    <p:notesMasterId r:id="rId61"/>
+    <p:notesMasterId r:id="rId60"/>
   </p:notesMasterIdLst>
   <p:sldIdLst>
     <p:sldId id="348" r:id="rId2"/>
@@ -16,57 +16,56 @@
     <p:sldId id="256" r:id="rId7"/>
     <p:sldId id="322" r:id="rId8"/>
     <p:sldId id="346" r:id="rId9"/>
-    <p:sldId id="349" r:id="rId10"/>
-    <p:sldId id="347" r:id="rId11"/>
-    <p:sldId id="342" r:id="rId12"/>
-    <p:sldId id="340" r:id="rId13"/>
-    <p:sldId id="341" r:id="rId14"/>
-    <p:sldId id="344" r:id="rId15"/>
-    <p:sldId id="343" r:id="rId16"/>
-    <p:sldId id="261" r:id="rId17"/>
-    <p:sldId id="267" r:id="rId18"/>
-    <p:sldId id="307" r:id="rId19"/>
-    <p:sldId id="326" r:id="rId20"/>
-    <p:sldId id="287" r:id="rId21"/>
-    <p:sldId id="289" r:id="rId22"/>
-    <p:sldId id="290" r:id="rId23"/>
-    <p:sldId id="327" r:id="rId24"/>
-    <p:sldId id="266" r:id="rId25"/>
-    <p:sldId id="328" r:id="rId26"/>
-    <p:sldId id="283" r:id="rId27"/>
-    <p:sldId id="297" r:id="rId28"/>
-    <p:sldId id="338" r:id="rId29"/>
-    <p:sldId id="329" r:id="rId30"/>
-    <p:sldId id="269" r:id="rId31"/>
-    <p:sldId id="268" r:id="rId32"/>
-    <p:sldId id="270" r:id="rId33"/>
-    <p:sldId id="279" r:id="rId34"/>
-    <p:sldId id="330" r:id="rId35"/>
-    <p:sldId id="284" r:id="rId36"/>
-    <p:sldId id="271" r:id="rId37"/>
-    <p:sldId id="285" r:id="rId38"/>
-    <p:sldId id="272" r:id="rId39"/>
-    <p:sldId id="273" r:id="rId40"/>
-    <p:sldId id="286" r:id="rId41"/>
-    <p:sldId id="313" r:id="rId42"/>
-    <p:sldId id="309" r:id="rId43"/>
-    <p:sldId id="311" r:id="rId44"/>
-    <p:sldId id="310" r:id="rId45"/>
-    <p:sldId id="312" r:id="rId46"/>
-    <p:sldId id="319" r:id="rId47"/>
-    <p:sldId id="314" r:id="rId48"/>
-    <p:sldId id="316" r:id="rId49"/>
-    <p:sldId id="317" r:id="rId50"/>
-    <p:sldId id="318" r:id="rId51"/>
-    <p:sldId id="320" r:id="rId52"/>
-    <p:sldId id="331" r:id="rId53"/>
-    <p:sldId id="274" r:id="rId54"/>
-    <p:sldId id="298" r:id="rId55"/>
-    <p:sldId id="277" r:id="rId56"/>
-    <p:sldId id="334" r:id="rId57"/>
-    <p:sldId id="321" r:id="rId58"/>
-    <p:sldId id="299" r:id="rId59"/>
-    <p:sldId id="332" r:id="rId60"/>
+    <p:sldId id="347" r:id="rId10"/>
+    <p:sldId id="342" r:id="rId11"/>
+    <p:sldId id="340" r:id="rId12"/>
+    <p:sldId id="341" r:id="rId13"/>
+    <p:sldId id="344" r:id="rId14"/>
+    <p:sldId id="343" r:id="rId15"/>
+    <p:sldId id="261" r:id="rId16"/>
+    <p:sldId id="267" r:id="rId17"/>
+    <p:sldId id="307" r:id="rId18"/>
+    <p:sldId id="326" r:id="rId19"/>
+    <p:sldId id="287" r:id="rId20"/>
+    <p:sldId id="289" r:id="rId21"/>
+    <p:sldId id="290" r:id="rId22"/>
+    <p:sldId id="327" r:id="rId23"/>
+    <p:sldId id="266" r:id="rId24"/>
+    <p:sldId id="328" r:id="rId25"/>
+    <p:sldId id="283" r:id="rId26"/>
+    <p:sldId id="297" r:id="rId27"/>
+    <p:sldId id="338" r:id="rId28"/>
+    <p:sldId id="329" r:id="rId29"/>
+    <p:sldId id="269" r:id="rId30"/>
+    <p:sldId id="268" r:id="rId31"/>
+    <p:sldId id="270" r:id="rId32"/>
+    <p:sldId id="279" r:id="rId33"/>
+    <p:sldId id="330" r:id="rId34"/>
+    <p:sldId id="284" r:id="rId35"/>
+    <p:sldId id="271" r:id="rId36"/>
+    <p:sldId id="285" r:id="rId37"/>
+    <p:sldId id="272" r:id="rId38"/>
+    <p:sldId id="273" r:id="rId39"/>
+    <p:sldId id="286" r:id="rId40"/>
+    <p:sldId id="313" r:id="rId41"/>
+    <p:sldId id="309" r:id="rId42"/>
+    <p:sldId id="311" r:id="rId43"/>
+    <p:sldId id="310" r:id="rId44"/>
+    <p:sldId id="312" r:id="rId45"/>
+    <p:sldId id="319" r:id="rId46"/>
+    <p:sldId id="314" r:id="rId47"/>
+    <p:sldId id="316" r:id="rId48"/>
+    <p:sldId id="317" r:id="rId49"/>
+    <p:sldId id="318" r:id="rId50"/>
+    <p:sldId id="320" r:id="rId51"/>
+    <p:sldId id="331" r:id="rId52"/>
+    <p:sldId id="274" r:id="rId53"/>
+    <p:sldId id="298" r:id="rId54"/>
+    <p:sldId id="277" r:id="rId55"/>
+    <p:sldId id="334" r:id="rId56"/>
+    <p:sldId id="321" r:id="rId57"/>
+    <p:sldId id="299" r:id="rId58"/>
+    <p:sldId id="332" r:id="rId59"/>
   </p:sldIdLst>
   <p:sldSz cx="12192000" cy="6858000"/>
   <p:notesSz cx="6858000" cy="9144000"/>
@@ -173,8 +172,39 @@
 </p:presentation>
 </file>
 
-<file path=ppt/revisionInfo.xml><?xml version="1.0" encoding="utf-8"?>
-<p1510:revInfo xmlns:a="http://schemas.openxmlformats.org/drawingml/2006/main" xmlns:r="http://schemas.openxmlformats.org/officeDocument/2006/relationships" xmlns:p1510="http://schemas.microsoft.com/office/powerpoint/2015/10/main"/>
+<file path=ppt/changesInfos/changesInfo1.xml><?xml version="1.0" encoding="utf-8"?>
+<pc:chgInfo xmlns:a="http://schemas.openxmlformats.org/drawingml/2006/main" xmlns:r="http://schemas.openxmlformats.org/officeDocument/2006/relationships" xmlns:ac="http://schemas.microsoft.com/office/drawing/2013/main/command" xmlns:pc="http://schemas.microsoft.com/office/powerpoint/2013/main/command">
+  <pc:docChgLst>
+    <pc:chgData name="Andy Mallon" userId="0dfd7ab5-17aa-4ac6-b039-e05176edc781" providerId="ADAL" clId="{FEE235FE-B614-4F1C-8C8E-DF9060EA5C02}"/>
+    <pc:docChg chg="delSld modSld">
+      <pc:chgData name="Andy Mallon" userId="0dfd7ab5-17aa-4ac6-b039-e05176edc781" providerId="ADAL" clId="{FEE235FE-B614-4F1C-8C8E-DF9060EA5C02}" dt="2018-01-31T23:00:56.252" v="2"/>
+      <pc:docMkLst>
+        <pc:docMk/>
+      </pc:docMkLst>
+      <pc:sldChg chg="modTransition">
+        <pc:chgData name="Andy Mallon" userId="0dfd7ab5-17aa-4ac6-b039-e05176edc781" providerId="ADAL" clId="{FEE235FE-B614-4F1C-8C8E-DF9060EA5C02}" dt="2018-01-31T23:00:56.252" v="2"/>
+        <pc:sldMkLst>
+          <pc:docMk/>
+          <pc:sldMk cId="744002627" sldId="343"/>
+        </pc:sldMkLst>
+      </pc:sldChg>
+      <pc:sldChg chg="modTransition">
+        <pc:chgData name="Andy Mallon" userId="0dfd7ab5-17aa-4ac6-b039-e05176edc781" providerId="ADAL" clId="{FEE235FE-B614-4F1C-8C8E-DF9060EA5C02}" dt="2018-01-31T23:00:50.681" v="1"/>
+        <pc:sldMkLst>
+          <pc:docMk/>
+          <pc:sldMk cId="40638036" sldId="344"/>
+        </pc:sldMkLst>
+      </pc:sldChg>
+      <pc:sldChg chg="del">
+        <pc:chgData name="Andy Mallon" userId="0dfd7ab5-17aa-4ac6-b039-e05176edc781" providerId="ADAL" clId="{FEE235FE-B614-4F1C-8C8E-DF9060EA5C02}" dt="2018-01-31T23:00:40.253" v="0" actId="2696"/>
+        <pc:sldMkLst>
+          <pc:docMk/>
+          <pc:sldMk cId="1514363372" sldId="349"/>
+        </pc:sldMkLst>
+      </pc:sldChg>
+    </pc:docChg>
+  </pc:docChgLst>
+</pc:chgInfo>
 </file>
 
 <file path=ppt/notesMasters/notesMaster1.xml><?xml version="1.0" encoding="utf-8"?>
@@ -259,7 +289,7 @@
           <a:p>
             <a:fld id="{29813C8A-11F9-4768-B07B-C8C4017109A6}" type="datetimeFigureOut">
               <a:rPr lang="en-US" smtClean="0"/>
-              <a:t>11/27/2017</a:t>
+              <a:t>1/31/2018</a:t>
             </a:fld>
             <a:endParaRPr lang="en-US"/>
           </a:p>
@@ -704,7 +734,7 @@
           <a:p>
             <a:fld id="{C896673D-A7D2-47E4-9E64-948C4CAFD549}" type="slidenum">
               <a:rPr lang="en-US" smtClean="0"/>
-              <a:t>21</a:t>
+              <a:t>20</a:t>
             </a:fld>
             <a:endParaRPr lang="en-US"/>
           </a:p>
@@ -803,7 +833,7 @@
           <a:p>
             <a:fld id="{C896673D-A7D2-47E4-9E64-948C4CAFD549}" type="slidenum">
               <a:rPr lang="en-US" smtClean="0"/>
-              <a:t>22</a:t>
+              <a:t>21</a:t>
             </a:fld>
             <a:endParaRPr lang="en-US"/>
           </a:p>
@@ -913,7 +943,7 @@
           <a:p>
             <a:fld id="{C896673D-A7D2-47E4-9E64-948C4CAFD549}" type="slidenum">
               <a:rPr lang="en-US" smtClean="0"/>
-              <a:t>24</a:t>
+              <a:t>23</a:t>
             </a:fld>
             <a:endParaRPr lang="en-US"/>
           </a:p>
@@ -1005,7 +1035,7 @@
           <a:p>
             <a:fld id="{C896673D-A7D2-47E4-9E64-948C4CAFD549}" type="slidenum">
               <a:rPr lang="en-US" smtClean="0"/>
-              <a:t>26</a:t>
+              <a:t>25</a:t>
             </a:fld>
             <a:endParaRPr lang="en-US"/>
           </a:p>
@@ -1114,7 +1144,7 @@
           <a:p>
             <a:fld id="{C896673D-A7D2-47E4-9E64-948C4CAFD549}" type="slidenum">
               <a:rPr lang="en-US" smtClean="0"/>
-              <a:t>30</a:t>
+              <a:t>29</a:t>
             </a:fld>
             <a:endParaRPr lang="en-US"/>
           </a:p>
@@ -1210,7 +1240,7 @@
           <a:p>
             <a:fld id="{C896673D-A7D2-47E4-9E64-948C4CAFD549}" type="slidenum">
               <a:rPr lang="en-US" smtClean="0"/>
-              <a:t>31</a:t>
+              <a:t>30</a:t>
             </a:fld>
             <a:endParaRPr lang="en-US"/>
           </a:p>
@@ -1309,7 +1339,7 @@
           <a:p>
             <a:fld id="{C896673D-A7D2-47E4-9E64-948C4CAFD549}" type="slidenum">
               <a:rPr lang="en-US" smtClean="0"/>
-              <a:t>32</a:t>
+              <a:t>31</a:t>
             </a:fld>
             <a:endParaRPr lang="en-US"/>
           </a:p>
@@ -1396,7 +1426,7 @@
           <a:p>
             <a:fld id="{C896673D-A7D2-47E4-9E64-948C4CAFD549}" type="slidenum">
               <a:rPr lang="en-US" smtClean="0"/>
-              <a:t>33</a:t>
+              <a:t>32</a:t>
             </a:fld>
             <a:endParaRPr lang="en-US"/>
           </a:p>
@@ -1488,7 +1518,7 @@
           <a:p>
             <a:fld id="{C896673D-A7D2-47E4-9E64-948C4CAFD549}" type="slidenum">
               <a:rPr lang="en-US" smtClean="0"/>
-              <a:t>35</a:t>
+              <a:t>34</a:t>
             </a:fld>
             <a:endParaRPr lang="en-US"/>
           </a:p>
@@ -1580,7 +1610,7 @@
           <a:p>
             <a:fld id="{C896673D-A7D2-47E4-9E64-948C4CAFD549}" type="slidenum">
               <a:rPr lang="en-US" smtClean="0"/>
-              <a:t>36</a:t>
+              <a:t>35</a:t>
             </a:fld>
             <a:endParaRPr lang="en-US"/>
           </a:p>
@@ -1775,7 +1805,7 @@
           <a:p>
             <a:fld id="{C896673D-A7D2-47E4-9E64-948C4CAFD549}" type="slidenum">
               <a:rPr lang="en-US" smtClean="0"/>
-              <a:t>37</a:t>
+              <a:t>36</a:t>
             </a:fld>
             <a:endParaRPr lang="en-US"/>
           </a:p>
@@ -1863,7 +1893,7 @@
           <a:p>
             <a:fld id="{C896673D-A7D2-47E4-9E64-948C4CAFD549}" type="slidenum">
               <a:rPr lang="en-US" smtClean="0"/>
-              <a:t>38</a:t>
+              <a:t>37</a:t>
             </a:fld>
             <a:endParaRPr lang="en-US"/>
           </a:p>
@@ -1964,7 +1994,7 @@
           <a:p>
             <a:fld id="{C896673D-A7D2-47E4-9E64-948C4CAFD549}" type="slidenum">
               <a:rPr lang="en-US" smtClean="0"/>
-              <a:t>40</a:t>
+              <a:t>39</a:t>
             </a:fld>
             <a:endParaRPr lang="en-US"/>
           </a:p>
@@ -2056,7 +2086,7 @@
           <a:p>
             <a:fld id="{C896673D-A7D2-47E4-9E64-948C4CAFD549}" type="slidenum">
               <a:rPr lang="en-US" smtClean="0"/>
-              <a:t>41</a:t>
+              <a:t>40</a:t>
             </a:fld>
             <a:endParaRPr lang="en-US"/>
           </a:p>
@@ -2148,7 +2178,7 @@
           <a:p>
             <a:fld id="{C896673D-A7D2-47E4-9E64-948C4CAFD549}" type="slidenum">
               <a:rPr lang="en-US" smtClean="0"/>
-              <a:t>42</a:t>
+              <a:t>41</a:t>
             </a:fld>
             <a:endParaRPr lang="en-US" dirty="0"/>
           </a:p>
@@ -2232,7 +2262,7 @@
           <a:p>
             <a:fld id="{C896673D-A7D2-47E4-9E64-948C4CAFD549}" type="slidenum">
               <a:rPr lang="en-US" smtClean="0"/>
-              <a:t>45</a:t>
+              <a:t>44</a:t>
             </a:fld>
             <a:endParaRPr lang="en-US" dirty="0"/>
           </a:p>
@@ -2316,7 +2346,7 @@
           <a:p>
             <a:fld id="{C896673D-A7D2-47E4-9E64-948C4CAFD549}" type="slidenum">
               <a:rPr lang="en-US" smtClean="0"/>
-              <a:t>46</a:t>
+              <a:t>45</a:t>
             </a:fld>
             <a:endParaRPr lang="en-US" dirty="0"/>
           </a:p>
@@ -2408,7 +2438,7 @@
           <a:p>
             <a:fld id="{C896673D-A7D2-47E4-9E64-948C4CAFD549}" type="slidenum">
               <a:rPr lang="en-US" smtClean="0"/>
-              <a:t>50</a:t>
+              <a:t>49</a:t>
             </a:fld>
             <a:endParaRPr lang="en-US" dirty="0"/>
           </a:p>
@@ -2500,7 +2530,7 @@
           <a:p>
             <a:fld id="{C896673D-A7D2-47E4-9E64-948C4CAFD549}" type="slidenum">
               <a:rPr lang="en-US" smtClean="0"/>
-              <a:t>51</a:t>
+              <a:t>50</a:t>
             </a:fld>
             <a:endParaRPr lang="en-US" dirty="0"/>
           </a:p>
@@ -2760,7 +2790,7 @@
           <a:p>
             <a:fld id="{C896673D-A7D2-47E4-9E64-948C4CAFD549}" type="slidenum">
               <a:rPr lang="en-US" smtClean="0"/>
-              <a:t>11</a:t>
+              <a:t>10</a:t>
             </a:fld>
             <a:endParaRPr lang="en-US"/>
           </a:p>
@@ -2851,7 +2881,7 @@
           <a:p>
             <a:fld id="{C896673D-A7D2-47E4-9E64-948C4CAFD549}" type="slidenum">
               <a:rPr lang="en-US" smtClean="0"/>
-              <a:t>12</a:t>
+              <a:t>11</a:t>
             </a:fld>
             <a:endParaRPr lang="en-US"/>
           </a:p>
@@ -2942,7 +2972,7 @@
           <a:p>
             <a:fld id="{C896673D-A7D2-47E4-9E64-948C4CAFD549}" type="slidenum">
               <a:rPr lang="en-US" smtClean="0"/>
-              <a:t>13</a:t>
+              <a:t>12</a:t>
             </a:fld>
             <a:endParaRPr lang="en-US"/>
           </a:p>
@@ -3026,7 +3056,7 @@
           <a:p>
             <a:fld id="{C896673D-A7D2-47E4-9E64-948C4CAFD549}" type="slidenum">
               <a:rPr lang="en-US" smtClean="0"/>
-              <a:t>14</a:t>
+              <a:t>13</a:t>
             </a:fld>
             <a:endParaRPr lang="en-US"/>
           </a:p>
@@ -3113,7 +3143,7 @@
           <a:p>
             <a:fld id="{C896673D-A7D2-47E4-9E64-948C4CAFD549}" type="slidenum">
               <a:rPr lang="en-US" smtClean="0"/>
-              <a:t>17</a:t>
+              <a:t>16</a:t>
             </a:fld>
             <a:endParaRPr lang="en-US"/>
           </a:p>
@@ -3396,7 +3426,7 @@
             <a:fld id="{B61BEF0D-F0BB-DE4B-95CE-6DB70DBA9567}" type="datetimeFigureOut">
               <a:rPr lang="en-US" smtClean="0"/>
               <a:pPr/>
-              <a:t>11/27/2017</a:t>
+              <a:t>1/31/2018</a:t>
             </a:fld>
             <a:endParaRPr lang="en-US" dirty="0"/>
           </a:p>
@@ -3821,7 +3851,7 @@
             <a:fld id="{B61BEF0D-F0BB-DE4B-95CE-6DB70DBA9567}" type="datetimeFigureOut">
               <a:rPr lang="en-US" smtClean="0"/>
               <a:pPr/>
-              <a:t>11/27/2017</a:t>
+              <a:t>1/31/2018</a:t>
             </a:fld>
             <a:endParaRPr lang="en-US" dirty="0"/>
           </a:p>
@@ -7635,126 +7665,6 @@
 </file>
 
 <file path=ppt/slides/slide10.xml><?xml version="1.0" encoding="utf-8"?>
-<p:sld xmlns:a="http://schemas.openxmlformats.org/drawingml/2006/main" xmlns:r="http://schemas.openxmlformats.org/officeDocument/2006/relationships" xmlns:p="http://schemas.openxmlformats.org/presentationml/2006/main">
-  <p:cSld>
-    <p:spTree>
-      <p:nvGrpSpPr>
-        <p:cNvPr id="1" name=""/>
-        <p:cNvGrpSpPr/>
-        <p:nvPr/>
-      </p:nvGrpSpPr>
-      <p:grpSpPr>
-        <a:xfrm>
-          <a:off x="0" y="0"/>
-          <a:ext cx="0" cy="0"/>
-          <a:chOff x="0" y="0"/>
-          <a:chExt cx="0" cy="0"/>
-        </a:xfrm>
-      </p:grpSpPr>
-      <p:pic>
-        <p:nvPicPr>
-          <p:cNvPr id="4" name="Picture 3">
-            <a:extLst>
-              <a:ext uri="{FF2B5EF4-FFF2-40B4-BE49-F238E27FC236}">
-                <a16:creationId xmlns:a16="http://schemas.microsoft.com/office/drawing/2014/main" id="{C863BE91-5FF5-441B-A87E-292D53ED2726}"/>
-              </a:ext>
-            </a:extLst>
-          </p:cNvPr>
-          <p:cNvPicPr>
-            <a:picLocks noChangeAspect="1"/>
-          </p:cNvPicPr>
-          <p:nvPr/>
-        </p:nvPicPr>
-        <p:blipFill>
-          <a:blip r:embed="rId2"/>
-          <a:stretch>
-            <a:fillRect/>
-          </a:stretch>
-        </p:blipFill>
-        <p:spPr>
-          <a:xfrm>
-            <a:off x="8627570" y="1804811"/>
-            <a:ext cx="3476625" cy="3524250"/>
-          </a:xfrm>
-          <a:prstGeom prst="rect">
-            <a:avLst/>
-          </a:prstGeom>
-        </p:spPr>
-      </p:pic>
-      <p:pic>
-        <p:nvPicPr>
-          <p:cNvPr id="9" name="Picture 8">
-            <a:extLst>
-              <a:ext uri="{FF2B5EF4-FFF2-40B4-BE49-F238E27FC236}">
-                <a16:creationId xmlns:a16="http://schemas.microsoft.com/office/drawing/2014/main" id="{242BD2B6-E894-43EA-A29E-AA7158A6440C}"/>
-              </a:ext>
-            </a:extLst>
-          </p:cNvPr>
-          <p:cNvPicPr>
-            <a:picLocks noChangeAspect="1"/>
-          </p:cNvPicPr>
-          <p:nvPr/>
-        </p:nvPicPr>
-        <p:blipFill>
-          <a:blip r:embed="rId3"/>
-          <a:stretch>
-            <a:fillRect/>
-          </a:stretch>
-        </p:blipFill>
-        <p:spPr>
-          <a:xfrm>
-            <a:off x="1167424" y="3071636"/>
-            <a:ext cx="5715000" cy="990600"/>
-          </a:xfrm>
-          <a:prstGeom prst="rect">
-            <a:avLst/>
-          </a:prstGeom>
-        </p:spPr>
-      </p:pic>
-      <p:sp>
-        <p:nvSpPr>
-          <p:cNvPr id="10" name="Title 9">
-            <a:extLst>
-              <a:ext uri="{FF2B5EF4-FFF2-40B4-BE49-F238E27FC236}">
-                <a16:creationId xmlns:a16="http://schemas.microsoft.com/office/drawing/2014/main" id="{DCA076EB-0851-4A9F-BE5F-6E3AD6EE62A3}"/>
-              </a:ext>
-            </a:extLst>
-          </p:cNvPr>
-          <p:cNvSpPr>
-            <a:spLocks noGrp="1"/>
-          </p:cNvSpPr>
-          <p:nvPr>
-            <p:ph type="title"/>
-          </p:nvPr>
-        </p:nvSpPr>
-        <p:spPr/>
-        <p:txBody>
-          <a:bodyPr>
-            <a:normAutofit/>
-          </a:bodyPr>
-          <a:lstStyle/>
-          <a:p>
-            <a:r>
-              <a:rPr lang="en-US" dirty="0"/>
-              <a:t>Community Ambassador</a:t>
-            </a:r>
-          </a:p>
-        </p:txBody>
-      </p:sp>
-    </p:spTree>
-    <p:extLst>
-      <p:ext uri="{BB962C8B-B14F-4D97-AF65-F5344CB8AC3E}">
-        <p14:creationId xmlns:p14="http://schemas.microsoft.com/office/powerpoint/2010/main" val="3650232302"/>
-      </p:ext>
-    </p:extLst>
-  </p:cSld>
-  <p:clrMapOvr>
-    <a:masterClrMapping/>
-  </p:clrMapOvr>
-</p:sld>
-</file>
-
-<file path=ppt/slides/slide11.xml><?xml version="1.0" encoding="utf-8"?>
 <p:sld xmlns:a="http://schemas.openxmlformats.org/drawingml/2006/main" xmlns:r="http://schemas.openxmlformats.org/officeDocument/2006/relationships" xmlns:p="http://schemas.openxmlformats.org/presentationml/2006/main">
   <p:cSld>
     <p:spTree>
@@ -8566,7 +8476,7 @@
 </p:sld>
 </file>
 
-<file path=ppt/slides/slide12.xml><?xml version="1.0" encoding="utf-8"?>
+<file path=ppt/slides/slide11.xml><?xml version="1.0" encoding="utf-8"?>
 <p:sld xmlns:a="http://schemas.openxmlformats.org/drawingml/2006/main" xmlns:r="http://schemas.openxmlformats.org/officeDocument/2006/relationships" xmlns:p="http://schemas.openxmlformats.org/presentationml/2006/main" show="0">
   <p:cSld>
     <p:spTree>
@@ -8839,7 +8749,7 @@
 </p:sld>
 </file>
 
-<file path=ppt/slides/slide13.xml><?xml version="1.0" encoding="utf-8"?>
+<file path=ppt/slides/slide12.xml><?xml version="1.0" encoding="utf-8"?>
 <p:sld xmlns:a="http://schemas.openxmlformats.org/drawingml/2006/main" xmlns:r="http://schemas.openxmlformats.org/officeDocument/2006/relationships" xmlns:p="http://schemas.openxmlformats.org/presentationml/2006/main" show="0">
   <p:cSld>
     <p:spTree>
@@ -9003,8 +8913,8 @@
 </p:sld>
 </file>
 
-<file path=ppt/slides/slide14.xml><?xml version="1.0" encoding="utf-8"?>
-<p:sld xmlns:a="http://schemas.openxmlformats.org/drawingml/2006/main" xmlns:r="http://schemas.openxmlformats.org/officeDocument/2006/relationships" xmlns:p="http://schemas.openxmlformats.org/presentationml/2006/main">
+<file path=ppt/slides/slide13.xml><?xml version="1.0" encoding="utf-8"?>
+<p:sld xmlns:a="http://schemas.openxmlformats.org/drawingml/2006/main" xmlns:r="http://schemas.openxmlformats.org/officeDocument/2006/relationships" xmlns:p="http://schemas.openxmlformats.org/presentationml/2006/main" show="0">
   <p:cSld>
     <p:spTree>
       <p:nvGrpSpPr>
@@ -9141,8 +9051,8 @@
 </p:sld>
 </file>
 
-<file path=ppt/slides/slide15.xml><?xml version="1.0" encoding="utf-8"?>
-<p:sld xmlns:a="http://schemas.openxmlformats.org/drawingml/2006/main" xmlns:r="http://schemas.openxmlformats.org/officeDocument/2006/relationships" xmlns:p="http://schemas.openxmlformats.org/presentationml/2006/main">
+<file path=ppt/slides/slide14.xml><?xml version="1.0" encoding="utf-8"?>
+<p:sld xmlns:a="http://schemas.openxmlformats.org/drawingml/2006/main" xmlns:r="http://schemas.openxmlformats.org/officeDocument/2006/relationships" xmlns:p="http://schemas.openxmlformats.org/presentationml/2006/main" show="0">
   <p:cSld>
     <p:spTree>
       <p:nvGrpSpPr>
@@ -9261,7 +9171,7 @@
 </p:sld>
 </file>
 
-<file path=ppt/slides/slide16.xml><?xml version="1.0" encoding="utf-8"?>
+<file path=ppt/slides/slide15.xml><?xml version="1.0" encoding="utf-8"?>
 <p:sld xmlns:a="http://schemas.openxmlformats.org/drawingml/2006/main" xmlns:r="http://schemas.openxmlformats.org/officeDocument/2006/relationships" xmlns:p="http://schemas.openxmlformats.org/presentationml/2006/main">
   <p:cSld>
     <p:spTree>
@@ -9371,7 +9281,7 @@
 </p:sld>
 </file>
 
-<file path=ppt/slides/slide17.xml><?xml version="1.0" encoding="utf-8"?>
+<file path=ppt/slides/slide16.xml><?xml version="1.0" encoding="utf-8"?>
 <p:sld xmlns:a="http://schemas.openxmlformats.org/drawingml/2006/main" xmlns:r="http://schemas.openxmlformats.org/officeDocument/2006/relationships" xmlns:p="http://schemas.openxmlformats.org/presentationml/2006/main">
   <p:cSld>
     <p:spTree>
@@ -9574,7 +9484,7 @@
 </p:sld>
 </file>
 
-<file path=ppt/slides/slide18.xml><?xml version="1.0" encoding="utf-8"?>
+<file path=ppt/slides/slide17.xml><?xml version="1.0" encoding="utf-8"?>
 <p:sld xmlns:a="http://schemas.openxmlformats.org/drawingml/2006/main" xmlns:r="http://schemas.openxmlformats.org/officeDocument/2006/relationships" xmlns:p="http://schemas.openxmlformats.org/presentationml/2006/main">
   <p:cSld>
     <p:spTree>
@@ -9885,7 +9795,7 @@
 </p:sld>
 </file>
 
-<file path=ppt/slides/slide19.xml><?xml version="1.0" encoding="utf-8"?>
+<file path=ppt/slides/slide18.xml><?xml version="1.0" encoding="utf-8"?>
 <p:sld xmlns:a="http://schemas.openxmlformats.org/drawingml/2006/main" xmlns:r="http://schemas.openxmlformats.org/officeDocument/2006/relationships" xmlns:p="http://schemas.openxmlformats.org/presentationml/2006/main">
   <p:cSld>
     <p:spTree>
@@ -10001,6 +9911,132 @@
     <p:extLst>
       <p:ext uri="{BB962C8B-B14F-4D97-AF65-F5344CB8AC3E}">
         <p14:creationId xmlns:p14="http://schemas.microsoft.com/office/powerpoint/2010/main" val="107025867"/>
+      </p:ext>
+    </p:extLst>
+  </p:cSld>
+  <p:clrMapOvr>
+    <a:masterClrMapping/>
+  </p:clrMapOvr>
+</p:sld>
+</file>
+
+<file path=ppt/slides/slide19.xml><?xml version="1.0" encoding="utf-8"?>
+<p:sld xmlns:a="http://schemas.openxmlformats.org/drawingml/2006/main" xmlns:r="http://schemas.openxmlformats.org/officeDocument/2006/relationships" xmlns:p="http://schemas.openxmlformats.org/presentationml/2006/main">
+  <p:cSld>
+    <p:spTree>
+      <p:nvGrpSpPr>
+        <p:cNvPr id="1" name=""/>
+        <p:cNvGrpSpPr/>
+        <p:nvPr/>
+      </p:nvGrpSpPr>
+      <p:grpSpPr>
+        <a:xfrm>
+          <a:off x="0" y="0"/>
+          <a:ext cx="0" cy="0"/>
+          <a:chOff x="0" y="0"/>
+          <a:chExt cx="0" cy="0"/>
+        </a:xfrm>
+      </p:grpSpPr>
+      <p:sp>
+        <p:nvSpPr>
+          <p:cNvPr id="2" name="Title 1"/>
+          <p:cNvSpPr>
+            <a:spLocks noGrp="1"/>
+          </p:cNvSpPr>
+          <p:nvPr>
+            <p:ph type="title"/>
+          </p:nvPr>
+        </p:nvSpPr>
+        <p:spPr/>
+        <p:txBody>
+          <a:bodyPr>
+            <a:normAutofit/>
+          </a:bodyPr>
+          <a:lstStyle/>
+          <a:p>
+            <a:r>
+              <a:rPr lang="en-US" dirty="0"/>
+              <a:t>A quick review (or introduction)</a:t>
+            </a:r>
+          </a:p>
+        </p:txBody>
+      </p:sp>
+      <p:sp>
+        <p:nvSpPr>
+          <p:cNvPr id="3" name="Content Placeholder 2"/>
+          <p:cNvSpPr>
+            <a:spLocks noGrp="1"/>
+          </p:cNvSpPr>
+          <p:nvPr>
+            <p:ph idx="1"/>
+          </p:nvPr>
+        </p:nvSpPr>
+        <p:spPr/>
+        <p:txBody>
+          <a:bodyPr>
+            <a:normAutofit/>
+          </a:bodyPr>
+          <a:lstStyle/>
+          <a:p>
+            <a:r>
+              <a:rPr lang="en-US" sz="2400" dirty="0"/>
+              <a:t>All data is stored on pages</a:t>
+            </a:r>
+          </a:p>
+          <a:p>
+            <a:r>
+              <a:rPr lang="en-US" sz="2400" dirty="0"/>
+              <a:t>Pages are combined into different structures</a:t>
+            </a:r>
+          </a:p>
+          <a:p>
+            <a:endParaRPr lang="en-US" sz="2400" dirty="0"/>
+          </a:p>
+          <a:p>
+            <a:r>
+              <a:rPr lang="en-US" sz="2400" dirty="0"/>
+              <a:t>B+ Trees</a:t>
+            </a:r>
+            <a:endParaRPr lang="en-US" sz="2000" dirty="0"/>
+          </a:p>
+          <a:p>
+            <a:pPr lvl="1"/>
+            <a:r>
+              <a:rPr lang="en-US" sz="2000" dirty="0"/>
+              <a:t>Clustered indexes</a:t>
+            </a:r>
+          </a:p>
+          <a:p>
+            <a:pPr lvl="1"/>
+            <a:r>
+              <a:rPr lang="en-US" sz="2000" dirty="0" err="1"/>
+              <a:t>Nonclustered</a:t>
+            </a:r>
+            <a:r>
+              <a:rPr lang="en-US" sz="2000" dirty="0"/>
+              <a:t> indexes</a:t>
+            </a:r>
+          </a:p>
+          <a:p>
+            <a:pPr lvl="1"/>
+            <a:r>
+              <a:rPr lang="en-US" sz="2000" dirty="0"/>
+              <a:t>Indexed views</a:t>
+            </a:r>
+          </a:p>
+          <a:p>
+            <a:r>
+              <a:rPr lang="en-US" sz="2400" dirty="0"/>
+              <a:t>Heaps</a:t>
+            </a:r>
+            <a:endParaRPr lang="en-US" sz="2200" dirty="0"/>
+          </a:p>
+        </p:txBody>
+      </p:sp>
+    </p:spTree>
+    <p:extLst>
+      <p:ext uri="{BB962C8B-B14F-4D97-AF65-F5344CB8AC3E}">
+        <p14:creationId xmlns:p14="http://schemas.microsoft.com/office/powerpoint/2010/main" val="1854952441"/>
       </p:ext>
     </p:extLst>
   </p:cSld>
@@ -10480,132 +10516,6 @@
 </file>
 
 <file path=ppt/slides/slide20.xml><?xml version="1.0" encoding="utf-8"?>
-<p:sld xmlns:a="http://schemas.openxmlformats.org/drawingml/2006/main" xmlns:r="http://schemas.openxmlformats.org/officeDocument/2006/relationships" xmlns:p="http://schemas.openxmlformats.org/presentationml/2006/main">
-  <p:cSld>
-    <p:spTree>
-      <p:nvGrpSpPr>
-        <p:cNvPr id="1" name=""/>
-        <p:cNvGrpSpPr/>
-        <p:nvPr/>
-      </p:nvGrpSpPr>
-      <p:grpSpPr>
-        <a:xfrm>
-          <a:off x="0" y="0"/>
-          <a:ext cx="0" cy="0"/>
-          <a:chOff x="0" y="0"/>
-          <a:chExt cx="0" cy="0"/>
-        </a:xfrm>
-      </p:grpSpPr>
-      <p:sp>
-        <p:nvSpPr>
-          <p:cNvPr id="2" name="Title 1"/>
-          <p:cNvSpPr>
-            <a:spLocks noGrp="1"/>
-          </p:cNvSpPr>
-          <p:nvPr>
-            <p:ph type="title"/>
-          </p:nvPr>
-        </p:nvSpPr>
-        <p:spPr/>
-        <p:txBody>
-          <a:bodyPr>
-            <a:normAutofit/>
-          </a:bodyPr>
-          <a:lstStyle/>
-          <a:p>
-            <a:r>
-              <a:rPr lang="en-US" dirty="0"/>
-              <a:t>A quick review (or introduction)</a:t>
-            </a:r>
-          </a:p>
-        </p:txBody>
-      </p:sp>
-      <p:sp>
-        <p:nvSpPr>
-          <p:cNvPr id="3" name="Content Placeholder 2"/>
-          <p:cNvSpPr>
-            <a:spLocks noGrp="1"/>
-          </p:cNvSpPr>
-          <p:nvPr>
-            <p:ph idx="1"/>
-          </p:nvPr>
-        </p:nvSpPr>
-        <p:spPr/>
-        <p:txBody>
-          <a:bodyPr>
-            <a:normAutofit/>
-          </a:bodyPr>
-          <a:lstStyle/>
-          <a:p>
-            <a:r>
-              <a:rPr lang="en-US" sz="2400" dirty="0"/>
-              <a:t>All data is stored on pages</a:t>
-            </a:r>
-          </a:p>
-          <a:p>
-            <a:r>
-              <a:rPr lang="en-US" sz="2400" dirty="0"/>
-              <a:t>Pages are combined into different structures</a:t>
-            </a:r>
-          </a:p>
-          <a:p>
-            <a:endParaRPr lang="en-US" sz="2400" dirty="0"/>
-          </a:p>
-          <a:p>
-            <a:r>
-              <a:rPr lang="en-US" sz="2400" dirty="0"/>
-              <a:t>B+ Trees</a:t>
-            </a:r>
-            <a:endParaRPr lang="en-US" sz="2000" dirty="0"/>
-          </a:p>
-          <a:p>
-            <a:pPr lvl="1"/>
-            <a:r>
-              <a:rPr lang="en-US" sz="2000" dirty="0"/>
-              <a:t>Clustered indexes</a:t>
-            </a:r>
-          </a:p>
-          <a:p>
-            <a:pPr lvl="1"/>
-            <a:r>
-              <a:rPr lang="en-US" sz="2000" dirty="0" err="1"/>
-              <a:t>Nonclustered</a:t>
-            </a:r>
-            <a:r>
-              <a:rPr lang="en-US" sz="2000" dirty="0"/>
-              <a:t> indexes</a:t>
-            </a:r>
-          </a:p>
-          <a:p>
-            <a:pPr lvl="1"/>
-            <a:r>
-              <a:rPr lang="en-US" sz="2000" dirty="0"/>
-              <a:t>Indexed views</a:t>
-            </a:r>
-          </a:p>
-          <a:p>
-            <a:r>
-              <a:rPr lang="en-US" sz="2400" dirty="0"/>
-              <a:t>Heaps</a:t>
-            </a:r>
-            <a:endParaRPr lang="en-US" sz="2200" dirty="0"/>
-          </a:p>
-        </p:txBody>
-      </p:sp>
-    </p:spTree>
-    <p:extLst>
-      <p:ext uri="{BB962C8B-B14F-4D97-AF65-F5344CB8AC3E}">
-        <p14:creationId xmlns:p14="http://schemas.microsoft.com/office/powerpoint/2010/main" val="1854952441"/>
-      </p:ext>
-    </p:extLst>
-  </p:cSld>
-  <p:clrMapOvr>
-    <a:masterClrMapping/>
-  </p:clrMapOvr>
-</p:sld>
-</file>
-
-<file path=ppt/slides/slide21.xml><?xml version="1.0" encoding="utf-8"?>
 <p:sld xmlns:a="http://schemas.openxmlformats.org/drawingml/2006/main" xmlns:r="http://schemas.openxmlformats.org/officeDocument/2006/relationships" xmlns:p="http://schemas.openxmlformats.org/presentationml/2006/main">
   <p:cSld>
     <p:spTree>
@@ -11980,7 +11890,7 @@
 </p:sld>
 </file>
 
-<file path=ppt/slides/slide22.xml><?xml version="1.0" encoding="utf-8"?>
+<file path=ppt/slides/slide21.xml><?xml version="1.0" encoding="utf-8"?>
 <p:sld xmlns:a="http://schemas.openxmlformats.org/drawingml/2006/main" xmlns:r="http://schemas.openxmlformats.org/officeDocument/2006/relationships" xmlns:p="http://schemas.openxmlformats.org/presentationml/2006/main">
   <p:cSld>
     <p:spTree>
@@ -12743,7 +12653,7 @@
 </p:sld>
 </file>
 
-<file path=ppt/slides/slide23.xml><?xml version="1.0" encoding="utf-8"?>
+<file path=ppt/slides/slide22.xml><?xml version="1.0" encoding="utf-8"?>
 <p:sld xmlns:a="http://schemas.openxmlformats.org/drawingml/2006/main" xmlns:r="http://schemas.openxmlformats.org/officeDocument/2006/relationships" xmlns:p="http://schemas.openxmlformats.org/presentationml/2006/main">
   <p:cSld>
     <p:spTree>
@@ -13067,7 +12977,7 @@
 </p:sld>
 </file>
 
-<file path=ppt/slides/slide24.xml><?xml version="1.0" encoding="utf-8"?>
+<file path=ppt/slides/slide23.xml><?xml version="1.0" encoding="utf-8"?>
 <p:sld xmlns:a="http://schemas.openxmlformats.org/drawingml/2006/main" xmlns:r="http://schemas.openxmlformats.org/officeDocument/2006/relationships" xmlns:p="http://schemas.openxmlformats.org/presentationml/2006/main">
   <p:cSld>
     <p:spTree>
@@ -13347,7 +13257,7 @@
 </p:sld>
 </file>
 
-<file path=ppt/slides/slide25.xml><?xml version="1.0" encoding="utf-8"?>
+<file path=ppt/slides/slide24.xml><?xml version="1.0" encoding="utf-8"?>
 <p:sld xmlns:a="http://schemas.openxmlformats.org/drawingml/2006/main" xmlns:r="http://schemas.openxmlformats.org/officeDocument/2006/relationships" xmlns:p="http://schemas.openxmlformats.org/presentationml/2006/main">
   <p:cSld>
     <p:spTree>
@@ -13672,7 +13582,7 @@
 </p:sld>
 </file>
 
-<file path=ppt/slides/slide26.xml><?xml version="1.0" encoding="utf-8"?>
+<file path=ppt/slides/slide25.xml><?xml version="1.0" encoding="utf-8"?>
 <p:sld xmlns:a="http://schemas.openxmlformats.org/drawingml/2006/main" xmlns:r="http://schemas.openxmlformats.org/officeDocument/2006/relationships" xmlns:p="http://schemas.openxmlformats.org/presentationml/2006/main">
   <p:cSld>
     <p:spTree>
@@ -14042,6 +13952,169 @@
 </p:sld>
 </file>
 
+<file path=ppt/slides/slide26.xml><?xml version="1.0" encoding="utf-8"?>
+<p:sld xmlns:a="http://schemas.openxmlformats.org/drawingml/2006/main" xmlns:r="http://schemas.openxmlformats.org/officeDocument/2006/relationships" xmlns:p="http://schemas.openxmlformats.org/presentationml/2006/main">
+  <p:cSld>
+    <p:spTree>
+      <p:nvGrpSpPr>
+        <p:cNvPr id="1" name=""/>
+        <p:cNvGrpSpPr/>
+        <p:nvPr/>
+      </p:nvGrpSpPr>
+      <p:grpSpPr>
+        <a:xfrm>
+          <a:off x="0" y="0"/>
+          <a:ext cx="0" cy="0"/>
+          <a:chOff x="0" y="0"/>
+          <a:chExt cx="0" cy="0"/>
+        </a:xfrm>
+      </p:grpSpPr>
+      <p:sp>
+        <p:nvSpPr>
+          <p:cNvPr id="2" name="Title 1"/>
+          <p:cNvSpPr>
+            <a:spLocks noGrp="1"/>
+          </p:cNvSpPr>
+          <p:nvPr>
+            <p:ph type="title"/>
+          </p:nvPr>
+        </p:nvSpPr>
+        <p:spPr/>
+        <p:txBody>
+          <a:bodyPr/>
+          <a:lstStyle/>
+          <a:p>
+            <a:r>
+              <a:rPr lang="en-US" dirty="0"/>
+              <a:t>Syntax</a:t>
+            </a:r>
+          </a:p>
+        </p:txBody>
+      </p:sp>
+      <p:sp>
+        <p:nvSpPr>
+          <p:cNvPr id="3" name="Content Placeholder 2"/>
+          <p:cNvSpPr>
+            <a:spLocks noGrp="1"/>
+          </p:cNvSpPr>
+          <p:nvPr>
+            <p:ph idx="1"/>
+          </p:nvPr>
+        </p:nvSpPr>
+        <p:spPr>
+          <a:xfrm>
+            <a:off x="677334" y="2160589"/>
+            <a:ext cx="10100022" cy="3437777"/>
+          </a:xfrm>
+        </p:spPr>
+        <p:txBody>
+          <a:bodyPr>
+            <a:normAutofit/>
+          </a:bodyPr>
+          <a:lstStyle/>
+          <a:p>
+            <a:r>
+              <a:rPr lang="en-US" altLang="en-US" sz="2400" b="1" dirty="0">
+                <a:solidFill>
+                  <a:srgbClr val="006699"/>
+                </a:solidFill>
+                <a:latin typeface="Consolas" panose="020B0609020204030204" pitchFamily="49" charset="0"/>
+              </a:rPr>
+              <a:t>WITH</a:t>
+            </a:r>
+            <a:r>
+              <a:rPr lang="en-US" altLang="en-US" sz="2400" dirty="0">
+                <a:solidFill>
+                  <a:srgbClr val="303030"/>
+                </a:solidFill>
+                <a:latin typeface="Consolas" panose="020B0609020204030204" pitchFamily="49" charset="0"/>
+              </a:rPr>
+              <a:t> </a:t>
+            </a:r>
+            <a:r>
+              <a:rPr lang="en-US" altLang="en-US" sz="2400" dirty="0">
+                <a:solidFill>
+                  <a:srgbClr val="000000"/>
+                </a:solidFill>
+                <a:latin typeface="Consolas" panose="020B0609020204030204" pitchFamily="49" charset="0"/>
+              </a:rPr>
+              <a:t>(</a:t>
+            </a:r>
+            <a:r>
+              <a:rPr lang="en-US" altLang="en-US" sz="2400" dirty="0" err="1">
+                <a:solidFill>
+                  <a:srgbClr val="000000"/>
+                </a:solidFill>
+                <a:latin typeface="Consolas" panose="020B0609020204030204" pitchFamily="49" charset="0"/>
+              </a:rPr>
+              <a:t>Data_Compression</a:t>
+            </a:r>
+            <a:r>
+              <a:rPr lang="en-US" altLang="en-US" sz="2400" dirty="0">
+                <a:solidFill>
+                  <a:srgbClr val="000000"/>
+                </a:solidFill>
+                <a:latin typeface="Consolas" panose="020B0609020204030204" pitchFamily="49" charset="0"/>
+              </a:rPr>
+              <a:t>=[NONE/ROW/PAGE])</a:t>
+            </a:r>
+          </a:p>
+          <a:p>
+            <a:pPr lvl="1"/>
+            <a:r>
+              <a:rPr lang="en-US" sz="2000" dirty="0"/>
+              <a:t>CREATE TABLE</a:t>
+            </a:r>
+          </a:p>
+          <a:p>
+            <a:pPr lvl="1"/>
+            <a:r>
+              <a:rPr lang="en-US" sz="2000" dirty="0"/>
+              <a:t>CREATE INDEX</a:t>
+            </a:r>
+          </a:p>
+          <a:p>
+            <a:pPr lvl="1"/>
+            <a:r>
+              <a:rPr lang="en-US" sz="2000" dirty="0"/>
+              <a:t>ALTER TABLE…REBUILD</a:t>
+            </a:r>
+          </a:p>
+          <a:p>
+            <a:pPr lvl="1"/>
+            <a:r>
+              <a:rPr lang="en-US" sz="2000" dirty="0"/>
+              <a:t>ALTER INDEX…REBUILD</a:t>
+            </a:r>
+          </a:p>
+          <a:p>
+            <a:endParaRPr lang="en-US" dirty="0"/>
+          </a:p>
+          <a:p>
+            <a:r>
+              <a:rPr lang="en-US" sz="3200" dirty="0">
+                <a:solidFill>
+                  <a:schemeClr val="tx1"/>
+                </a:solidFill>
+              </a:rPr>
+              <a:t>Anytime you build/rebuild an entire B-Tree or table</a:t>
+            </a:r>
+          </a:p>
+        </p:txBody>
+      </p:sp>
+    </p:spTree>
+    <p:extLst>
+      <p:ext uri="{BB962C8B-B14F-4D97-AF65-F5344CB8AC3E}">
+        <p14:creationId xmlns:p14="http://schemas.microsoft.com/office/powerpoint/2010/main" val="1263069789"/>
+      </p:ext>
+    </p:extLst>
+  </p:cSld>
+  <p:clrMapOvr>
+    <a:masterClrMapping/>
+  </p:clrMapOvr>
+</p:sld>
+</file>
+
 <file path=ppt/slides/slide27.xml><?xml version="1.0" encoding="utf-8"?>
 <p:sld xmlns:a="http://schemas.openxmlformats.org/drawingml/2006/main" xmlns:r="http://schemas.openxmlformats.org/officeDocument/2006/relationships" xmlns:p="http://schemas.openxmlformats.org/presentationml/2006/main">
   <p:cSld>
@@ -14075,169 +14148,6 @@
           <a:lstStyle/>
           <a:p>
             <a:r>
-              <a:rPr lang="en-US" dirty="0"/>
-              <a:t>Syntax</a:t>
-            </a:r>
-          </a:p>
-        </p:txBody>
-      </p:sp>
-      <p:sp>
-        <p:nvSpPr>
-          <p:cNvPr id="3" name="Content Placeholder 2"/>
-          <p:cNvSpPr>
-            <a:spLocks noGrp="1"/>
-          </p:cNvSpPr>
-          <p:nvPr>
-            <p:ph idx="1"/>
-          </p:nvPr>
-        </p:nvSpPr>
-        <p:spPr>
-          <a:xfrm>
-            <a:off x="677334" y="2160589"/>
-            <a:ext cx="10100022" cy="3437777"/>
-          </a:xfrm>
-        </p:spPr>
-        <p:txBody>
-          <a:bodyPr>
-            <a:normAutofit/>
-          </a:bodyPr>
-          <a:lstStyle/>
-          <a:p>
-            <a:r>
-              <a:rPr lang="en-US" altLang="en-US" sz="2400" b="1" dirty="0">
-                <a:solidFill>
-                  <a:srgbClr val="006699"/>
-                </a:solidFill>
-                <a:latin typeface="Consolas" panose="020B0609020204030204" pitchFamily="49" charset="0"/>
-              </a:rPr>
-              <a:t>WITH</a:t>
-            </a:r>
-            <a:r>
-              <a:rPr lang="en-US" altLang="en-US" sz="2400" dirty="0">
-                <a:solidFill>
-                  <a:srgbClr val="303030"/>
-                </a:solidFill>
-                <a:latin typeface="Consolas" panose="020B0609020204030204" pitchFamily="49" charset="0"/>
-              </a:rPr>
-              <a:t> </a:t>
-            </a:r>
-            <a:r>
-              <a:rPr lang="en-US" altLang="en-US" sz="2400" dirty="0">
-                <a:solidFill>
-                  <a:srgbClr val="000000"/>
-                </a:solidFill>
-                <a:latin typeface="Consolas" panose="020B0609020204030204" pitchFamily="49" charset="0"/>
-              </a:rPr>
-              <a:t>(</a:t>
-            </a:r>
-            <a:r>
-              <a:rPr lang="en-US" altLang="en-US" sz="2400" dirty="0" err="1">
-                <a:solidFill>
-                  <a:srgbClr val="000000"/>
-                </a:solidFill>
-                <a:latin typeface="Consolas" panose="020B0609020204030204" pitchFamily="49" charset="0"/>
-              </a:rPr>
-              <a:t>Data_Compression</a:t>
-            </a:r>
-            <a:r>
-              <a:rPr lang="en-US" altLang="en-US" sz="2400" dirty="0">
-                <a:solidFill>
-                  <a:srgbClr val="000000"/>
-                </a:solidFill>
-                <a:latin typeface="Consolas" panose="020B0609020204030204" pitchFamily="49" charset="0"/>
-              </a:rPr>
-              <a:t>=[NONE/ROW/PAGE])</a:t>
-            </a:r>
-          </a:p>
-          <a:p>
-            <a:pPr lvl="1"/>
-            <a:r>
-              <a:rPr lang="en-US" sz="2000" dirty="0"/>
-              <a:t>CREATE TABLE</a:t>
-            </a:r>
-          </a:p>
-          <a:p>
-            <a:pPr lvl="1"/>
-            <a:r>
-              <a:rPr lang="en-US" sz="2000" dirty="0"/>
-              <a:t>CREATE INDEX</a:t>
-            </a:r>
-          </a:p>
-          <a:p>
-            <a:pPr lvl="1"/>
-            <a:r>
-              <a:rPr lang="en-US" sz="2000" dirty="0"/>
-              <a:t>ALTER TABLE…REBUILD</a:t>
-            </a:r>
-          </a:p>
-          <a:p>
-            <a:pPr lvl="1"/>
-            <a:r>
-              <a:rPr lang="en-US" sz="2000" dirty="0"/>
-              <a:t>ALTER INDEX…REBUILD</a:t>
-            </a:r>
-          </a:p>
-          <a:p>
-            <a:endParaRPr lang="en-US" dirty="0"/>
-          </a:p>
-          <a:p>
-            <a:r>
-              <a:rPr lang="en-US" sz="3200" dirty="0">
-                <a:solidFill>
-                  <a:schemeClr val="tx1"/>
-                </a:solidFill>
-              </a:rPr>
-              <a:t>Anytime you build/rebuild an entire B-Tree or table</a:t>
-            </a:r>
-          </a:p>
-        </p:txBody>
-      </p:sp>
-    </p:spTree>
-    <p:extLst>
-      <p:ext uri="{BB962C8B-B14F-4D97-AF65-F5344CB8AC3E}">
-        <p14:creationId xmlns:p14="http://schemas.microsoft.com/office/powerpoint/2010/main" val="1263069789"/>
-      </p:ext>
-    </p:extLst>
-  </p:cSld>
-  <p:clrMapOvr>
-    <a:masterClrMapping/>
-  </p:clrMapOvr>
-</p:sld>
-</file>
-
-<file path=ppt/slides/slide28.xml><?xml version="1.0" encoding="utf-8"?>
-<p:sld xmlns:a="http://schemas.openxmlformats.org/drawingml/2006/main" xmlns:r="http://schemas.openxmlformats.org/officeDocument/2006/relationships" xmlns:p="http://schemas.openxmlformats.org/presentationml/2006/main">
-  <p:cSld>
-    <p:spTree>
-      <p:nvGrpSpPr>
-        <p:cNvPr id="1" name=""/>
-        <p:cNvGrpSpPr/>
-        <p:nvPr/>
-      </p:nvGrpSpPr>
-      <p:grpSpPr>
-        <a:xfrm>
-          <a:off x="0" y="0"/>
-          <a:ext cx="0" cy="0"/>
-          <a:chOff x="0" y="0"/>
-          <a:chExt cx="0" cy="0"/>
-        </a:xfrm>
-      </p:grpSpPr>
-      <p:sp>
-        <p:nvSpPr>
-          <p:cNvPr id="2" name="Title 1"/>
-          <p:cNvSpPr>
-            <a:spLocks noGrp="1"/>
-          </p:cNvSpPr>
-          <p:nvPr>
-            <p:ph type="title"/>
-          </p:nvPr>
-        </p:nvSpPr>
-        <p:spPr/>
-        <p:txBody>
-          <a:bodyPr/>
-          <a:lstStyle/>
-          <a:p>
-            <a:r>
               <a:rPr lang="en-US"/>
               <a:t>Useful stored procedures &amp; DMVs</a:t>
             </a:r>
@@ -14309,7 +14219,7 @@
 </p:sld>
 </file>
 
-<file path=ppt/slides/slide29.xml><?xml version="1.0" encoding="utf-8"?>
+<file path=ppt/slides/slide28.xml><?xml version="1.0" encoding="utf-8"?>
 <p:sld xmlns:a="http://schemas.openxmlformats.org/drawingml/2006/main" xmlns:r="http://schemas.openxmlformats.org/officeDocument/2006/relationships" xmlns:p="http://schemas.openxmlformats.org/presentationml/2006/main">
   <p:cSld>
     <p:spTree>
@@ -14633,139 +14543,7 @@
 </p:sld>
 </file>
 
-<file path=ppt/slides/slide3.xml><?xml version="1.0" encoding="utf-8"?>
-<p:sld xmlns:a="http://schemas.openxmlformats.org/drawingml/2006/main" xmlns:r="http://schemas.openxmlformats.org/officeDocument/2006/relationships" xmlns:p="http://schemas.openxmlformats.org/presentationml/2006/main">
-  <p:cSld>
-    <p:spTree>
-      <p:nvGrpSpPr>
-        <p:cNvPr id="1" name=""/>
-        <p:cNvGrpSpPr/>
-        <p:nvPr/>
-      </p:nvGrpSpPr>
-      <p:grpSpPr>
-        <a:xfrm>
-          <a:off x="0" y="0"/>
-          <a:ext cx="0" cy="0"/>
-          <a:chOff x="0" y="0"/>
-          <a:chExt cx="0" cy="0"/>
-        </a:xfrm>
-      </p:grpSpPr>
-      <p:sp>
-        <p:nvSpPr>
-          <p:cNvPr id="2" name="Title 1"/>
-          <p:cNvSpPr>
-            <a:spLocks noGrp="1"/>
-          </p:cNvSpPr>
-          <p:nvPr>
-            <p:ph type="title"/>
-          </p:nvPr>
-        </p:nvSpPr>
-        <p:spPr/>
-        <p:txBody>
-          <a:bodyPr/>
-          <a:lstStyle/>
-          <a:p>
-            <a:r>
-              <a:rPr lang="en-US" dirty="0"/>
-              <a:t>Demo</a:t>
-            </a:r>
-          </a:p>
-        </p:txBody>
-      </p:sp>
-      <p:pic>
-        <p:nvPicPr>
-          <p:cNvPr id="1026" name="Picture 2" descr="Oliver Smoot, who stands 5-foot-7, was used to measure the Massachusetts Avenue Bridge as part of a MIT fraternity prank in 1958. The markings on the bridge and the legacy of the unit of measurement know as the Smoot live on. (Joe Difazio for WBUR)"/>
-          <p:cNvPicPr>
-            <a:picLocks noGrp="1" noChangeAspect="1" noChangeArrowheads="1"/>
-          </p:cNvPicPr>
-          <p:nvPr>
-            <p:ph idx="1"/>
-          </p:nvPr>
-        </p:nvPicPr>
-        <p:blipFill>
-          <a:blip r:embed="rId2">
-            <a:extLst>
-              <a:ext uri="{28A0092B-C50C-407E-A947-70E740481C1C}">
-                <a14:useLocalDpi xmlns:a14="http://schemas.microsoft.com/office/drawing/2010/main" val="0"/>
-              </a:ext>
-            </a:extLst>
-          </a:blip>
-          <a:stretch>
-            <a:fillRect/>
-          </a:stretch>
-        </p:blipFill>
-        <p:spPr bwMode="auto">
-          <a:xfrm>
-            <a:off x="2907507" y="1803400"/>
-            <a:ext cx="6691312" cy="4460875"/>
-          </a:xfrm>
-          <a:prstGeom prst="rect">
-            <a:avLst/>
-          </a:prstGeom>
-          <a:noFill/>
-          <a:extLst>
-            <a:ext uri="{909E8E84-426E-40DD-AFC4-6F175D3DCCD1}">
-              <a14:hiddenFill xmlns:a14="http://schemas.microsoft.com/office/drawing/2010/main">
-                <a:solidFill>
-                  <a:srgbClr val="FFFFFF"/>
-                </a:solidFill>
-              </a14:hiddenFill>
-            </a:ext>
-          </a:extLst>
-        </p:spPr>
-      </p:pic>
-      <p:sp>
-        <p:nvSpPr>
-          <p:cNvPr id="4" name="TextBox 3"/>
-          <p:cNvSpPr txBox="1"/>
-          <p:nvPr/>
-        </p:nvSpPr>
-        <p:spPr>
-          <a:xfrm>
-            <a:off x="9015445" y="5987276"/>
-            <a:ext cx="2668555" cy="276999"/>
-          </a:xfrm>
-          <a:prstGeom prst="rect">
-            <a:avLst/>
-          </a:prstGeom>
-          <a:noFill/>
-        </p:spPr>
-        <p:txBody>
-          <a:bodyPr wrap="square" rtlCol="0">
-            <a:spAutoFit/>
-          </a:bodyPr>
-          <a:lstStyle/>
-          <a:p>
-            <a:pPr algn="r"/>
-            <a:r>
-              <a:rPr lang="en-US" sz="1200" dirty="0"/>
-              <a:t>Photo by Joe </a:t>
-            </a:r>
-            <a:r>
-              <a:rPr lang="en-US" sz="1200" dirty="0" err="1"/>
-              <a:t>Difazio</a:t>
-            </a:r>
-            <a:r>
-              <a:rPr lang="en-US" sz="1200" dirty="0"/>
-              <a:t> for WBUR</a:t>
-            </a:r>
-          </a:p>
-        </p:txBody>
-      </p:sp>
-    </p:spTree>
-    <p:extLst>
-      <p:ext uri="{BB962C8B-B14F-4D97-AF65-F5344CB8AC3E}">
-        <p14:creationId xmlns:p14="http://schemas.microsoft.com/office/powerpoint/2010/main" val="839309899"/>
-      </p:ext>
-    </p:extLst>
-  </p:cSld>
-  <p:clrMapOvr>
-    <a:masterClrMapping/>
-  </p:clrMapOvr>
-</p:sld>
-</file>
-
-<file path=ppt/slides/slide30.xml><?xml version="1.0" encoding="utf-8"?>
+<file path=ppt/slides/slide29.xml><?xml version="1.0" encoding="utf-8"?>
 <p:sld xmlns:a="http://schemas.openxmlformats.org/drawingml/2006/main" xmlns:r="http://schemas.openxmlformats.org/officeDocument/2006/relationships" xmlns:p="http://schemas.openxmlformats.org/presentationml/2006/main">
   <p:cSld>
     <p:spTree>
@@ -17437,7 +17215,139 @@
 </p:sld>
 </file>
 
-<file path=ppt/slides/slide31.xml><?xml version="1.0" encoding="utf-8"?>
+<file path=ppt/slides/slide3.xml><?xml version="1.0" encoding="utf-8"?>
+<p:sld xmlns:a="http://schemas.openxmlformats.org/drawingml/2006/main" xmlns:r="http://schemas.openxmlformats.org/officeDocument/2006/relationships" xmlns:p="http://schemas.openxmlformats.org/presentationml/2006/main">
+  <p:cSld>
+    <p:spTree>
+      <p:nvGrpSpPr>
+        <p:cNvPr id="1" name=""/>
+        <p:cNvGrpSpPr/>
+        <p:nvPr/>
+      </p:nvGrpSpPr>
+      <p:grpSpPr>
+        <a:xfrm>
+          <a:off x="0" y="0"/>
+          <a:ext cx="0" cy="0"/>
+          <a:chOff x="0" y="0"/>
+          <a:chExt cx="0" cy="0"/>
+        </a:xfrm>
+      </p:grpSpPr>
+      <p:sp>
+        <p:nvSpPr>
+          <p:cNvPr id="2" name="Title 1"/>
+          <p:cNvSpPr>
+            <a:spLocks noGrp="1"/>
+          </p:cNvSpPr>
+          <p:nvPr>
+            <p:ph type="title"/>
+          </p:nvPr>
+        </p:nvSpPr>
+        <p:spPr/>
+        <p:txBody>
+          <a:bodyPr/>
+          <a:lstStyle/>
+          <a:p>
+            <a:r>
+              <a:rPr lang="en-US" dirty="0"/>
+              <a:t>Demo</a:t>
+            </a:r>
+          </a:p>
+        </p:txBody>
+      </p:sp>
+      <p:pic>
+        <p:nvPicPr>
+          <p:cNvPr id="1026" name="Picture 2" descr="Oliver Smoot, who stands 5-foot-7, was used to measure the Massachusetts Avenue Bridge as part of a MIT fraternity prank in 1958. The markings on the bridge and the legacy of the unit of measurement know as the Smoot live on. (Joe Difazio for WBUR)"/>
+          <p:cNvPicPr>
+            <a:picLocks noGrp="1" noChangeAspect="1" noChangeArrowheads="1"/>
+          </p:cNvPicPr>
+          <p:nvPr>
+            <p:ph idx="1"/>
+          </p:nvPr>
+        </p:nvPicPr>
+        <p:blipFill>
+          <a:blip r:embed="rId2">
+            <a:extLst>
+              <a:ext uri="{28A0092B-C50C-407E-A947-70E740481C1C}">
+                <a14:useLocalDpi xmlns:a14="http://schemas.microsoft.com/office/drawing/2010/main" val="0"/>
+              </a:ext>
+            </a:extLst>
+          </a:blip>
+          <a:stretch>
+            <a:fillRect/>
+          </a:stretch>
+        </p:blipFill>
+        <p:spPr bwMode="auto">
+          <a:xfrm>
+            <a:off x="2907507" y="1803400"/>
+            <a:ext cx="6691312" cy="4460875"/>
+          </a:xfrm>
+          <a:prstGeom prst="rect">
+            <a:avLst/>
+          </a:prstGeom>
+          <a:noFill/>
+          <a:extLst>
+            <a:ext uri="{909E8E84-426E-40DD-AFC4-6F175D3DCCD1}">
+              <a14:hiddenFill xmlns:a14="http://schemas.microsoft.com/office/drawing/2010/main">
+                <a:solidFill>
+                  <a:srgbClr val="FFFFFF"/>
+                </a:solidFill>
+              </a14:hiddenFill>
+            </a:ext>
+          </a:extLst>
+        </p:spPr>
+      </p:pic>
+      <p:sp>
+        <p:nvSpPr>
+          <p:cNvPr id="4" name="TextBox 3"/>
+          <p:cNvSpPr txBox="1"/>
+          <p:nvPr/>
+        </p:nvSpPr>
+        <p:spPr>
+          <a:xfrm>
+            <a:off x="9015445" y="5987276"/>
+            <a:ext cx="2668555" cy="276999"/>
+          </a:xfrm>
+          <a:prstGeom prst="rect">
+            <a:avLst/>
+          </a:prstGeom>
+          <a:noFill/>
+        </p:spPr>
+        <p:txBody>
+          <a:bodyPr wrap="square" rtlCol="0">
+            <a:spAutoFit/>
+          </a:bodyPr>
+          <a:lstStyle/>
+          <a:p>
+            <a:pPr algn="r"/>
+            <a:r>
+              <a:rPr lang="en-US" sz="1200" dirty="0"/>
+              <a:t>Photo by Joe </a:t>
+            </a:r>
+            <a:r>
+              <a:rPr lang="en-US" sz="1200" dirty="0" err="1"/>
+              <a:t>Difazio</a:t>
+            </a:r>
+            <a:r>
+              <a:rPr lang="en-US" sz="1200" dirty="0"/>
+              <a:t> for WBUR</a:t>
+            </a:r>
+          </a:p>
+        </p:txBody>
+      </p:sp>
+    </p:spTree>
+    <p:extLst>
+      <p:ext uri="{BB962C8B-B14F-4D97-AF65-F5344CB8AC3E}">
+        <p14:creationId xmlns:p14="http://schemas.microsoft.com/office/powerpoint/2010/main" val="839309899"/>
+      </p:ext>
+    </p:extLst>
+  </p:cSld>
+  <p:clrMapOvr>
+    <a:masterClrMapping/>
+  </p:clrMapOvr>
+</p:sld>
+</file>
+
+<file path=ppt/slides/slide30.xml><?xml version="1.0" encoding="utf-8"?>
 <p:sld xmlns:a="http://schemas.openxmlformats.org/drawingml/2006/main" xmlns:r="http://schemas.openxmlformats.org/officeDocument/2006/relationships" xmlns:p="http://schemas.openxmlformats.org/presentationml/2006/main">
   <p:cSld>
     <p:spTree>
@@ -17980,7 +17890,7 @@
 </p:sld>
 </file>
 
-<file path=ppt/slides/slide32.xml><?xml version="1.0" encoding="utf-8"?>
+<file path=ppt/slides/slide31.xml><?xml version="1.0" encoding="utf-8"?>
 <p:sld xmlns:a="http://schemas.openxmlformats.org/drawingml/2006/main" xmlns:r="http://schemas.openxmlformats.org/officeDocument/2006/relationships" xmlns:p="http://schemas.openxmlformats.org/presentationml/2006/main">
   <p:cSld>
     <p:spTree>
@@ -18834,7 +18744,7 @@
 </p:sld>
 </file>
 
-<file path=ppt/slides/slide33.xml><?xml version="1.0" encoding="utf-8"?>
+<file path=ppt/slides/slide32.xml><?xml version="1.0" encoding="utf-8"?>
 <p:sld xmlns:a="http://schemas.openxmlformats.org/drawingml/2006/main" xmlns:r="http://schemas.openxmlformats.org/officeDocument/2006/relationships" xmlns:p="http://schemas.openxmlformats.org/presentationml/2006/main" showMasterSp="0">
   <p:cSld>
     <p:spTree>
@@ -19080,7 +18990,7 @@
 </p:sld>
 </file>
 
-<file path=ppt/slides/slide34.xml><?xml version="1.0" encoding="utf-8"?>
+<file path=ppt/slides/slide33.xml><?xml version="1.0" encoding="utf-8"?>
 <p:sld xmlns:a="http://schemas.openxmlformats.org/drawingml/2006/main" xmlns:r="http://schemas.openxmlformats.org/officeDocument/2006/relationships" xmlns:p="http://schemas.openxmlformats.org/presentationml/2006/main">
   <p:cSld>
     <p:spTree>
@@ -19414,7 +19324,7 @@
 </p:sld>
 </file>
 
-<file path=ppt/slides/slide35.xml><?xml version="1.0" encoding="utf-8"?>
+<file path=ppt/slides/slide34.xml><?xml version="1.0" encoding="utf-8"?>
 <p:sld xmlns:a="http://schemas.openxmlformats.org/drawingml/2006/main" xmlns:r="http://schemas.openxmlformats.org/officeDocument/2006/relationships" xmlns:p="http://schemas.openxmlformats.org/presentationml/2006/main">
   <p:cSld>
     <p:spTree>
@@ -19742,7 +19652,7 @@
 </p:sld>
 </file>
 
-<file path=ppt/slides/slide36.xml><?xml version="1.0" encoding="utf-8"?>
+<file path=ppt/slides/slide35.xml><?xml version="1.0" encoding="utf-8"?>
 <p:sld xmlns:a="http://schemas.openxmlformats.org/drawingml/2006/main" xmlns:r="http://schemas.openxmlformats.org/officeDocument/2006/relationships" xmlns:p="http://schemas.openxmlformats.org/presentationml/2006/main">
   <p:cSld>
     <p:spTree>
@@ -20361,7 +20271,7 @@
 </p:sld>
 </file>
 
-<file path=ppt/slides/slide37.xml><?xml version="1.0" encoding="utf-8"?>
+<file path=ppt/slides/slide36.xml><?xml version="1.0" encoding="utf-8"?>
 <p:sld xmlns:a="http://schemas.openxmlformats.org/drawingml/2006/main" xmlns:r="http://schemas.openxmlformats.org/officeDocument/2006/relationships" xmlns:p="http://schemas.openxmlformats.org/presentationml/2006/main">
   <p:cSld>
     <p:spTree>
@@ -20702,7 +20612,7 @@
 </p:sld>
 </file>
 
-<file path=ppt/slides/slide38.xml><?xml version="1.0" encoding="utf-8"?>
+<file path=ppt/slides/slide37.xml><?xml version="1.0" encoding="utf-8"?>
 <p:sld xmlns:a="http://schemas.openxmlformats.org/drawingml/2006/main" xmlns:r="http://schemas.openxmlformats.org/officeDocument/2006/relationships" xmlns:p="http://schemas.openxmlformats.org/presentationml/2006/main">
   <p:cSld>
     <p:spTree>
@@ -20807,7 +20717,7 @@
 </p:sld>
 </file>
 
-<file path=ppt/slides/slide39.xml><?xml version="1.0" encoding="utf-8"?>
+<file path=ppt/slides/slide38.xml><?xml version="1.0" encoding="utf-8"?>
 <p:sld xmlns:a="http://schemas.openxmlformats.org/drawingml/2006/main" xmlns:r="http://schemas.openxmlformats.org/officeDocument/2006/relationships" xmlns:p="http://schemas.openxmlformats.org/presentationml/2006/main">
   <p:cSld>
     <p:spTree>
@@ -21838,6 +21748,950 @@
 </p:sld>
 </file>
 
+<file path=ppt/slides/slide39.xml><?xml version="1.0" encoding="utf-8"?>
+<p:sld xmlns:a="http://schemas.openxmlformats.org/drawingml/2006/main" xmlns:r="http://schemas.openxmlformats.org/officeDocument/2006/relationships" xmlns:p="http://schemas.openxmlformats.org/presentationml/2006/main">
+  <p:cSld>
+    <p:spTree>
+      <p:nvGrpSpPr>
+        <p:cNvPr id="1" name=""/>
+        <p:cNvGrpSpPr/>
+        <p:nvPr/>
+      </p:nvGrpSpPr>
+      <p:grpSpPr>
+        <a:xfrm>
+          <a:off x="0" y="0"/>
+          <a:ext cx="0" cy="0"/>
+          <a:chOff x="0" y="0"/>
+          <a:chExt cx="0" cy="0"/>
+        </a:xfrm>
+      </p:grpSpPr>
+      <p:sp>
+        <p:nvSpPr>
+          <p:cNvPr id="7" name="Title 6"/>
+          <p:cNvSpPr>
+            <a:spLocks noGrp="1"/>
+          </p:cNvSpPr>
+          <p:nvPr>
+            <p:ph type="title" idx="4294967295"/>
+          </p:nvPr>
+        </p:nvSpPr>
+        <p:spPr>
+          <a:xfrm>
+            <a:off x="216877" y="166447"/>
+            <a:ext cx="11975123" cy="669925"/>
+          </a:xfrm>
+        </p:spPr>
+        <p:txBody>
+          <a:bodyPr>
+            <a:normAutofit fontScale="90000"/>
+          </a:bodyPr>
+          <a:lstStyle/>
+          <a:p>
+            <a:r>
+              <a:rPr lang="en-US" dirty="0"/>
+              <a:t>Page-Compressed Index </a:t>
+            </a:r>
+            <a:r>
+              <a:rPr lang="en-US" sz="2700" dirty="0"/>
+              <a:t>(from </a:t>
+            </a:r>
+            <a:r>
+              <a:rPr lang="en-US" sz="2700" i="1" dirty="0"/>
+              <a:t>Flour</a:t>
+            </a:r>
+            <a:r>
+              <a:rPr lang="en-US" sz="2700" dirty="0"/>
+              <a:t> cookbook by Joanne Chang)</a:t>
+            </a:r>
+          </a:p>
+        </p:txBody>
+      </p:sp>
+      <p:sp>
+        <p:nvSpPr>
+          <p:cNvPr id="8" name="Content Placeholder 7"/>
+          <p:cNvSpPr>
+            <a:spLocks noGrp="1"/>
+          </p:cNvSpPr>
+          <p:nvPr>
+            <p:ph idx="4294967295"/>
+          </p:nvPr>
+        </p:nvSpPr>
+        <p:spPr>
+          <a:xfrm>
+            <a:off x="657225" y="1028700"/>
+            <a:ext cx="11534775" cy="5486400"/>
+          </a:xfrm>
+        </p:spPr>
+        <p:txBody>
+          <a:bodyPr numCol="1">
+            <a:normAutofit fontScale="47500" lnSpcReduction="20000"/>
+          </a:bodyPr>
+          <a:lstStyle/>
+          <a:p>
+            <a:pPr marL="0" indent="0">
+              <a:buNone/>
+              <a:tabLst>
+                <a:tab pos="9604375" algn="l"/>
+              </a:tabLst>
+            </a:pPr>
+            <a:r>
+              <a:rPr lang="en-US" dirty="0">
+                <a:solidFill>
+                  <a:srgbClr val="FF0000"/>
+                </a:solidFill>
+                <a:latin typeface="Consolas" panose="020B0609020204030204" pitchFamily="49" charset="0"/>
+              </a:rPr>
+              <a:t>[Almond]</a:t>
+            </a:r>
+            <a:r>
+              <a:rPr lang="en-US" dirty="0">
+                <a:solidFill>
+                  <a:srgbClr val="7030A0"/>
+                </a:solidFill>
+                <a:latin typeface="Consolas" panose="020B0609020204030204" pitchFamily="49" charset="0"/>
+              </a:rPr>
+              <a:t>{nut}</a:t>
+            </a:r>
+            <a:r>
+              <a:rPr lang="en-US" dirty="0">
+                <a:solidFill>
+                  <a:schemeClr val="accent1"/>
+                </a:solidFill>
+                <a:latin typeface="Consolas" panose="020B0609020204030204" pitchFamily="49" charset="0"/>
+              </a:rPr>
+              <a:t>{Granola}</a:t>
+            </a:r>
+            <a:r>
+              <a:rPr lang="en-US" dirty="0">
+                <a:solidFill>
+                  <a:srgbClr val="FFC000"/>
+                </a:solidFill>
+                <a:latin typeface="Consolas" panose="020B0609020204030204" pitchFamily="49" charset="0"/>
+              </a:rPr>
+              <a:t>{Caramel}</a:t>
+            </a:r>
+            <a:r>
+              <a:rPr lang="en-US" dirty="0">
+                <a:solidFill>
+                  <a:srgbClr val="00B0F0"/>
+                </a:solidFill>
+                <a:latin typeface="Consolas" panose="020B0609020204030204" pitchFamily="49" charset="0"/>
+              </a:rPr>
+              <a:t>{Apple}</a:t>
+            </a:r>
+            <a:r>
+              <a:rPr lang="en-US" dirty="0">
+                <a:solidFill>
+                  <a:srgbClr val="00B050"/>
+                </a:solidFill>
+                <a:latin typeface="Consolas" panose="020B0609020204030204" pitchFamily="49" charset="0"/>
+              </a:rPr>
+              <a:t>{Baking}</a:t>
+            </a:r>
+            <a:r>
+              <a:rPr lang="en-US" dirty="0">
+                <a:solidFill>
+                  <a:schemeClr val="tx1">
+                    <a:lumMod val="50000"/>
+                    <a:lumOff val="50000"/>
+                  </a:schemeClr>
+                </a:solidFill>
+                <a:latin typeface="Consolas" panose="020B0609020204030204" pitchFamily="49" charset="0"/>
+              </a:rPr>
+              <a:t>{Banana}</a:t>
+            </a:r>
+            <a:r>
+              <a:rPr lang="en-US" dirty="0">
+                <a:solidFill>
+                  <a:srgbClr val="FF33CC"/>
+                </a:solidFill>
+                <a:latin typeface="Consolas" panose="020B0609020204030204" pitchFamily="49" charset="0"/>
+              </a:rPr>
+              <a:t>{Bread}</a:t>
+            </a:r>
+            <a:r>
+              <a:rPr lang="en-US" dirty="0">
+                <a:solidFill>
+                  <a:srgbClr val="FF6600"/>
+                </a:solidFill>
+                <a:latin typeface="Consolas" panose="020B0609020204030204" pitchFamily="49" charset="0"/>
+              </a:rPr>
+              <a:t>{Muffins}</a:t>
+            </a:r>
+          </a:p>
+          <a:p>
+            <a:pPr marL="0" indent="0">
+              <a:buNone/>
+              <a:tabLst>
+                <a:tab pos="9604375" algn="l"/>
+              </a:tabLst>
+            </a:pPr>
+            <a:r>
+              <a:rPr lang="en-US" dirty="0">
+                <a:latin typeface="Consolas" panose="020B0609020204030204" pitchFamily="49" charset="0"/>
+              </a:rPr>
+              <a:t>Addictive Bran Muffins with Golden Raisins and “Bird Seed” – 58-59; </a:t>
+            </a:r>
+            <a:r>
+              <a:rPr lang="en-US" dirty="0">
+                <a:solidFill>
+                  <a:srgbClr val="FF0000"/>
+                </a:solidFill>
+                <a:latin typeface="Consolas" panose="020B0609020204030204" pitchFamily="49" charset="0"/>
+              </a:rPr>
+              <a:t>[1] </a:t>
+            </a:r>
+            <a:r>
+              <a:rPr lang="en-US" dirty="0">
+                <a:latin typeface="Consolas" panose="020B0609020204030204" pitchFamily="49" charset="0"/>
+              </a:rPr>
+              <a:t>and Anise </a:t>
+            </a:r>
+          </a:p>
+          <a:p>
+            <a:pPr marL="0" indent="0">
+              <a:buNone/>
+              <a:tabLst>
+                <a:tab pos="9604375" algn="l"/>
+              </a:tabLst>
+            </a:pPr>
+            <a:r>
+              <a:rPr lang="en-US" dirty="0">
+                <a:latin typeface="Consolas" panose="020B0609020204030204" pitchFamily="49" charset="0"/>
+              </a:rPr>
+              <a:t>Biscotti - 128-129; </a:t>
+            </a:r>
+            <a:r>
+              <a:rPr lang="en-US" dirty="0">
+                <a:solidFill>
+                  <a:srgbClr val="FF0000"/>
+                </a:solidFill>
+                <a:latin typeface="Consolas" panose="020B0609020204030204" pitchFamily="49" charset="0"/>
+              </a:rPr>
+              <a:t>[1]</a:t>
+            </a:r>
+            <a:r>
+              <a:rPr lang="en-US" dirty="0">
+                <a:latin typeface="Consolas" panose="020B0609020204030204" pitchFamily="49" charset="0"/>
+              </a:rPr>
+              <a:t>-Apricot </a:t>
+            </a:r>
+            <a:r>
+              <a:rPr lang="en-US" dirty="0">
+                <a:solidFill>
+                  <a:srgbClr val="FF6600"/>
+                </a:solidFill>
+                <a:latin typeface="Consolas" panose="020B0609020204030204" pitchFamily="49" charset="0"/>
+              </a:rPr>
+              <a:t>{9}</a:t>
+            </a:r>
+            <a:r>
+              <a:rPr lang="en-US" dirty="0">
+                <a:latin typeface="Consolas" panose="020B0609020204030204" pitchFamily="49" charset="0"/>
+              </a:rPr>
+              <a:t> – 54; </a:t>
+            </a:r>
+            <a:r>
+              <a:rPr lang="en-US" dirty="0">
+                <a:solidFill>
+                  <a:srgbClr val="FF0000"/>
+                </a:solidFill>
+                <a:latin typeface="Consolas" panose="020B0609020204030204" pitchFamily="49" charset="0"/>
+              </a:rPr>
+              <a:t>[1]</a:t>
+            </a:r>
+            <a:r>
+              <a:rPr lang="en-US" dirty="0">
+                <a:latin typeface="Consolas" panose="020B0609020204030204" pitchFamily="49" charset="0"/>
+              </a:rPr>
+              <a:t> Macaroons with Bittersweet Chocolate </a:t>
+            </a:r>
+          </a:p>
+          <a:p>
+            <a:pPr marL="0" indent="0">
+              <a:buNone/>
+              <a:tabLst>
+                <a:tab pos="9604375" algn="l"/>
+              </a:tabLst>
+            </a:pPr>
+            <a:r>
+              <a:rPr lang="en-US" dirty="0">
+                <a:latin typeface="Consolas" panose="020B0609020204030204" pitchFamily="49" charset="0"/>
+              </a:rPr>
+              <a:t>Ganache - 130-132; </a:t>
+            </a:r>
+            <a:r>
+              <a:rPr lang="en-US" dirty="0">
+                <a:solidFill>
+                  <a:srgbClr val="FF0000"/>
+                </a:solidFill>
+                <a:latin typeface="Consolas" panose="020B0609020204030204" pitchFamily="49" charset="0"/>
+              </a:rPr>
+              <a:t>[1]</a:t>
+            </a:r>
+            <a:r>
+              <a:rPr lang="en-US" dirty="0">
+                <a:latin typeface="Consolas" panose="020B0609020204030204" pitchFamily="49" charset="0"/>
+              </a:rPr>
+              <a:t> </a:t>
+            </a:r>
+            <a:r>
+              <a:rPr lang="en-US" dirty="0" err="1">
+                <a:latin typeface="Consolas" panose="020B0609020204030204" pitchFamily="49" charset="0"/>
+              </a:rPr>
+              <a:t>Craquline</a:t>
+            </a:r>
+            <a:r>
+              <a:rPr lang="en-US" dirty="0">
+                <a:latin typeface="Consolas" panose="020B0609020204030204" pitchFamily="49" charset="0"/>
+              </a:rPr>
+              <a:t> - 82-83; </a:t>
+            </a:r>
+            <a:r>
+              <a:rPr lang="en-US" dirty="0">
+                <a:solidFill>
+                  <a:srgbClr val="FF0000"/>
+                </a:solidFill>
+                <a:latin typeface="Consolas" panose="020B0609020204030204" pitchFamily="49" charset="0"/>
+              </a:rPr>
+              <a:t>[1]</a:t>
+            </a:r>
+            <a:r>
+              <a:rPr lang="en-US" dirty="0">
+                <a:latin typeface="Consolas" panose="020B0609020204030204" pitchFamily="49" charset="0"/>
+              </a:rPr>
+              <a:t> Frangipane – 239; </a:t>
+            </a:r>
+            <a:r>
+              <a:rPr lang="en-US" dirty="0">
+                <a:solidFill>
+                  <a:srgbClr val="FF0000"/>
+                </a:solidFill>
+                <a:latin typeface="Consolas" panose="020B0609020204030204" pitchFamily="49" charset="0"/>
+              </a:rPr>
+              <a:t>[1]</a:t>
+            </a:r>
+            <a:r>
+              <a:rPr lang="en-US" dirty="0">
+                <a:latin typeface="Consolas" panose="020B0609020204030204" pitchFamily="49" charset="0"/>
+              </a:rPr>
+              <a:t>-Hazel</a:t>
+            </a:r>
+            <a:r>
+              <a:rPr lang="en-US" dirty="0">
+                <a:solidFill>
+                  <a:srgbClr val="7030A0"/>
+                </a:solidFill>
+                <a:latin typeface="Consolas" panose="020B0609020204030204" pitchFamily="49" charset="0"/>
+              </a:rPr>
+              <a:t>{2}</a:t>
+            </a:r>
+            <a:r>
+              <a:rPr lang="en-US" dirty="0">
+                <a:latin typeface="Consolas" panose="020B0609020204030204" pitchFamily="49" charset="0"/>
+              </a:rPr>
+              <a:t> </a:t>
+            </a:r>
+          </a:p>
+          <a:p>
+            <a:pPr marL="0" indent="0">
+              <a:buNone/>
+              <a:tabLst>
+                <a:tab pos="9604375" algn="l"/>
+              </a:tabLst>
+            </a:pPr>
+            <a:r>
+              <a:rPr lang="en-US" dirty="0">
+                <a:latin typeface="Consolas" panose="020B0609020204030204" pitchFamily="49" charset="0"/>
+              </a:rPr>
+              <a:t>Dacquoise - 196-199; </a:t>
+            </a:r>
+            <a:r>
+              <a:rPr lang="en-US" dirty="0">
+                <a:solidFill>
+                  <a:srgbClr val="FF0000"/>
+                </a:solidFill>
+                <a:latin typeface="Consolas" panose="020B0609020204030204" pitchFamily="49" charset="0"/>
+              </a:rPr>
+              <a:t>[1]</a:t>
+            </a:r>
+            <a:r>
+              <a:rPr lang="en-US" dirty="0">
+                <a:latin typeface="Consolas" panose="020B0609020204030204" pitchFamily="49" charset="0"/>
+              </a:rPr>
+              <a:t> Meringue Clouds - 126-127; </a:t>
+            </a:r>
+            <a:r>
+              <a:rPr lang="en-US" dirty="0">
+                <a:solidFill>
+                  <a:srgbClr val="FF0000"/>
+                </a:solidFill>
+                <a:latin typeface="Consolas" panose="020B0609020204030204" pitchFamily="49" charset="0"/>
+              </a:rPr>
+              <a:t>[1]</a:t>
+            </a:r>
+            <a:r>
+              <a:rPr lang="en-US" dirty="0">
+                <a:latin typeface="Consolas" panose="020B0609020204030204" pitchFamily="49" charset="0"/>
+              </a:rPr>
+              <a:t> Mixed Nut Brittle - 284-285; </a:t>
+            </a:r>
+          </a:p>
+          <a:p>
+            <a:pPr marL="0" indent="0">
+              <a:buNone/>
+              <a:tabLst>
+                <a:tab pos="9604375" algn="l"/>
+              </a:tabLst>
+            </a:pPr>
+            <a:r>
+              <a:rPr lang="en-US" dirty="0">
+                <a:solidFill>
+                  <a:srgbClr val="FF0000"/>
+                </a:solidFill>
+                <a:latin typeface="Consolas" panose="020B0609020204030204" pitchFamily="49" charset="0"/>
+              </a:rPr>
+              <a:t>[1]</a:t>
+            </a:r>
+            <a:r>
+              <a:rPr lang="en-US" dirty="0">
+                <a:latin typeface="Consolas" panose="020B0609020204030204" pitchFamily="49" charset="0"/>
+              </a:rPr>
+              <a:t> </a:t>
+            </a:r>
+            <a:r>
+              <a:rPr lang="en-US" dirty="0">
+                <a:solidFill>
+                  <a:schemeClr val="accent1"/>
+                </a:solidFill>
+                <a:latin typeface="Consolas" panose="020B0609020204030204" pitchFamily="49" charset="0"/>
+              </a:rPr>
+              <a:t>{3}</a:t>
+            </a:r>
+            <a:r>
+              <a:rPr lang="en-US" dirty="0">
+                <a:latin typeface="Consolas" panose="020B0609020204030204" pitchFamily="49" charset="0"/>
+              </a:rPr>
+              <a:t> – 101; </a:t>
+            </a:r>
+            <a:r>
+              <a:rPr lang="en-US" dirty="0">
+                <a:solidFill>
+                  <a:srgbClr val="FF0000"/>
+                </a:solidFill>
+                <a:latin typeface="Consolas" panose="020B0609020204030204" pitchFamily="49" charset="0"/>
+              </a:rPr>
+              <a:t>[1]</a:t>
+            </a:r>
+            <a:r>
+              <a:rPr lang="en-US" dirty="0">
+                <a:latin typeface="Consolas" panose="020B0609020204030204" pitchFamily="49" charset="0"/>
+              </a:rPr>
+              <a:t> </a:t>
+            </a:r>
+            <a:r>
+              <a:rPr lang="en-US" dirty="0" err="1">
+                <a:latin typeface="Consolas" panose="020B0609020204030204" pitchFamily="49" charset="0"/>
+              </a:rPr>
+              <a:t>Ooey</a:t>
+            </a:r>
+            <a:r>
+              <a:rPr lang="en-US" dirty="0">
+                <a:latin typeface="Consolas" panose="020B0609020204030204" pitchFamily="49" charset="0"/>
+              </a:rPr>
+              <a:t>, Gooey </a:t>
+            </a:r>
+            <a:r>
+              <a:rPr lang="en-US" dirty="0">
+                <a:solidFill>
+                  <a:srgbClr val="FFC000"/>
+                </a:solidFill>
+                <a:latin typeface="Consolas" panose="020B0609020204030204" pitchFamily="49" charset="0"/>
+              </a:rPr>
+              <a:t>{4}</a:t>
+            </a:r>
+            <a:r>
+              <a:rPr lang="en-US" dirty="0">
+                <a:latin typeface="Consolas" panose="020B0609020204030204" pitchFamily="49" charset="0"/>
+              </a:rPr>
+              <a:t>-</a:t>
+            </a:r>
+            <a:r>
+              <a:rPr lang="en-US" dirty="0">
+                <a:solidFill>
+                  <a:srgbClr val="7030A0"/>
+                </a:solidFill>
+                <a:latin typeface="Consolas" panose="020B0609020204030204" pitchFamily="49" charset="0"/>
+              </a:rPr>
+              <a:t>{2}</a:t>
+            </a:r>
+            <a:r>
+              <a:rPr lang="en-US" dirty="0">
+                <a:latin typeface="Consolas" panose="020B0609020204030204" pitchFamily="49" charset="0"/>
+              </a:rPr>
+              <a:t> Tart - 228-229; </a:t>
+            </a:r>
+            <a:r>
+              <a:rPr lang="en-US" dirty="0">
+                <a:solidFill>
+                  <a:srgbClr val="FF0000"/>
+                </a:solidFill>
+                <a:latin typeface="Consolas" panose="020B0609020204030204" pitchFamily="49" charset="0"/>
+              </a:rPr>
+              <a:t>[1]</a:t>
+            </a:r>
+            <a:r>
+              <a:rPr lang="en-US" dirty="0">
+                <a:latin typeface="Consolas" panose="020B0609020204030204" pitchFamily="49" charset="0"/>
+              </a:rPr>
+              <a:t> Roasted Pear and Cranberry</a:t>
+            </a:r>
+          </a:p>
+          <a:p>
+            <a:pPr marL="0" indent="0">
+              <a:buNone/>
+              <a:tabLst>
+                <a:tab pos="9604375" algn="l"/>
+              </a:tabLst>
+            </a:pPr>
+            <a:r>
+              <a:rPr lang="en-US" dirty="0">
+                <a:latin typeface="Consolas" panose="020B0609020204030204" pitchFamily="49" charset="0"/>
+              </a:rPr>
+              <a:t>Crostata - 237-239; </a:t>
+            </a:r>
+            <a:r>
+              <a:rPr lang="en-US" dirty="0">
+                <a:solidFill>
+                  <a:srgbClr val="FF0000"/>
+                </a:solidFill>
+                <a:latin typeface="Consolas" panose="020B0609020204030204" pitchFamily="49" charset="0"/>
+              </a:rPr>
+              <a:t>[1]</a:t>
+            </a:r>
+            <a:r>
+              <a:rPr lang="en-US" dirty="0">
+                <a:latin typeface="Consolas" panose="020B0609020204030204" pitchFamily="49" charset="0"/>
+              </a:rPr>
+              <a:t> roasting – 34; Angel Food Cake with Toasted Coco</a:t>
+            </a:r>
+            <a:r>
+              <a:rPr lang="en-US" dirty="0">
+                <a:solidFill>
+                  <a:srgbClr val="7030A0"/>
+                </a:solidFill>
+                <a:latin typeface="Consolas" panose="020B0609020204030204" pitchFamily="49" charset="0"/>
+              </a:rPr>
+              <a:t>{2}</a:t>
+            </a:r>
+            <a:r>
+              <a:rPr lang="en-US" dirty="0">
+                <a:latin typeface="Consolas" panose="020B0609020204030204" pitchFamily="49" charset="0"/>
+              </a:rPr>
+              <a:t> – 178-179;</a:t>
+            </a:r>
+          </a:p>
+          <a:p>
+            <a:pPr marL="0" indent="0">
+              <a:buNone/>
+              <a:tabLst>
+                <a:tab pos="9604375" algn="l"/>
+              </a:tabLst>
+            </a:pPr>
+            <a:r>
+              <a:rPr lang="en-US" dirty="0">
+                <a:solidFill>
+                  <a:srgbClr val="00B0F0"/>
+                </a:solidFill>
+                <a:latin typeface="Consolas" panose="020B0609020204030204" pitchFamily="49" charset="0"/>
+              </a:rPr>
+              <a:t>{5}</a:t>
+            </a:r>
+            <a:r>
+              <a:rPr lang="en-US" dirty="0">
+                <a:latin typeface="Consolas" panose="020B0609020204030204" pitchFamily="49" charset="0"/>
+              </a:rPr>
+              <a:t> and Quince Tarte Tatin – 233-235; </a:t>
+            </a:r>
+            <a:r>
+              <a:rPr lang="en-US" dirty="0">
+                <a:solidFill>
+                  <a:srgbClr val="00B0F0"/>
+                </a:solidFill>
+                <a:latin typeface="Consolas" panose="020B0609020204030204" pitchFamily="49" charset="0"/>
+              </a:rPr>
+              <a:t>{5}</a:t>
+            </a:r>
+            <a:r>
+              <a:rPr lang="en-US" dirty="0">
+                <a:latin typeface="Consolas" panose="020B0609020204030204" pitchFamily="49" charset="0"/>
+              </a:rPr>
+              <a:t>, Cinnamon, and Brown Sugar Filling – 90; </a:t>
+            </a:r>
+            <a:r>
+              <a:rPr lang="en-US" dirty="0">
+                <a:solidFill>
+                  <a:srgbClr val="00B0F0"/>
+                </a:solidFill>
+                <a:latin typeface="Consolas" panose="020B0609020204030204" pitchFamily="49" charset="0"/>
+              </a:rPr>
+              <a:t>{5}</a:t>
+            </a:r>
+            <a:r>
+              <a:rPr lang="en-US" dirty="0">
+                <a:latin typeface="Consolas" panose="020B0609020204030204" pitchFamily="49" charset="0"/>
+              </a:rPr>
+              <a:t> </a:t>
+            </a:r>
+          </a:p>
+          <a:p>
+            <a:pPr marL="0" indent="0">
+              <a:buNone/>
+              <a:tabLst>
+                <a:tab pos="9604375" algn="l"/>
+              </a:tabLst>
+            </a:pPr>
+            <a:r>
+              <a:rPr lang="en-US" dirty="0">
+                <a:latin typeface="Consolas" panose="020B0609020204030204" pitchFamily="49" charset="0"/>
+              </a:rPr>
+              <a:t>Snacking Spice Cake – 64-65; </a:t>
+            </a:r>
+            <a:r>
+              <a:rPr lang="en-US" dirty="0">
+                <a:solidFill>
+                  <a:srgbClr val="00B0F0"/>
+                </a:solidFill>
+                <a:latin typeface="Consolas" panose="020B0609020204030204" pitchFamily="49" charset="0"/>
+              </a:rPr>
+              <a:t>{5}</a:t>
+            </a:r>
+            <a:r>
+              <a:rPr lang="en-US" dirty="0">
+                <a:latin typeface="Consolas" panose="020B0609020204030204" pitchFamily="49" charset="0"/>
+              </a:rPr>
+              <a:t>-Raisin Charlottes with Vanilla </a:t>
+            </a:r>
+            <a:r>
+              <a:rPr lang="en-US" dirty="0">
+                <a:solidFill>
+                  <a:srgbClr val="FFC000"/>
+                </a:solidFill>
+                <a:latin typeface="Consolas" panose="020B0609020204030204" pitchFamily="49" charset="0"/>
+              </a:rPr>
+              <a:t>{4}</a:t>
+            </a:r>
+            <a:r>
+              <a:rPr lang="en-US" dirty="0">
+                <a:latin typeface="Consolas" panose="020B0609020204030204" pitchFamily="49" charset="0"/>
+              </a:rPr>
+              <a:t> Sauce – 272-273; </a:t>
+            </a:r>
+          </a:p>
+          <a:p>
+            <a:pPr marL="0" indent="0">
+              <a:buNone/>
+              <a:tabLst>
+                <a:tab pos="9604375" algn="l"/>
+              </a:tabLst>
+            </a:pPr>
+            <a:r>
+              <a:rPr lang="en-US" dirty="0">
+                <a:latin typeface="Consolas" panose="020B0609020204030204" pitchFamily="49" charset="0"/>
+              </a:rPr>
+              <a:t>Double Two-</a:t>
+            </a:r>
+            <a:r>
+              <a:rPr lang="en-US" dirty="0">
+                <a:solidFill>
+                  <a:srgbClr val="00B0F0"/>
+                </a:solidFill>
+                <a:latin typeface="Consolas" panose="020B0609020204030204" pitchFamily="49" charset="0"/>
+              </a:rPr>
+              <a:t>{5}</a:t>
+            </a:r>
+            <a:r>
+              <a:rPr lang="en-US" dirty="0">
+                <a:latin typeface="Consolas" panose="020B0609020204030204" pitchFamily="49" charset="0"/>
+              </a:rPr>
+              <a:t> Pie – 203-205; </a:t>
+            </a:r>
+            <a:r>
+              <a:rPr lang="en-US" dirty="0">
+                <a:solidFill>
+                  <a:srgbClr val="00B0F0"/>
+                </a:solidFill>
+                <a:latin typeface="Consolas" panose="020B0609020204030204" pitchFamily="49" charset="0"/>
+              </a:rPr>
+              <a:t>{5}</a:t>
+            </a:r>
+            <a:r>
+              <a:rPr lang="en-US" dirty="0">
+                <a:latin typeface="Consolas" panose="020B0609020204030204" pitchFamily="49" charset="0"/>
+              </a:rPr>
+              <a:t> Good Morning </a:t>
+            </a:r>
+            <a:r>
+              <a:rPr lang="en-US" dirty="0">
+                <a:solidFill>
+                  <a:srgbClr val="FF6600"/>
+                </a:solidFill>
+                <a:latin typeface="Consolas" panose="020B0609020204030204" pitchFamily="49" charset="0"/>
+              </a:rPr>
+              <a:t>{9}</a:t>
+            </a:r>
+            <a:r>
+              <a:rPr lang="en-US" dirty="0">
+                <a:latin typeface="Consolas" panose="020B0609020204030204" pitchFamily="49" charset="0"/>
+              </a:rPr>
+              <a:t> – 60-61; </a:t>
+            </a:r>
+            <a:r>
+              <a:rPr lang="en-US" dirty="0">
+                <a:solidFill>
+                  <a:srgbClr val="00B0F0"/>
+                </a:solidFill>
+                <a:latin typeface="Consolas" panose="020B0609020204030204" pitchFamily="49" charset="0"/>
+              </a:rPr>
+              <a:t>{5}</a:t>
+            </a:r>
+            <a:r>
+              <a:rPr lang="en-US" dirty="0">
+                <a:latin typeface="Consolas" panose="020B0609020204030204" pitchFamily="49" charset="0"/>
+              </a:rPr>
+              <a:t> </a:t>
+            </a:r>
+            <a:r>
+              <a:rPr lang="en-US" dirty="0">
+                <a:solidFill>
+                  <a:schemeClr val="accent1"/>
+                </a:solidFill>
+                <a:latin typeface="Consolas" panose="020B0609020204030204" pitchFamily="49" charset="0"/>
+              </a:rPr>
+              <a:t>{3}</a:t>
+            </a:r>
+            <a:r>
+              <a:rPr lang="en-US" dirty="0">
+                <a:latin typeface="Consolas" panose="020B0609020204030204" pitchFamily="49" charset="0"/>
+              </a:rPr>
+              <a:t> Bars – 154-156; </a:t>
+            </a:r>
+          </a:p>
+          <a:p>
+            <a:pPr marL="0" indent="0">
+              <a:buNone/>
+              <a:tabLst>
+                <a:tab pos="9604375" algn="l"/>
+              </a:tabLst>
+            </a:pPr>
+            <a:r>
+              <a:rPr lang="en-US" dirty="0">
+                <a:solidFill>
+                  <a:srgbClr val="00B0F0"/>
+                </a:solidFill>
+                <a:latin typeface="Consolas" panose="020B0609020204030204" pitchFamily="49" charset="0"/>
+              </a:rPr>
+              <a:t>{5}</a:t>
+            </a:r>
+            <a:r>
+              <a:rPr lang="en-US" dirty="0">
+                <a:latin typeface="Consolas" panose="020B0609020204030204" pitchFamily="49" charset="0"/>
+              </a:rPr>
+              <a:t> Heart-Healthy Dried Fruit Scones – 50-51; </a:t>
+            </a:r>
+            <a:r>
+              <a:rPr lang="en-US" dirty="0">
+                <a:solidFill>
+                  <a:srgbClr val="00B0F0"/>
+                </a:solidFill>
+                <a:latin typeface="Consolas" panose="020B0609020204030204" pitchFamily="49" charset="0"/>
+              </a:rPr>
+              <a:t>{5}</a:t>
+            </a:r>
+            <a:r>
+              <a:rPr lang="en-US" dirty="0">
+                <a:latin typeface="Consolas" panose="020B0609020204030204" pitchFamily="49" charset="0"/>
+              </a:rPr>
+              <a:t> Homemade Pop-Tarts – 88-91; Bacon and</a:t>
+            </a:r>
+          </a:p>
+          <a:p>
+            <a:pPr marL="0" indent="0">
+              <a:buNone/>
+              <a:tabLst>
+                <a:tab pos="9604375" algn="l"/>
+              </a:tabLst>
+            </a:pPr>
+            <a:r>
+              <a:rPr lang="en-US" dirty="0">
+                <a:solidFill>
+                  <a:srgbClr val="FFC000"/>
+                </a:solidFill>
+                <a:latin typeface="Consolas" panose="020B0609020204030204" pitchFamily="49" charset="0"/>
+              </a:rPr>
+              <a:t>{4}</a:t>
+            </a:r>
+            <a:r>
+              <a:rPr lang="en-US" dirty="0" err="1">
+                <a:latin typeface="Consolas" panose="020B0609020204030204" pitchFamily="49" charset="0"/>
+              </a:rPr>
+              <a:t>ized</a:t>
+            </a:r>
+            <a:r>
+              <a:rPr lang="en-US" dirty="0">
+                <a:latin typeface="Consolas" panose="020B0609020204030204" pitchFamily="49" charset="0"/>
+              </a:rPr>
+              <a:t> Onion Quiche – 241; </a:t>
+            </a:r>
+            <a:r>
+              <a:rPr lang="en-US" dirty="0">
+                <a:solidFill>
+                  <a:srgbClr val="00B050"/>
+                </a:solidFill>
+                <a:latin typeface="Consolas" panose="020B0609020204030204" pitchFamily="49" charset="0"/>
+              </a:rPr>
+              <a:t>{6}</a:t>
+            </a:r>
+            <a:r>
+              <a:rPr lang="en-US" dirty="0">
+                <a:latin typeface="Consolas" panose="020B0609020204030204" pitchFamily="49" charset="0"/>
+              </a:rPr>
+              <a:t> pans – 21-22; </a:t>
+            </a:r>
+            <a:r>
+              <a:rPr lang="en-US" dirty="0">
+                <a:solidFill>
+                  <a:srgbClr val="00B050"/>
+                </a:solidFill>
+                <a:latin typeface="Consolas" panose="020B0609020204030204" pitchFamily="49" charset="0"/>
+              </a:rPr>
+              <a:t>{6}</a:t>
+            </a:r>
+            <a:r>
+              <a:rPr lang="en-US" dirty="0">
+                <a:latin typeface="Consolas" panose="020B0609020204030204" pitchFamily="49" charset="0"/>
+              </a:rPr>
+              <a:t> sheets – 22; </a:t>
+            </a:r>
+            <a:r>
+              <a:rPr lang="en-US" dirty="0">
+                <a:solidFill>
+                  <a:srgbClr val="00B050"/>
+                </a:solidFill>
+                <a:latin typeface="Consolas" panose="020B0609020204030204" pitchFamily="49" charset="0"/>
+              </a:rPr>
+              <a:t>{6}</a:t>
+            </a:r>
+            <a:r>
+              <a:rPr lang="en-US" dirty="0">
+                <a:latin typeface="Consolas" panose="020B0609020204030204" pitchFamily="49" charset="0"/>
+              </a:rPr>
+              <a:t> tips – 31-37; </a:t>
+            </a:r>
+            <a:r>
+              <a:rPr lang="en-US" dirty="0">
+                <a:solidFill>
+                  <a:schemeClr val="tx1">
+                    <a:lumMod val="50000"/>
+                    <a:lumOff val="50000"/>
+                  </a:schemeClr>
+                </a:solidFill>
+                <a:latin typeface="Consolas" panose="020B0609020204030204" pitchFamily="49" charset="0"/>
+              </a:rPr>
+              <a:t>{7}</a:t>
+            </a:r>
+            <a:r>
+              <a:rPr lang="en-US" dirty="0">
+                <a:solidFill>
+                  <a:srgbClr val="FF33CC"/>
+                </a:solidFill>
+                <a:latin typeface="Consolas" panose="020B0609020204030204" pitchFamily="49" charset="0"/>
+              </a:rPr>
+              <a:t> </a:t>
+            </a:r>
+          </a:p>
+          <a:p>
+            <a:pPr marL="0" indent="0">
+              <a:buNone/>
+              <a:tabLst>
+                <a:tab pos="9604375" algn="l"/>
+              </a:tabLst>
+            </a:pPr>
+            <a:r>
+              <a:rPr lang="en-US" dirty="0">
+                <a:solidFill>
+                  <a:srgbClr val="FF33CC"/>
+                </a:solidFill>
+                <a:latin typeface="Consolas" panose="020B0609020204030204" pitchFamily="49" charset="0"/>
+              </a:rPr>
+              <a:t>{8}</a:t>
+            </a:r>
+            <a:r>
+              <a:rPr lang="en-US" dirty="0">
+                <a:latin typeface="Consolas" panose="020B0609020204030204" pitchFamily="49" charset="0"/>
+              </a:rPr>
+              <a:t> Pudding – 254-255; </a:t>
+            </a:r>
+            <a:r>
+              <a:rPr lang="en-US" dirty="0">
+                <a:solidFill>
+                  <a:schemeClr val="tx1">
+                    <a:lumMod val="50000"/>
+                    <a:lumOff val="50000"/>
+                  </a:schemeClr>
+                </a:solidFill>
+                <a:latin typeface="Consolas" panose="020B0609020204030204" pitchFamily="49" charset="0"/>
+              </a:rPr>
+              <a:t>{7}</a:t>
+            </a:r>
+            <a:r>
+              <a:rPr lang="en-US" dirty="0">
+                <a:latin typeface="Consolas" panose="020B0609020204030204" pitchFamily="49" charset="0"/>
+              </a:rPr>
+              <a:t> </a:t>
+            </a:r>
+            <a:r>
+              <a:rPr lang="en-US" dirty="0">
+                <a:solidFill>
+                  <a:srgbClr val="FF33CC"/>
+                </a:solidFill>
+                <a:latin typeface="Consolas" panose="020B0609020204030204" pitchFamily="49" charset="0"/>
+              </a:rPr>
+              <a:t>{8}</a:t>
+            </a:r>
+            <a:r>
+              <a:rPr lang="en-US" dirty="0">
+                <a:latin typeface="Consolas" panose="020B0609020204030204" pitchFamily="49" charset="0"/>
+              </a:rPr>
+              <a:t> – 66; Basic Brioche – 73-74;</a:t>
+            </a:r>
+          </a:p>
+          <a:p>
+            <a:pPr marL="0" indent="0">
+              <a:buNone/>
+              <a:tabLst>
+                <a:tab pos="9604375" algn="l"/>
+              </a:tabLst>
+            </a:pPr>
+            <a:endParaRPr lang="en-US" dirty="0">
+              <a:latin typeface="Consolas" panose="020B0609020204030204" pitchFamily="49" charset="0"/>
+            </a:endParaRPr>
+          </a:p>
+        </p:txBody>
+      </p:sp>
+    </p:spTree>
+    <p:extLst>
+      <p:ext uri="{BB962C8B-B14F-4D97-AF65-F5344CB8AC3E}">
+        <p14:creationId xmlns:p14="http://schemas.microsoft.com/office/powerpoint/2010/main" val="1269145179"/>
+      </p:ext>
+    </p:extLst>
+  </p:cSld>
+  <p:clrMapOvr>
+    <a:masterClrMapping/>
+  </p:clrMapOvr>
+</p:sld>
+</file>
+
 <file path=ppt/slides/slide4.xml><?xml version="1.0" encoding="utf-8"?>
 <p:sld xmlns:a="http://schemas.openxmlformats.org/drawingml/2006/main" xmlns:r="http://schemas.openxmlformats.org/officeDocument/2006/relationships" xmlns:p="http://schemas.openxmlformats.org/presentationml/2006/main">
   <p:cSld>
@@ -22078,950 +22932,6 @@
       </p:grpSpPr>
       <p:sp>
         <p:nvSpPr>
-          <p:cNvPr id="7" name="Title 6"/>
-          <p:cNvSpPr>
-            <a:spLocks noGrp="1"/>
-          </p:cNvSpPr>
-          <p:nvPr>
-            <p:ph type="title" idx="4294967295"/>
-          </p:nvPr>
-        </p:nvSpPr>
-        <p:spPr>
-          <a:xfrm>
-            <a:off x="216877" y="166447"/>
-            <a:ext cx="11975123" cy="669925"/>
-          </a:xfrm>
-        </p:spPr>
-        <p:txBody>
-          <a:bodyPr>
-            <a:normAutofit fontScale="90000"/>
-          </a:bodyPr>
-          <a:lstStyle/>
-          <a:p>
-            <a:r>
-              <a:rPr lang="en-US" dirty="0"/>
-              <a:t>Page-Compressed Index </a:t>
-            </a:r>
-            <a:r>
-              <a:rPr lang="en-US" sz="2700" dirty="0"/>
-              <a:t>(from </a:t>
-            </a:r>
-            <a:r>
-              <a:rPr lang="en-US" sz="2700" i="1" dirty="0"/>
-              <a:t>Flour</a:t>
-            </a:r>
-            <a:r>
-              <a:rPr lang="en-US" sz="2700" dirty="0"/>
-              <a:t> cookbook by Joanne Chang)</a:t>
-            </a:r>
-          </a:p>
-        </p:txBody>
-      </p:sp>
-      <p:sp>
-        <p:nvSpPr>
-          <p:cNvPr id="8" name="Content Placeholder 7"/>
-          <p:cNvSpPr>
-            <a:spLocks noGrp="1"/>
-          </p:cNvSpPr>
-          <p:nvPr>
-            <p:ph idx="4294967295"/>
-          </p:nvPr>
-        </p:nvSpPr>
-        <p:spPr>
-          <a:xfrm>
-            <a:off x="657225" y="1028700"/>
-            <a:ext cx="11534775" cy="5486400"/>
-          </a:xfrm>
-        </p:spPr>
-        <p:txBody>
-          <a:bodyPr numCol="1">
-            <a:normAutofit fontScale="47500" lnSpcReduction="20000"/>
-          </a:bodyPr>
-          <a:lstStyle/>
-          <a:p>
-            <a:pPr marL="0" indent="0">
-              <a:buNone/>
-              <a:tabLst>
-                <a:tab pos="9604375" algn="l"/>
-              </a:tabLst>
-            </a:pPr>
-            <a:r>
-              <a:rPr lang="en-US" dirty="0">
-                <a:solidFill>
-                  <a:srgbClr val="FF0000"/>
-                </a:solidFill>
-                <a:latin typeface="Consolas" panose="020B0609020204030204" pitchFamily="49" charset="0"/>
-              </a:rPr>
-              <a:t>[Almond]</a:t>
-            </a:r>
-            <a:r>
-              <a:rPr lang="en-US" dirty="0">
-                <a:solidFill>
-                  <a:srgbClr val="7030A0"/>
-                </a:solidFill>
-                <a:latin typeface="Consolas" panose="020B0609020204030204" pitchFamily="49" charset="0"/>
-              </a:rPr>
-              <a:t>{nut}</a:t>
-            </a:r>
-            <a:r>
-              <a:rPr lang="en-US" dirty="0">
-                <a:solidFill>
-                  <a:schemeClr val="accent1"/>
-                </a:solidFill>
-                <a:latin typeface="Consolas" panose="020B0609020204030204" pitchFamily="49" charset="0"/>
-              </a:rPr>
-              <a:t>{Granola}</a:t>
-            </a:r>
-            <a:r>
-              <a:rPr lang="en-US" dirty="0">
-                <a:solidFill>
-                  <a:srgbClr val="FFC000"/>
-                </a:solidFill>
-                <a:latin typeface="Consolas" panose="020B0609020204030204" pitchFamily="49" charset="0"/>
-              </a:rPr>
-              <a:t>{Caramel}</a:t>
-            </a:r>
-            <a:r>
-              <a:rPr lang="en-US" dirty="0">
-                <a:solidFill>
-                  <a:srgbClr val="00B0F0"/>
-                </a:solidFill>
-                <a:latin typeface="Consolas" panose="020B0609020204030204" pitchFamily="49" charset="0"/>
-              </a:rPr>
-              <a:t>{Apple}</a:t>
-            </a:r>
-            <a:r>
-              <a:rPr lang="en-US" dirty="0">
-                <a:solidFill>
-                  <a:srgbClr val="00B050"/>
-                </a:solidFill>
-                <a:latin typeface="Consolas" panose="020B0609020204030204" pitchFamily="49" charset="0"/>
-              </a:rPr>
-              <a:t>{Baking}</a:t>
-            </a:r>
-            <a:r>
-              <a:rPr lang="en-US" dirty="0">
-                <a:solidFill>
-                  <a:schemeClr val="tx1">
-                    <a:lumMod val="50000"/>
-                    <a:lumOff val="50000"/>
-                  </a:schemeClr>
-                </a:solidFill>
-                <a:latin typeface="Consolas" panose="020B0609020204030204" pitchFamily="49" charset="0"/>
-              </a:rPr>
-              <a:t>{Banana}</a:t>
-            </a:r>
-            <a:r>
-              <a:rPr lang="en-US" dirty="0">
-                <a:solidFill>
-                  <a:srgbClr val="FF33CC"/>
-                </a:solidFill>
-                <a:latin typeface="Consolas" panose="020B0609020204030204" pitchFamily="49" charset="0"/>
-              </a:rPr>
-              <a:t>{Bread}</a:t>
-            </a:r>
-            <a:r>
-              <a:rPr lang="en-US" dirty="0">
-                <a:solidFill>
-                  <a:srgbClr val="FF6600"/>
-                </a:solidFill>
-                <a:latin typeface="Consolas" panose="020B0609020204030204" pitchFamily="49" charset="0"/>
-              </a:rPr>
-              <a:t>{Muffins}</a:t>
-            </a:r>
-          </a:p>
-          <a:p>
-            <a:pPr marL="0" indent="0">
-              <a:buNone/>
-              <a:tabLst>
-                <a:tab pos="9604375" algn="l"/>
-              </a:tabLst>
-            </a:pPr>
-            <a:r>
-              <a:rPr lang="en-US" dirty="0">
-                <a:latin typeface="Consolas" panose="020B0609020204030204" pitchFamily="49" charset="0"/>
-              </a:rPr>
-              <a:t>Addictive Bran Muffins with Golden Raisins and “Bird Seed” – 58-59; </a:t>
-            </a:r>
-            <a:r>
-              <a:rPr lang="en-US" dirty="0">
-                <a:solidFill>
-                  <a:srgbClr val="FF0000"/>
-                </a:solidFill>
-                <a:latin typeface="Consolas" panose="020B0609020204030204" pitchFamily="49" charset="0"/>
-              </a:rPr>
-              <a:t>[1] </a:t>
-            </a:r>
-            <a:r>
-              <a:rPr lang="en-US" dirty="0">
-                <a:latin typeface="Consolas" panose="020B0609020204030204" pitchFamily="49" charset="0"/>
-              </a:rPr>
-              <a:t>and Anise </a:t>
-            </a:r>
-          </a:p>
-          <a:p>
-            <a:pPr marL="0" indent="0">
-              <a:buNone/>
-              <a:tabLst>
-                <a:tab pos="9604375" algn="l"/>
-              </a:tabLst>
-            </a:pPr>
-            <a:r>
-              <a:rPr lang="en-US" dirty="0">
-                <a:latin typeface="Consolas" panose="020B0609020204030204" pitchFamily="49" charset="0"/>
-              </a:rPr>
-              <a:t>Biscotti - 128-129; </a:t>
-            </a:r>
-            <a:r>
-              <a:rPr lang="en-US" dirty="0">
-                <a:solidFill>
-                  <a:srgbClr val="FF0000"/>
-                </a:solidFill>
-                <a:latin typeface="Consolas" panose="020B0609020204030204" pitchFamily="49" charset="0"/>
-              </a:rPr>
-              <a:t>[1]</a:t>
-            </a:r>
-            <a:r>
-              <a:rPr lang="en-US" dirty="0">
-                <a:latin typeface="Consolas" panose="020B0609020204030204" pitchFamily="49" charset="0"/>
-              </a:rPr>
-              <a:t>-Apricot </a:t>
-            </a:r>
-            <a:r>
-              <a:rPr lang="en-US" dirty="0">
-                <a:solidFill>
-                  <a:srgbClr val="FF6600"/>
-                </a:solidFill>
-                <a:latin typeface="Consolas" panose="020B0609020204030204" pitchFamily="49" charset="0"/>
-              </a:rPr>
-              <a:t>{9}</a:t>
-            </a:r>
-            <a:r>
-              <a:rPr lang="en-US" dirty="0">
-                <a:latin typeface="Consolas" panose="020B0609020204030204" pitchFamily="49" charset="0"/>
-              </a:rPr>
-              <a:t> – 54; </a:t>
-            </a:r>
-            <a:r>
-              <a:rPr lang="en-US" dirty="0">
-                <a:solidFill>
-                  <a:srgbClr val="FF0000"/>
-                </a:solidFill>
-                <a:latin typeface="Consolas" panose="020B0609020204030204" pitchFamily="49" charset="0"/>
-              </a:rPr>
-              <a:t>[1]</a:t>
-            </a:r>
-            <a:r>
-              <a:rPr lang="en-US" dirty="0">
-                <a:latin typeface="Consolas" panose="020B0609020204030204" pitchFamily="49" charset="0"/>
-              </a:rPr>
-              <a:t> Macaroons with Bittersweet Chocolate </a:t>
-            </a:r>
-          </a:p>
-          <a:p>
-            <a:pPr marL="0" indent="0">
-              <a:buNone/>
-              <a:tabLst>
-                <a:tab pos="9604375" algn="l"/>
-              </a:tabLst>
-            </a:pPr>
-            <a:r>
-              <a:rPr lang="en-US" dirty="0">
-                <a:latin typeface="Consolas" panose="020B0609020204030204" pitchFamily="49" charset="0"/>
-              </a:rPr>
-              <a:t>Ganache - 130-132; </a:t>
-            </a:r>
-            <a:r>
-              <a:rPr lang="en-US" dirty="0">
-                <a:solidFill>
-                  <a:srgbClr val="FF0000"/>
-                </a:solidFill>
-                <a:latin typeface="Consolas" panose="020B0609020204030204" pitchFamily="49" charset="0"/>
-              </a:rPr>
-              <a:t>[1]</a:t>
-            </a:r>
-            <a:r>
-              <a:rPr lang="en-US" dirty="0">
-                <a:latin typeface="Consolas" panose="020B0609020204030204" pitchFamily="49" charset="0"/>
-              </a:rPr>
-              <a:t> </a:t>
-            </a:r>
-            <a:r>
-              <a:rPr lang="en-US" dirty="0" err="1">
-                <a:latin typeface="Consolas" panose="020B0609020204030204" pitchFamily="49" charset="0"/>
-              </a:rPr>
-              <a:t>Craquline</a:t>
-            </a:r>
-            <a:r>
-              <a:rPr lang="en-US" dirty="0">
-                <a:latin typeface="Consolas" panose="020B0609020204030204" pitchFamily="49" charset="0"/>
-              </a:rPr>
-              <a:t> - 82-83; </a:t>
-            </a:r>
-            <a:r>
-              <a:rPr lang="en-US" dirty="0">
-                <a:solidFill>
-                  <a:srgbClr val="FF0000"/>
-                </a:solidFill>
-                <a:latin typeface="Consolas" panose="020B0609020204030204" pitchFamily="49" charset="0"/>
-              </a:rPr>
-              <a:t>[1]</a:t>
-            </a:r>
-            <a:r>
-              <a:rPr lang="en-US" dirty="0">
-                <a:latin typeface="Consolas" panose="020B0609020204030204" pitchFamily="49" charset="0"/>
-              </a:rPr>
-              <a:t> Frangipane – 239; </a:t>
-            </a:r>
-            <a:r>
-              <a:rPr lang="en-US" dirty="0">
-                <a:solidFill>
-                  <a:srgbClr val="FF0000"/>
-                </a:solidFill>
-                <a:latin typeface="Consolas" panose="020B0609020204030204" pitchFamily="49" charset="0"/>
-              </a:rPr>
-              <a:t>[1]</a:t>
-            </a:r>
-            <a:r>
-              <a:rPr lang="en-US" dirty="0">
-                <a:latin typeface="Consolas" panose="020B0609020204030204" pitchFamily="49" charset="0"/>
-              </a:rPr>
-              <a:t>-Hazel</a:t>
-            </a:r>
-            <a:r>
-              <a:rPr lang="en-US" dirty="0">
-                <a:solidFill>
-                  <a:srgbClr val="7030A0"/>
-                </a:solidFill>
-                <a:latin typeface="Consolas" panose="020B0609020204030204" pitchFamily="49" charset="0"/>
-              </a:rPr>
-              <a:t>{2}</a:t>
-            </a:r>
-            <a:r>
-              <a:rPr lang="en-US" dirty="0">
-                <a:latin typeface="Consolas" panose="020B0609020204030204" pitchFamily="49" charset="0"/>
-              </a:rPr>
-              <a:t> </a:t>
-            </a:r>
-          </a:p>
-          <a:p>
-            <a:pPr marL="0" indent="0">
-              <a:buNone/>
-              <a:tabLst>
-                <a:tab pos="9604375" algn="l"/>
-              </a:tabLst>
-            </a:pPr>
-            <a:r>
-              <a:rPr lang="en-US" dirty="0">
-                <a:latin typeface="Consolas" panose="020B0609020204030204" pitchFamily="49" charset="0"/>
-              </a:rPr>
-              <a:t>Dacquoise - 196-199; </a:t>
-            </a:r>
-            <a:r>
-              <a:rPr lang="en-US" dirty="0">
-                <a:solidFill>
-                  <a:srgbClr val="FF0000"/>
-                </a:solidFill>
-                <a:latin typeface="Consolas" panose="020B0609020204030204" pitchFamily="49" charset="0"/>
-              </a:rPr>
-              <a:t>[1]</a:t>
-            </a:r>
-            <a:r>
-              <a:rPr lang="en-US" dirty="0">
-                <a:latin typeface="Consolas" panose="020B0609020204030204" pitchFamily="49" charset="0"/>
-              </a:rPr>
-              <a:t> Meringue Clouds - 126-127; </a:t>
-            </a:r>
-            <a:r>
-              <a:rPr lang="en-US" dirty="0">
-                <a:solidFill>
-                  <a:srgbClr val="FF0000"/>
-                </a:solidFill>
-                <a:latin typeface="Consolas" panose="020B0609020204030204" pitchFamily="49" charset="0"/>
-              </a:rPr>
-              <a:t>[1]</a:t>
-            </a:r>
-            <a:r>
-              <a:rPr lang="en-US" dirty="0">
-                <a:latin typeface="Consolas" panose="020B0609020204030204" pitchFamily="49" charset="0"/>
-              </a:rPr>
-              <a:t> Mixed Nut Brittle - 284-285; </a:t>
-            </a:r>
-          </a:p>
-          <a:p>
-            <a:pPr marL="0" indent="0">
-              <a:buNone/>
-              <a:tabLst>
-                <a:tab pos="9604375" algn="l"/>
-              </a:tabLst>
-            </a:pPr>
-            <a:r>
-              <a:rPr lang="en-US" dirty="0">
-                <a:solidFill>
-                  <a:srgbClr val="FF0000"/>
-                </a:solidFill>
-                <a:latin typeface="Consolas" panose="020B0609020204030204" pitchFamily="49" charset="0"/>
-              </a:rPr>
-              <a:t>[1]</a:t>
-            </a:r>
-            <a:r>
-              <a:rPr lang="en-US" dirty="0">
-                <a:latin typeface="Consolas" panose="020B0609020204030204" pitchFamily="49" charset="0"/>
-              </a:rPr>
-              <a:t> </a:t>
-            </a:r>
-            <a:r>
-              <a:rPr lang="en-US" dirty="0">
-                <a:solidFill>
-                  <a:schemeClr val="accent1"/>
-                </a:solidFill>
-                <a:latin typeface="Consolas" panose="020B0609020204030204" pitchFamily="49" charset="0"/>
-              </a:rPr>
-              <a:t>{3}</a:t>
-            </a:r>
-            <a:r>
-              <a:rPr lang="en-US" dirty="0">
-                <a:latin typeface="Consolas" panose="020B0609020204030204" pitchFamily="49" charset="0"/>
-              </a:rPr>
-              <a:t> – 101; </a:t>
-            </a:r>
-            <a:r>
-              <a:rPr lang="en-US" dirty="0">
-                <a:solidFill>
-                  <a:srgbClr val="FF0000"/>
-                </a:solidFill>
-                <a:latin typeface="Consolas" panose="020B0609020204030204" pitchFamily="49" charset="0"/>
-              </a:rPr>
-              <a:t>[1]</a:t>
-            </a:r>
-            <a:r>
-              <a:rPr lang="en-US" dirty="0">
-                <a:latin typeface="Consolas" panose="020B0609020204030204" pitchFamily="49" charset="0"/>
-              </a:rPr>
-              <a:t> </a:t>
-            </a:r>
-            <a:r>
-              <a:rPr lang="en-US" dirty="0" err="1">
-                <a:latin typeface="Consolas" panose="020B0609020204030204" pitchFamily="49" charset="0"/>
-              </a:rPr>
-              <a:t>Ooey</a:t>
-            </a:r>
-            <a:r>
-              <a:rPr lang="en-US" dirty="0">
-                <a:latin typeface="Consolas" panose="020B0609020204030204" pitchFamily="49" charset="0"/>
-              </a:rPr>
-              <a:t>, Gooey </a:t>
-            </a:r>
-            <a:r>
-              <a:rPr lang="en-US" dirty="0">
-                <a:solidFill>
-                  <a:srgbClr val="FFC000"/>
-                </a:solidFill>
-                <a:latin typeface="Consolas" panose="020B0609020204030204" pitchFamily="49" charset="0"/>
-              </a:rPr>
-              <a:t>{4}</a:t>
-            </a:r>
-            <a:r>
-              <a:rPr lang="en-US" dirty="0">
-                <a:latin typeface="Consolas" panose="020B0609020204030204" pitchFamily="49" charset="0"/>
-              </a:rPr>
-              <a:t>-</a:t>
-            </a:r>
-            <a:r>
-              <a:rPr lang="en-US" dirty="0">
-                <a:solidFill>
-                  <a:srgbClr val="7030A0"/>
-                </a:solidFill>
-                <a:latin typeface="Consolas" panose="020B0609020204030204" pitchFamily="49" charset="0"/>
-              </a:rPr>
-              <a:t>{2}</a:t>
-            </a:r>
-            <a:r>
-              <a:rPr lang="en-US" dirty="0">
-                <a:latin typeface="Consolas" panose="020B0609020204030204" pitchFamily="49" charset="0"/>
-              </a:rPr>
-              <a:t> Tart - 228-229; </a:t>
-            </a:r>
-            <a:r>
-              <a:rPr lang="en-US" dirty="0">
-                <a:solidFill>
-                  <a:srgbClr val="FF0000"/>
-                </a:solidFill>
-                <a:latin typeface="Consolas" panose="020B0609020204030204" pitchFamily="49" charset="0"/>
-              </a:rPr>
-              <a:t>[1]</a:t>
-            </a:r>
-            <a:r>
-              <a:rPr lang="en-US" dirty="0">
-                <a:latin typeface="Consolas" panose="020B0609020204030204" pitchFamily="49" charset="0"/>
-              </a:rPr>
-              <a:t> Roasted Pear and Cranberry</a:t>
-            </a:r>
-          </a:p>
-          <a:p>
-            <a:pPr marL="0" indent="0">
-              <a:buNone/>
-              <a:tabLst>
-                <a:tab pos="9604375" algn="l"/>
-              </a:tabLst>
-            </a:pPr>
-            <a:r>
-              <a:rPr lang="en-US" dirty="0">
-                <a:latin typeface="Consolas" panose="020B0609020204030204" pitchFamily="49" charset="0"/>
-              </a:rPr>
-              <a:t>Crostata - 237-239; </a:t>
-            </a:r>
-            <a:r>
-              <a:rPr lang="en-US" dirty="0">
-                <a:solidFill>
-                  <a:srgbClr val="FF0000"/>
-                </a:solidFill>
-                <a:latin typeface="Consolas" panose="020B0609020204030204" pitchFamily="49" charset="0"/>
-              </a:rPr>
-              <a:t>[1]</a:t>
-            </a:r>
-            <a:r>
-              <a:rPr lang="en-US" dirty="0">
-                <a:latin typeface="Consolas" panose="020B0609020204030204" pitchFamily="49" charset="0"/>
-              </a:rPr>
-              <a:t> roasting – 34; Angel Food Cake with Toasted Coco</a:t>
-            </a:r>
-            <a:r>
-              <a:rPr lang="en-US" dirty="0">
-                <a:solidFill>
-                  <a:srgbClr val="7030A0"/>
-                </a:solidFill>
-                <a:latin typeface="Consolas" panose="020B0609020204030204" pitchFamily="49" charset="0"/>
-              </a:rPr>
-              <a:t>{2}</a:t>
-            </a:r>
-            <a:r>
-              <a:rPr lang="en-US" dirty="0">
-                <a:latin typeface="Consolas" panose="020B0609020204030204" pitchFamily="49" charset="0"/>
-              </a:rPr>
-              <a:t> – 178-179;</a:t>
-            </a:r>
-          </a:p>
-          <a:p>
-            <a:pPr marL="0" indent="0">
-              <a:buNone/>
-              <a:tabLst>
-                <a:tab pos="9604375" algn="l"/>
-              </a:tabLst>
-            </a:pPr>
-            <a:r>
-              <a:rPr lang="en-US" dirty="0">
-                <a:solidFill>
-                  <a:srgbClr val="00B0F0"/>
-                </a:solidFill>
-                <a:latin typeface="Consolas" panose="020B0609020204030204" pitchFamily="49" charset="0"/>
-              </a:rPr>
-              <a:t>{5}</a:t>
-            </a:r>
-            <a:r>
-              <a:rPr lang="en-US" dirty="0">
-                <a:latin typeface="Consolas" panose="020B0609020204030204" pitchFamily="49" charset="0"/>
-              </a:rPr>
-              <a:t> and Quince Tarte Tatin – 233-235; </a:t>
-            </a:r>
-            <a:r>
-              <a:rPr lang="en-US" dirty="0">
-                <a:solidFill>
-                  <a:srgbClr val="00B0F0"/>
-                </a:solidFill>
-                <a:latin typeface="Consolas" panose="020B0609020204030204" pitchFamily="49" charset="0"/>
-              </a:rPr>
-              <a:t>{5}</a:t>
-            </a:r>
-            <a:r>
-              <a:rPr lang="en-US" dirty="0">
-                <a:latin typeface="Consolas" panose="020B0609020204030204" pitchFamily="49" charset="0"/>
-              </a:rPr>
-              <a:t>, Cinnamon, and Brown Sugar Filling – 90; </a:t>
-            </a:r>
-            <a:r>
-              <a:rPr lang="en-US" dirty="0">
-                <a:solidFill>
-                  <a:srgbClr val="00B0F0"/>
-                </a:solidFill>
-                <a:latin typeface="Consolas" panose="020B0609020204030204" pitchFamily="49" charset="0"/>
-              </a:rPr>
-              <a:t>{5}</a:t>
-            </a:r>
-            <a:r>
-              <a:rPr lang="en-US" dirty="0">
-                <a:latin typeface="Consolas" panose="020B0609020204030204" pitchFamily="49" charset="0"/>
-              </a:rPr>
-              <a:t> </a:t>
-            </a:r>
-          </a:p>
-          <a:p>
-            <a:pPr marL="0" indent="0">
-              <a:buNone/>
-              <a:tabLst>
-                <a:tab pos="9604375" algn="l"/>
-              </a:tabLst>
-            </a:pPr>
-            <a:r>
-              <a:rPr lang="en-US" dirty="0">
-                <a:latin typeface="Consolas" panose="020B0609020204030204" pitchFamily="49" charset="0"/>
-              </a:rPr>
-              <a:t>Snacking Spice Cake – 64-65; </a:t>
-            </a:r>
-            <a:r>
-              <a:rPr lang="en-US" dirty="0">
-                <a:solidFill>
-                  <a:srgbClr val="00B0F0"/>
-                </a:solidFill>
-                <a:latin typeface="Consolas" panose="020B0609020204030204" pitchFamily="49" charset="0"/>
-              </a:rPr>
-              <a:t>{5}</a:t>
-            </a:r>
-            <a:r>
-              <a:rPr lang="en-US" dirty="0">
-                <a:latin typeface="Consolas" panose="020B0609020204030204" pitchFamily="49" charset="0"/>
-              </a:rPr>
-              <a:t>-Raisin Charlottes with Vanilla </a:t>
-            </a:r>
-            <a:r>
-              <a:rPr lang="en-US" dirty="0">
-                <a:solidFill>
-                  <a:srgbClr val="FFC000"/>
-                </a:solidFill>
-                <a:latin typeface="Consolas" panose="020B0609020204030204" pitchFamily="49" charset="0"/>
-              </a:rPr>
-              <a:t>{4}</a:t>
-            </a:r>
-            <a:r>
-              <a:rPr lang="en-US" dirty="0">
-                <a:latin typeface="Consolas" panose="020B0609020204030204" pitchFamily="49" charset="0"/>
-              </a:rPr>
-              <a:t> Sauce – 272-273; </a:t>
-            </a:r>
-          </a:p>
-          <a:p>
-            <a:pPr marL="0" indent="0">
-              <a:buNone/>
-              <a:tabLst>
-                <a:tab pos="9604375" algn="l"/>
-              </a:tabLst>
-            </a:pPr>
-            <a:r>
-              <a:rPr lang="en-US" dirty="0">
-                <a:latin typeface="Consolas" panose="020B0609020204030204" pitchFamily="49" charset="0"/>
-              </a:rPr>
-              <a:t>Double Two-</a:t>
-            </a:r>
-            <a:r>
-              <a:rPr lang="en-US" dirty="0">
-                <a:solidFill>
-                  <a:srgbClr val="00B0F0"/>
-                </a:solidFill>
-                <a:latin typeface="Consolas" panose="020B0609020204030204" pitchFamily="49" charset="0"/>
-              </a:rPr>
-              <a:t>{5}</a:t>
-            </a:r>
-            <a:r>
-              <a:rPr lang="en-US" dirty="0">
-                <a:latin typeface="Consolas" panose="020B0609020204030204" pitchFamily="49" charset="0"/>
-              </a:rPr>
-              <a:t> Pie – 203-205; </a:t>
-            </a:r>
-            <a:r>
-              <a:rPr lang="en-US" dirty="0">
-                <a:solidFill>
-                  <a:srgbClr val="00B0F0"/>
-                </a:solidFill>
-                <a:latin typeface="Consolas" panose="020B0609020204030204" pitchFamily="49" charset="0"/>
-              </a:rPr>
-              <a:t>{5}</a:t>
-            </a:r>
-            <a:r>
-              <a:rPr lang="en-US" dirty="0">
-                <a:latin typeface="Consolas" panose="020B0609020204030204" pitchFamily="49" charset="0"/>
-              </a:rPr>
-              <a:t> Good Morning </a:t>
-            </a:r>
-            <a:r>
-              <a:rPr lang="en-US" dirty="0">
-                <a:solidFill>
-                  <a:srgbClr val="FF6600"/>
-                </a:solidFill>
-                <a:latin typeface="Consolas" panose="020B0609020204030204" pitchFamily="49" charset="0"/>
-              </a:rPr>
-              <a:t>{9}</a:t>
-            </a:r>
-            <a:r>
-              <a:rPr lang="en-US" dirty="0">
-                <a:latin typeface="Consolas" panose="020B0609020204030204" pitchFamily="49" charset="0"/>
-              </a:rPr>
-              <a:t> – 60-61; </a:t>
-            </a:r>
-            <a:r>
-              <a:rPr lang="en-US" dirty="0">
-                <a:solidFill>
-                  <a:srgbClr val="00B0F0"/>
-                </a:solidFill>
-                <a:latin typeface="Consolas" panose="020B0609020204030204" pitchFamily="49" charset="0"/>
-              </a:rPr>
-              <a:t>{5}</a:t>
-            </a:r>
-            <a:r>
-              <a:rPr lang="en-US" dirty="0">
-                <a:latin typeface="Consolas" panose="020B0609020204030204" pitchFamily="49" charset="0"/>
-              </a:rPr>
-              <a:t> </a:t>
-            </a:r>
-            <a:r>
-              <a:rPr lang="en-US" dirty="0">
-                <a:solidFill>
-                  <a:schemeClr val="accent1"/>
-                </a:solidFill>
-                <a:latin typeface="Consolas" panose="020B0609020204030204" pitchFamily="49" charset="0"/>
-              </a:rPr>
-              <a:t>{3}</a:t>
-            </a:r>
-            <a:r>
-              <a:rPr lang="en-US" dirty="0">
-                <a:latin typeface="Consolas" panose="020B0609020204030204" pitchFamily="49" charset="0"/>
-              </a:rPr>
-              <a:t> Bars – 154-156; </a:t>
-            </a:r>
-          </a:p>
-          <a:p>
-            <a:pPr marL="0" indent="0">
-              <a:buNone/>
-              <a:tabLst>
-                <a:tab pos="9604375" algn="l"/>
-              </a:tabLst>
-            </a:pPr>
-            <a:r>
-              <a:rPr lang="en-US" dirty="0">
-                <a:solidFill>
-                  <a:srgbClr val="00B0F0"/>
-                </a:solidFill>
-                <a:latin typeface="Consolas" panose="020B0609020204030204" pitchFamily="49" charset="0"/>
-              </a:rPr>
-              <a:t>{5}</a:t>
-            </a:r>
-            <a:r>
-              <a:rPr lang="en-US" dirty="0">
-                <a:latin typeface="Consolas" panose="020B0609020204030204" pitchFamily="49" charset="0"/>
-              </a:rPr>
-              <a:t> Heart-Healthy Dried Fruit Scones – 50-51; </a:t>
-            </a:r>
-            <a:r>
-              <a:rPr lang="en-US" dirty="0">
-                <a:solidFill>
-                  <a:srgbClr val="00B0F0"/>
-                </a:solidFill>
-                <a:latin typeface="Consolas" panose="020B0609020204030204" pitchFamily="49" charset="0"/>
-              </a:rPr>
-              <a:t>{5}</a:t>
-            </a:r>
-            <a:r>
-              <a:rPr lang="en-US" dirty="0">
-                <a:latin typeface="Consolas" panose="020B0609020204030204" pitchFamily="49" charset="0"/>
-              </a:rPr>
-              <a:t> Homemade Pop-Tarts – 88-91; Bacon and</a:t>
-            </a:r>
-          </a:p>
-          <a:p>
-            <a:pPr marL="0" indent="0">
-              <a:buNone/>
-              <a:tabLst>
-                <a:tab pos="9604375" algn="l"/>
-              </a:tabLst>
-            </a:pPr>
-            <a:r>
-              <a:rPr lang="en-US" dirty="0">
-                <a:solidFill>
-                  <a:srgbClr val="FFC000"/>
-                </a:solidFill>
-                <a:latin typeface="Consolas" panose="020B0609020204030204" pitchFamily="49" charset="0"/>
-              </a:rPr>
-              <a:t>{4}</a:t>
-            </a:r>
-            <a:r>
-              <a:rPr lang="en-US" dirty="0" err="1">
-                <a:latin typeface="Consolas" panose="020B0609020204030204" pitchFamily="49" charset="0"/>
-              </a:rPr>
-              <a:t>ized</a:t>
-            </a:r>
-            <a:r>
-              <a:rPr lang="en-US" dirty="0">
-                <a:latin typeface="Consolas" panose="020B0609020204030204" pitchFamily="49" charset="0"/>
-              </a:rPr>
-              <a:t> Onion Quiche – 241; </a:t>
-            </a:r>
-            <a:r>
-              <a:rPr lang="en-US" dirty="0">
-                <a:solidFill>
-                  <a:srgbClr val="00B050"/>
-                </a:solidFill>
-                <a:latin typeface="Consolas" panose="020B0609020204030204" pitchFamily="49" charset="0"/>
-              </a:rPr>
-              <a:t>{6}</a:t>
-            </a:r>
-            <a:r>
-              <a:rPr lang="en-US" dirty="0">
-                <a:latin typeface="Consolas" panose="020B0609020204030204" pitchFamily="49" charset="0"/>
-              </a:rPr>
-              <a:t> pans – 21-22; </a:t>
-            </a:r>
-            <a:r>
-              <a:rPr lang="en-US" dirty="0">
-                <a:solidFill>
-                  <a:srgbClr val="00B050"/>
-                </a:solidFill>
-                <a:latin typeface="Consolas" panose="020B0609020204030204" pitchFamily="49" charset="0"/>
-              </a:rPr>
-              <a:t>{6}</a:t>
-            </a:r>
-            <a:r>
-              <a:rPr lang="en-US" dirty="0">
-                <a:latin typeface="Consolas" panose="020B0609020204030204" pitchFamily="49" charset="0"/>
-              </a:rPr>
-              <a:t> sheets – 22; </a:t>
-            </a:r>
-            <a:r>
-              <a:rPr lang="en-US" dirty="0">
-                <a:solidFill>
-                  <a:srgbClr val="00B050"/>
-                </a:solidFill>
-                <a:latin typeface="Consolas" panose="020B0609020204030204" pitchFamily="49" charset="0"/>
-              </a:rPr>
-              <a:t>{6}</a:t>
-            </a:r>
-            <a:r>
-              <a:rPr lang="en-US" dirty="0">
-                <a:latin typeface="Consolas" panose="020B0609020204030204" pitchFamily="49" charset="0"/>
-              </a:rPr>
-              <a:t> tips – 31-37; </a:t>
-            </a:r>
-            <a:r>
-              <a:rPr lang="en-US" dirty="0">
-                <a:solidFill>
-                  <a:schemeClr val="tx1">
-                    <a:lumMod val="50000"/>
-                    <a:lumOff val="50000"/>
-                  </a:schemeClr>
-                </a:solidFill>
-                <a:latin typeface="Consolas" panose="020B0609020204030204" pitchFamily="49" charset="0"/>
-              </a:rPr>
-              <a:t>{7}</a:t>
-            </a:r>
-            <a:r>
-              <a:rPr lang="en-US" dirty="0">
-                <a:solidFill>
-                  <a:srgbClr val="FF33CC"/>
-                </a:solidFill>
-                <a:latin typeface="Consolas" panose="020B0609020204030204" pitchFamily="49" charset="0"/>
-              </a:rPr>
-              <a:t> </a:t>
-            </a:r>
-          </a:p>
-          <a:p>
-            <a:pPr marL="0" indent="0">
-              <a:buNone/>
-              <a:tabLst>
-                <a:tab pos="9604375" algn="l"/>
-              </a:tabLst>
-            </a:pPr>
-            <a:r>
-              <a:rPr lang="en-US" dirty="0">
-                <a:solidFill>
-                  <a:srgbClr val="FF33CC"/>
-                </a:solidFill>
-                <a:latin typeface="Consolas" panose="020B0609020204030204" pitchFamily="49" charset="0"/>
-              </a:rPr>
-              <a:t>{8}</a:t>
-            </a:r>
-            <a:r>
-              <a:rPr lang="en-US" dirty="0">
-                <a:latin typeface="Consolas" panose="020B0609020204030204" pitchFamily="49" charset="0"/>
-              </a:rPr>
-              <a:t> Pudding – 254-255; </a:t>
-            </a:r>
-            <a:r>
-              <a:rPr lang="en-US" dirty="0">
-                <a:solidFill>
-                  <a:schemeClr val="tx1">
-                    <a:lumMod val="50000"/>
-                    <a:lumOff val="50000"/>
-                  </a:schemeClr>
-                </a:solidFill>
-                <a:latin typeface="Consolas" panose="020B0609020204030204" pitchFamily="49" charset="0"/>
-              </a:rPr>
-              <a:t>{7}</a:t>
-            </a:r>
-            <a:r>
-              <a:rPr lang="en-US" dirty="0">
-                <a:latin typeface="Consolas" panose="020B0609020204030204" pitchFamily="49" charset="0"/>
-              </a:rPr>
-              <a:t> </a:t>
-            </a:r>
-            <a:r>
-              <a:rPr lang="en-US" dirty="0">
-                <a:solidFill>
-                  <a:srgbClr val="FF33CC"/>
-                </a:solidFill>
-                <a:latin typeface="Consolas" panose="020B0609020204030204" pitchFamily="49" charset="0"/>
-              </a:rPr>
-              <a:t>{8}</a:t>
-            </a:r>
-            <a:r>
-              <a:rPr lang="en-US" dirty="0">
-                <a:latin typeface="Consolas" panose="020B0609020204030204" pitchFamily="49" charset="0"/>
-              </a:rPr>
-              <a:t> – 66; Basic Brioche – 73-74;</a:t>
-            </a:r>
-          </a:p>
-          <a:p>
-            <a:pPr marL="0" indent="0">
-              <a:buNone/>
-              <a:tabLst>
-                <a:tab pos="9604375" algn="l"/>
-              </a:tabLst>
-            </a:pPr>
-            <a:endParaRPr lang="en-US" dirty="0">
-              <a:latin typeface="Consolas" panose="020B0609020204030204" pitchFamily="49" charset="0"/>
-            </a:endParaRPr>
-          </a:p>
-        </p:txBody>
-      </p:sp>
-    </p:spTree>
-    <p:extLst>
-      <p:ext uri="{BB962C8B-B14F-4D97-AF65-F5344CB8AC3E}">
-        <p14:creationId xmlns:p14="http://schemas.microsoft.com/office/powerpoint/2010/main" val="1269145179"/>
-      </p:ext>
-    </p:extLst>
-  </p:cSld>
-  <p:clrMapOvr>
-    <a:masterClrMapping/>
-  </p:clrMapOvr>
-</p:sld>
-</file>
-
-<file path=ppt/slides/slide41.xml><?xml version="1.0" encoding="utf-8"?>
-<p:sld xmlns:a="http://schemas.openxmlformats.org/drawingml/2006/main" xmlns:r="http://schemas.openxmlformats.org/officeDocument/2006/relationships" xmlns:p="http://schemas.openxmlformats.org/presentationml/2006/main">
-  <p:cSld>
-    <p:spTree>
-      <p:nvGrpSpPr>
-        <p:cNvPr id="1" name=""/>
-        <p:cNvGrpSpPr/>
-        <p:nvPr/>
-      </p:nvGrpSpPr>
-      <p:grpSpPr>
-        <a:xfrm>
-          <a:off x="0" y="0"/>
-          <a:ext cx="0" cy="0"/>
-          <a:chOff x="0" y="0"/>
-          <a:chExt cx="0" cy="0"/>
-        </a:xfrm>
-      </p:grpSpPr>
-      <p:sp>
-        <p:nvSpPr>
           <p:cNvPr id="2" name="Title 1"/>
           <p:cNvSpPr>
             <a:spLocks noGrp="1"/>
@@ -23103,7 +23013,7 @@
 </p:sld>
 </file>
 
-<file path=ppt/slides/slide42.xml><?xml version="1.0" encoding="utf-8"?>
+<file path=ppt/slides/slide41.xml><?xml version="1.0" encoding="utf-8"?>
 <p:sld xmlns:a="http://schemas.openxmlformats.org/drawingml/2006/main" xmlns:r="http://schemas.openxmlformats.org/officeDocument/2006/relationships" xmlns:p="http://schemas.openxmlformats.org/presentationml/2006/main">
   <p:cSld>
     <p:spTree>
@@ -23879,7 +23789,7 @@
 </p:sld>
 </file>
 
-<file path=ppt/slides/slide43.xml><?xml version="1.0" encoding="utf-8"?>
+<file path=ppt/slides/slide42.xml><?xml version="1.0" encoding="utf-8"?>
 <p:sld xmlns:a="http://schemas.openxmlformats.org/drawingml/2006/main" xmlns:r="http://schemas.openxmlformats.org/officeDocument/2006/relationships" xmlns:p="http://schemas.openxmlformats.org/presentationml/2006/main">
   <p:cSld>
     <p:spTree>
@@ -24601,7 +24511,7 @@
 </p:sld>
 </file>
 
-<file path=ppt/slides/slide44.xml><?xml version="1.0" encoding="utf-8"?>
+<file path=ppt/slides/slide43.xml><?xml version="1.0" encoding="utf-8"?>
 <p:sld xmlns:a="http://schemas.openxmlformats.org/drawingml/2006/main" xmlns:r="http://schemas.openxmlformats.org/officeDocument/2006/relationships" xmlns:p="http://schemas.openxmlformats.org/presentationml/2006/main">
   <p:cSld>
     <p:spTree>
@@ -25418,7 +25328,7 @@
 </p:sld>
 </file>
 
-<file path=ppt/slides/slide45.xml><?xml version="1.0" encoding="utf-8"?>
+<file path=ppt/slides/slide44.xml><?xml version="1.0" encoding="utf-8"?>
 <p:sld xmlns:a="http://schemas.openxmlformats.org/drawingml/2006/main" xmlns:r="http://schemas.openxmlformats.org/officeDocument/2006/relationships" xmlns:p="http://schemas.openxmlformats.org/presentationml/2006/main">
   <p:cSld>
     <p:spTree>
@@ -26197,7 +26107,7 @@
 </p:sld>
 </file>
 
-<file path=ppt/slides/slide46.xml><?xml version="1.0" encoding="utf-8"?>
+<file path=ppt/slides/slide45.xml><?xml version="1.0" encoding="utf-8"?>
 <p:sld xmlns:a="http://schemas.openxmlformats.org/drawingml/2006/main" xmlns:r="http://schemas.openxmlformats.org/officeDocument/2006/relationships" xmlns:p="http://schemas.openxmlformats.org/presentationml/2006/main">
   <p:cSld>
     <p:spTree>
@@ -26985,7 +26895,7 @@
 </p:sld>
 </file>
 
-<file path=ppt/slides/slide47.xml><?xml version="1.0" encoding="utf-8"?>
+<file path=ppt/slides/slide46.xml><?xml version="1.0" encoding="utf-8"?>
 <p:sld xmlns:a="http://schemas.openxmlformats.org/drawingml/2006/main" xmlns:r="http://schemas.openxmlformats.org/officeDocument/2006/relationships" xmlns:p="http://schemas.openxmlformats.org/presentationml/2006/main">
   <p:cSld>
     <p:spTree>
@@ -27740,7 +27650,7 @@
 </p:sld>
 </file>
 
-<file path=ppt/slides/slide48.xml><?xml version="1.0" encoding="utf-8"?>
+<file path=ppt/slides/slide47.xml><?xml version="1.0" encoding="utf-8"?>
 <p:sld xmlns:a="http://schemas.openxmlformats.org/drawingml/2006/main" xmlns:r="http://schemas.openxmlformats.org/officeDocument/2006/relationships" xmlns:p="http://schemas.openxmlformats.org/presentationml/2006/main">
   <p:cSld>
     <p:spTree>
@@ -28675,7 +28585,7 @@
 </p:sld>
 </file>
 
-<file path=ppt/slides/slide49.xml><?xml version="1.0" encoding="utf-8"?>
+<file path=ppt/slides/slide48.xml><?xml version="1.0" encoding="utf-8"?>
 <p:sld xmlns:a="http://schemas.openxmlformats.org/drawingml/2006/main" xmlns:r="http://schemas.openxmlformats.org/officeDocument/2006/relationships" xmlns:p="http://schemas.openxmlformats.org/presentationml/2006/main">
   <p:cSld>
     <p:spTree>
@@ -29446,121 +29356,7 @@
 </p:sld>
 </file>
 
-<file path=ppt/slides/slide5.xml><?xml version="1.0" encoding="utf-8"?>
-<p:sld xmlns:a="http://schemas.openxmlformats.org/drawingml/2006/main" xmlns:r="http://schemas.openxmlformats.org/officeDocument/2006/relationships" xmlns:p="http://schemas.openxmlformats.org/presentationml/2006/main">
-  <p:cSld>
-    <p:spTree>
-      <p:nvGrpSpPr>
-        <p:cNvPr id="1" name=""/>
-        <p:cNvGrpSpPr/>
-        <p:nvPr/>
-      </p:nvGrpSpPr>
-      <p:grpSpPr>
-        <a:xfrm>
-          <a:off x="0" y="0"/>
-          <a:ext cx="0" cy="0"/>
-          <a:chOff x="0" y="0"/>
-          <a:chExt cx="0" cy="0"/>
-        </a:xfrm>
-      </p:grpSpPr>
-      <p:sp>
-        <p:nvSpPr>
-          <p:cNvPr id="2" name="Title 1"/>
-          <p:cNvSpPr>
-            <a:spLocks noGrp="1"/>
-          </p:cNvSpPr>
-          <p:nvPr>
-            <p:ph type="title"/>
-          </p:nvPr>
-        </p:nvSpPr>
-        <p:spPr/>
-        <p:txBody>
-          <a:bodyPr/>
-          <a:lstStyle/>
-          <a:p>
-            <a:r>
-              <a:rPr lang="en-US" dirty="0"/>
-              <a:t>Smoot Wisdom</a:t>
-            </a:r>
-          </a:p>
-        </p:txBody>
-      </p:sp>
-      <p:sp>
-        <p:nvSpPr>
-          <p:cNvPr id="3" name="Content Placeholder 2"/>
-          <p:cNvSpPr>
-            <a:spLocks noGrp="1"/>
-          </p:cNvSpPr>
-          <p:nvPr>
-            <p:ph idx="1"/>
-          </p:nvPr>
-        </p:nvSpPr>
-        <p:spPr>
-          <a:xfrm>
-            <a:off x="816864" y="1803399"/>
-            <a:ext cx="10871200" cy="4852437"/>
-          </a:xfrm>
-        </p:spPr>
-        <p:txBody>
-          <a:bodyPr>
-            <a:normAutofit/>
-          </a:bodyPr>
-          <a:lstStyle/>
-          <a:p>
-            <a:pPr marL="0" indent="0">
-              <a:buNone/>
-            </a:pPr>
-            <a:r>
-              <a:rPr lang="en-US" sz="6600" dirty="0"/>
-              <a:t>"Things that you pay no attention to at the </a:t>
-            </a:r>
-            <a:r>
-              <a:rPr lang="en-US" sz="6600"/>
-              <a:t>time can have </a:t>
-            </a:r>
-            <a:r>
-              <a:rPr lang="en-US" sz="6600" dirty="0"/>
-              <a:t>big consequences." </a:t>
-            </a:r>
-            <a:br>
-              <a:rPr lang="en-US" dirty="0"/>
-            </a:br>
-            <a:r>
-              <a:rPr lang="en-US" dirty="0"/>
-              <a:t>~Oliver Smoot</a:t>
-            </a:r>
-            <a:br>
-              <a:rPr lang="en-US" dirty="0"/>
-            </a:br>
-            <a:r>
-              <a:rPr lang="en-US" sz="3200" dirty="0"/>
-              <a:t>Interview with Radio Boston, WBUR, May 6, 2016</a:t>
-            </a:r>
-            <a:br>
-              <a:rPr lang="en-US" sz="3200" dirty="0"/>
-            </a:br>
-            <a:r>
-              <a:rPr lang="en-US" sz="1400" dirty="0"/>
-              <a:t>http://radioboston.wbur.org/2016/05/06/ollie-smoot-the-official-unit-of-measure-for-the-harvard-bridge</a:t>
-            </a:r>
-            <a:endParaRPr lang="en-US" dirty="0"/>
-          </a:p>
-        </p:txBody>
-      </p:sp>
-    </p:spTree>
-    <p:extLst>
-      <p:ext uri="{BB962C8B-B14F-4D97-AF65-F5344CB8AC3E}">
-        <p14:creationId xmlns:p14="http://schemas.microsoft.com/office/powerpoint/2010/main" val="2305406425"/>
-      </p:ext>
-    </p:extLst>
-  </p:cSld>
-  <p:clrMapOvr>
-    <a:masterClrMapping/>
-  </p:clrMapOvr>
-</p:sld>
-</file>
-
-<file path=ppt/slides/slide50.xml><?xml version="1.0" encoding="utf-8"?>
+<file path=ppt/slides/slide49.xml><?xml version="1.0" encoding="utf-8"?>
 <p:sld xmlns:a="http://schemas.openxmlformats.org/drawingml/2006/main" xmlns:r="http://schemas.openxmlformats.org/officeDocument/2006/relationships" xmlns:p="http://schemas.openxmlformats.org/presentationml/2006/main">
   <p:cSld>
     <p:spTree>
@@ -30958,7 +30754,121 @@
 </p:sld>
 </file>
 
-<file path=ppt/slides/slide51.xml><?xml version="1.0" encoding="utf-8"?>
+<file path=ppt/slides/slide5.xml><?xml version="1.0" encoding="utf-8"?>
+<p:sld xmlns:a="http://schemas.openxmlformats.org/drawingml/2006/main" xmlns:r="http://schemas.openxmlformats.org/officeDocument/2006/relationships" xmlns:p="http://schemas.openxmlformats.org/presentationml/2006/main">
+  <p:cSld>
+    <p:spTree>
+      <p:nvGrpSpPr>
+        <p:cNvPr id="1" name=""/>
+        <p:cNvGrpSpPr/>
+        <p:nvPr/>
+      </p:nvGrpSpPr>
+      <p:grpSpPr>
+        <a:xfrm>
+          <a:off x="0" y="0"/>
+          <a:ext cx="0" cy="0"/>
+          <a:chOff x="0" y="0"/>
+          <a:chExt cx="0" cy="0"/>
+        </a:xfrm>
+      </p:grpSpPr>
+      <p:sp>
+        <p:nvSpPr>
+          <p:cNvPr id="2" name="Title 1"/>
+          <p:cNvSpPr>
+            <a:spLocks noGrp="1"/>
+          </p:cNvSpPr>
+          <p:nvPr>
+            <p:ph type="title"/>
+          </p:nvPr>
+        </p:nvSpPr>
+        <p:spPr/>
+        <p:txBody>
+          <a:bodyPr/>
+          <a:lstStyle/>
+          <a:p>
+            <a:r>
+              <a:rPr lang="en-US" dirty="0"/>
+              <a:t>Smoot Wisdom</a:t>
+            </a:r>
+          </a:p>
+        </p:txBody>
+      </p:sp>
+      <p:sp>
+        <p:nvSpPr>
+          <p:cNvPr id="3" name="Content Placeholder 2"/>
+          <p:cNvSpPr>
+            <a:spLocks noGrp="1"/>
+          </p:cNvSpPr>
+          <p:nvPr>
+            <p:ph idx="1"/>
+          </p:nvPr>
+        </p:nvSpPr>
+        <p:spPr>
+          <a:xfrm>
+            <a:off x="816864" y="1803399"/>
+            <a:ext cx="10871200" cy="4852437"/>
+          </a:xfrm>
+        </p:spPr>
+        <p:txBody>
+          <a:bodyPr>
+            <a:normAutofit/>
+          </a:bodyPr>
+          <a:lstStyle/>
+          <a:p>
+            <a:pPr marL="0" indent="0">
+              <a:buNone/>
+            </a:pPr>
+            <a:r>
+              <a:rPr lang="en-US" sz="6600" dirty="0"/>
+              <a:t>"Things that you pay no attention to at the </a:t>
+            </a:r>
+            <a:r>
+              <a:rPr lang="en-US" sz="6600"/>
+              <a:t>time can have </a:t>
+            </a:r>
+            <a:r>
+              <a:rPr lang="en-US" sz="6600" dirty="0"/>
+              <a:t>big consequences." </a:t>
+            </a:r>
+            <a:br>
+              <a:rPr lang="en-US" dirty="0"/>
+            </a:br>
+            <a:r>
+              <a:rPr lang="en-US" dirty="0"/>
+              <a:t>~Oliver Smoot</a:t>
+            </a:r>
+            <a:br>
+              <a:rPr lang="en-US" dirty="0"/>
+            </a:br>
+            <a:r>
+              <a:rPr lang="en-US" sz="3200" dirty="0"/>
+              <a:t>Interview with Radio Boston, WBUR, May 6, 2016</a:t>
+            </a:r>
+            <a:br>
+              <a:rPr lang="en-US" sz="3200" dirty="0"/>
+            </a:br>
+            <a:r>
+              <a:rPr lang="en-US" sz="1400" dirty="0"/>
+              <a:t>http://radioboston.wbur.org/2016/05/06/ollie-smoot-the-official-unit-of-measure-for-the-harvard-bridge</a:t>
+            </a:r>
+            <a:endParaRPr lang="en-US" dirty="0"/>
+          </a:p>
+        </p:txBody>
+      </p:sp>
+    </p:spTree>
+    <p:extLst>
+      <p:ext uri="{BB962C8B-B14F-4D97-AF65-F5344CB8AC3E}">
+        <p14:creationId xmlns:p14="http://schemas.microsoft.com/office/powerpoint/2010/main" val="2305406425"/>
+      </p:ext>
+    </p:extLst>
+  </p:cSld>
+  <p:clrMapOvr>
+    <a:masterClrMapping/>
+  </p:clrMapOvr>
+</p:sld>
+</file>
+
+<file path=ppt/slides/slide50.xml><?xml version="1.0" encoding="utf-8"?>
 <p:sld xmlns:a="http://schemas.openxmlformats.org/drawingml/2006/main" xmlns:r="http://schemas.openxmlformats.org/officeDocument/2006/relationships" xmlns:p="http://schemas.openxmlformats.org/presentationml/2006/main">
   <p:cSld>
     <p:spTree>
@@ -31646,7 +31556,7 @@
 </p:sld>
 </file>
 
-<file path=ppt/slides/slide52.xml><?xml version="1.0" encoding="utf-8"?>
+<file path=ppt/slides/slide51.xml><?xml version="1.0" encoding="utf-8"?>
 <p:sld xmlns:a="http://schemas.openxmlformats.org/drawingml/2006/main" xmlns:r="http://schemas.openxmlformats.org/officeDocument/2006/relationships" xmlns:p="http://schemas.openxmlformats.org/presentationml/2006/main">
   <p:cSld>
     <p:spTree>
@@ -31987,6 +31897,149 @@
 </p:sld>
 </file>
 
+<file path=ppt/slides/slide52.xml><?xml version="1.0" encoding="utf-8"?>
+<p:sld xmlns:a="http://schemas.openxmlformats.org/drawingml/2006/main" xmlns:r="http://schemas.openxmlformats.org/officeDocument/2006/relationships" xmlns:p="http://schemas.openxmlformats.org/presentationml/2006/main" show="0">
+  <p:cSld>
+    <p:spTree>
+      <p:nvGrpSpPr>
+        <p:cNvPr id="1" name=""/>
+        <p:cNvGrpSpPr/>
+        <p:nvPr/>
+      </p:nvGrpSpPr>
+      <p:grpSpPr>
+        <a:xfrm>
+          <a:off x="0" y="0"/>
+          <a:ext cx="0" cy="0"/>
+          <a:chOff x="0" y="0"/>
+          <a:chExt cx="0" cy="0"/>
+        </a:xfrm>
+      </p:grpSpPr>
+      <p:sp>
+        <p:nvSpPr>
+          <p:cNvPr id="2" name="Title 1"/>
+          <p:cNvSpPr>
+            <a:spLocks noGrp="1"/>
+          </p:cNvSpPr>
+          <p:nvPr>
+            <p:ph type="title"/>
+          </p:nvPr>
+        </p:nvSpPr>
+        <p:spPr/>
+        <p:txBody>
+          <a:bodyPr>
+            <a:normAutofit fontScale="90000"/>
+          </a:bodyPr>
+          <a:lstStyle/>
+          <a:p>
+            <a:r>
+              <a:rPr lang="en-US"/>
+              <a:t>When ROW compression can’t compress</a:t>
+            </a:r>
+            <a:endParaRPr lang="en-US" dirty="0"/>
+          </a:p>
+        </p:txBody>
+      </p:sp>
+      <p:sp>
+        <p:nvSpPr>
+          <p:cNvPr id="3" name="Content Placeholder 2"/>
+          <p:cNvSpPr>
+            <a:spLocks noGrp="1"/>
+          </p:cNvSpPr>
+          <p:nvPr>
+            <p:ph idx="1"/>
+          </p:nvPr>
+        </p:nvSpPr>
+        <p:spPr/>
+        <p:txBody>
+          <a:bodyPr>
+            <a:normAutofit fontScale="77500" lnSpcReduction="20000"/>
+          </a:bodyPr>
+          <a:lstStyle/>
+          <a:p>
+            <a:r>
+              <a:rPr lang="en-US"/>
+              <a:t>Variable-length data</a:t>
+            </a:r>
+          </a:p>
+          <a:p>
+            <a:pPr lvl="1"/>
+            <a:r>
+              <a:rPr lang="en-US"/>
+              <a:t>Varchar</a:t>
+            </a:r>
+          </a:p>
+          <a:p>
+            <a:pPr lvl="1"/>
+            <a:r>
+              <a:rPr lang="en-US"/>
+              <a:t>Varbinary</a:t>
+            </a:r>
+          </a:p>
+          <a:p>
+            <a:r>
+              <a:rPr lang="en-US"/>
+              <a:t>LOB data types</a:t>
+            </a:r>
+          </a:p>
+          <a:p>
+            <a:pPr lvl="1"/>
+            <a:r>
+              <a:rPr lang="en-US"/>
+              <a:t>XML</a:t>
+            </a:r>
+          </a:p>
+          <a:p>
+            <a:pPr lvl="1"/>
+            <a:r>
+              <a:rPr lang="en-US"/>
+              <a:t>n/varchar(max)</a:t>
+            </a:r>
+          </a:p>
+          <a:p>
+            <a:r>
+              <a:rPr lang="en-US"/>
+              <a:t>Fixed-length data that uses full length</a:t>
+            </a:r>
+          </a:p>
+          <a:p>
+            <a:pPr lvl="1"/>
+            <a:r>
+              <a:rPr lang="en-US"/>
+              <a:t>UNIQUEIDENTIFIER</a:t>
+            </a:r>
+          </a:p>
+          <a:p>
+            <a:pPr lvl="1"/>
+            <a:r>
+              <a:rPr lang="en-US"/>
+              <a:t>DATE or TIME</a:t>
+            </a:r>
+          </a:p>
+          <a:p>
+            <a:pPr lvl="1"/>
+            <a:r>
+              <a:rPr lang="en-US"/>
+              <a:t>CHAR(10) that actually contains 10 characters</a:t>
+            </a:r>
+          </a:p>
+          <a:p>
+            <a:endParaRPr lang="en-US" dirty="0"/>
+          </a:p>
+        </p:txBody>
+      </p:sp>
+    </p:spTree>
+    <p:extLst>
+      <p:ext uri="{BB962C8B-B14F-4D97-AF65-F5344CB8AC3E}">
+        <p14:creationId xmlns:p14="http://schemas.microsoft.com/office/powerpoint/2010/main" val="280028947"/>
+      </p:ext>
+    </p:extLst>
+  </p:cSld>
+  <p:clrMapOvr>
+    <a:masterClrMapping/>
+  </p:clrMapOvr>
+</p:sld>
+</file>
+
 <file path=ppt/slides/slide53.xml><?xml version="1.0" encoding="utf-8"?>
 <p:sld xmlns:a="http://schemas.openxmlformats.org/drawingml/2006/main" xmlns:r="http://schemas.openxmlformats.org/officeDocument/2006/relationships" xmlns:p="http://schemas.openxmlformats.org/presentationml/2006/main" show="0">
   <p:cSld>
@@ -32023,149 +32076,6 @@
           <a:p>
             <a:r>
               <a:rPr lang="en-US"/>
-              <a:t>When ROW compression can’t compress</a:t>
-            </a:r>
-            <a:endParaRPr lang="en-US" dirty="0"/>
-          </a:p>
-        </p:txBody>
-      </p:sp>
-      <p:sp>
-        <p:nvSpPr>
-          <p:cNvPr id="3" name="Content Placeholder 2"/>
-          <p:cNvSpPr>
-            <a:spLocks noGrp="1"/>
-          </p:cNvSpPr>
-          <p:nvPr>
-            <p:ph idx="1"/>
-          </p:nvPr>
-        </p:nvSpPr>
-        <p:spPr/>
-        <p:txBody>
-          <a:bodyPr>
-            <a:normAutofit fontScale="77500" lnSpcReduction="20000"/>
-          </a:bodyPr>
-          <a:lstStyle/>
-          <a:p>
-            <a:r>
-              <a:rPr lang="en-US"/>
-              <a:t>Variable-length data</a:t>
-            </a:r>
-          </a:p>
-          <a:p>
-            <a:pPr lvl="1"/>
-            <a:r>
-              <a:rPr lang="en-US"/>
-              <a:t>Varchar</a:t>
-            </a:r>
-          </a:p>
-          <a:p>
-            <a:pPr lvl="1"/>
-            <a:r>
-              <a:rPr lang="en-US"/>
-              <a:t>Varbinary</a:t>
-            </a:r>
-          </a:p>
-          <a:p>
-            <a:r>
-              <a:rPr lang="en-US"/>
-              <a:t>LOB data types</a:t>
-            </a:r>
-          </a:p>
-          <a:p>
-            <a:pPr lvl="1"/>
-            <a:r>
-              <a:rPr lang="en-US"/>
-              <a:t>XML</a:t>
-            </a:r>
-          </a:p>
-          <a:p>
-            <a:pPr lvl="1"/>
-            <a:r>
-              <a:rPr lang="en-US"/>
-              <a:t>n/varchar(max)</a:t>
-            </a:r>
-          </a:p>
-          <a:p>
-            <a:r>
-              <a:rPr lang="en-US"/>
-              <a:t>Fixed-length data that uses full length</a:t>
-            </a:r>
-          </a:p>
-          <a:p>
-            <a:pPr lvl="1"/>
-            <a:r>
-              <a:rPr lang="en-US"/>
-              <a:t>UNIQUEIDENTIFIER</a:t>
-            </a:r>
-          </a:p>
-          <a:p>
-            <a:pPr lvl="1"/>
-            <a:r>
-              <a:rPr lang="en-US"/>
-              <a:t>DATE or TIME</a:t>
-            </a:r>
-          </a:p>
-          <a:p>
-            <a:pPr lvl="1"/>
-            <a:r>
-              <a:rPr lang="en-US"/>
-              <a:t>CHAR(10) that actually contains 10 characters</a:t>
-            </a:r>
-          </a:p>
-          <a:p>
-            <a:endParaRPr lang="en-US" dirty="0"/>
-          </a:p>
-        </p:txBody>
-      </p:sp>
-    </p:spTree>
-    <p:extLst>
-      <p:ext uri="{BB962C8B-B14F-4D97-AF65-F5344CB8AC3E}">
-        <p14:creationId xmlns:p14="http://schemas.microsoft.com/office/powerpoint/2010/main" val="280028947"/>
-      </p:ext>
-    </p:extLst>
-  </p:cSld>
-  <p:clrMapOvr>
-    <a:masterClrMapping/>
-  </p:clrMapOvr>
-</p:sld>
-</file>
-
-<file path=ppt/slides/slide54.xml><?xml version="1.0" encoding="utf-8"?>
-<p:sld xmlns:a="http://schemas.openxmlformats.org/drawingml/2006/main" xmlns:r="http://schemas.openxmlformats.org/officeDocument/2006/relationships" xmlns:p="http://schemas.openxmlformats.org/presentationml/2006/main" show="0">
-  <p:cSld>
-    <p:spTree>
-      <p:nvGrpSpPr>
-        <p:cNvPr id="1" name=""/>
-        <p:cNvGrpSpPr/>
-        <p:nvPr/>
-      </p:nvGrpSpPr>
-      <p:grpSpPr>
-        <a:xfrm>
-          <a:off x="0" y="0"/>
-          <a:ext cx="0" cy="0"/>
-          <a:chOff x="0" y="0"/>
-          <a:chExt cx="0" cy="0"/>
-        </a:xfrm>
-      </p:grpSpPr>
-      <p:sp>
-        <p:nvSpPr>
-          <p:cNvPr id="2" name="Title 1"/>
-          <p:cNvSpPr>
-            <a:spLocks noGrp="1"/>
-          </p:cNvSpPr>
-          <p:nvPr>
-            <p:ph type="title"/>
-          </p:nvPr>
-        </p:nvSpPr>
-        <p:spPr/>
-        <p:txBody>
-          <a:bodyPr>
-            <a:normAutofit fontScale="90000"/>
-          </a:bodyPr>
-          <a:lstStyle/>
-          <a:p>
-            <a:r>
-              <a:rPr lang="en-US"/>
               <a:t>When PAGE compression can’t compress</a:t>
             </a:r>
             <a:endParaRPr lang="en-US" dirty="0"/>
@@ -32259,7 +32169,7 @@
 </p:sld>
 </file>
 
-<file path=ppt/slides/slide55.xml><?xml version="1.0" encoding="utf-8"?>
+<file path=ppt/slides/slide54.xml><?xml version="1.0" encoding="utf-8"?>
 <p:sld xmlns:a="http://schemas.openxmlformats.org/drawingml/2006/main" xmlns:r="http://schemas.openxmlformats.org/officeDocument/2006/relationships" xmlns:p="http://schemas.openxmlformats.org/presentationml/2006/main" show="0">
   <p:cSld>
     <p:spTree>
@@ -32350,7 +32260,7 @@
 </p:sld>
 </file>
 
-<file path=ppt/slides/slide56.xml><?xml version="1.0" encoding="utf-8"?>
+<file path=ppt/slides/slide55.xml><?xml version="1.0" encoding="utf-8"?>
 <p:sld xmlns:a="http://schemas.openxmlformats.org/drawingml/2006/main" xmlns:r="http://schemas.openxmlformats.org/officeDocument/2006/relationships" xmlns:p="http://schemas.openxmlformats.org/presentationml/2006/main">
   <p:cSld>
     <p:spTree>
@@ -32469,7 +32379,7 @@
 </p:sld>
 </file>
 
-<file path=ppt/slides/slide57.xml><?xml version="1.0" encoding="utf-8"?>
+<file path=ppt/slides/slide56.xml><?xml version="1.0" encoding="utf-8"?>
 <p:sld xmlns:a="http://schemas.openxmlformats.org/drawingml/2006/main" xmlns:r="http://schemas.openxmlformats.org/officeDocument/2006/relationships" xmlns:p="http://schemas.openxmlformats.org/presentationml/2006/main">
   <p:cSld>
     <p:spTree>
@@ -32799,7 +32709,7 @@
 </p:sld>
 </file>
 
-<file path=ppt/slides/slide58.xml><?xml version="1.0" encoding="utf-8"?>
+<file path=ppt/slides/slide57.xml><?xml version="1.0" encoding="utf-8"?>
 <p:sld xmlns:a="http://schemas.openxmlformats.org/drawingml/2006/main" xmlns:r="http://schemas.openxmlformats.org/officeDocument/2006/relationships" xmlns:p="http://schemas.openxmlformats.org/presentationml/2006/main">
   <p:cSld>
     <p:spTree>
@@ -33112,7 +33022,7 @@
 </p:sld>
 </file>
 
-<file path=ppt/slides/slide59.xml><?xml version="1.0" encoding="utf-8"?>
+<file path=ppt/slides/slide58.xml><?xml version="1.0" encoding="utf-8"?>
 <p:sld xmlns:a="http://schemas.openxmlformats.org/drawingml/2006/main" xmlns:r="http://schemas.openxmlformats.org/officeDocument/2006/relationships" xmlns:p="http://schemas.openxmlformats.org/presentationml/2006/main">
   <p:cSld>
     <p:spTree>
@@ -34708,12 +34618,72 @@
           <a:chExt cx="0" cy="0"/>
         </a:xfrm>
       </p:grpSpPr>
+      <p:pic>
+        <p:nvPicPr>
+          <p:cNvPr id="4" name="Picture 3">
+            <a:extLst>
+              <a:ext uri="{FF2B5EF4-FFF2-40B4-BE49-F238E27FC236}">
+                <a16:creationId xmlns:a16="http://schemas.microsoft.com/office/drawing/2014/main" id="{C863BE91-5FF5-441B-A87E-292D53ED2726}"/>
+              </a:ext>
+            </a:extLst>
+          </p:cNvPr>
+          <p:cNvPicPr>
+            <a:picLocks noChangeAspect="1"/>
+          </p:cNvPicPr>
+          <p:nvPr/>
+        </p:nvPicPr>
+        <p:blipFill>
+          <a:blip r:embed="rId2"/>
+          <a:stretch>
+            <a:fillRect/>
+          </a:stretch>
+        </p:blipFill>
+        <p:spPr>
+          <a:xfrm>
+            <a:off x="8627570" y="1804811"/>
+            <a:ext cx="3476625" cy="3524250"/>
+          </a:xfrm>
+          <a:prstGeom prst="rect">
+            <a:avLst/>
+          </a:prstGeom>
+        </p:spPr>
+      </p:pic>
+      <p:pic>
+        <p:nvPicPr>
+          <p:cNvPr id="9" name="Picture 8">
+            <a:extLst>
+              <a:ext uri="{FF2B5EF4-FFF2-40B4-BE49-F238E27FC236}">
+                <a16:creationId xmlns:a16="http://schemas.microsoft.com/office/drawing/2014/main" id="{242BD2B6-E894-43EA-A29E-AA7158A6440C}"/>
+              </a:ext>
+            </a:extLst>
+          </p:cNvPr>
+          <p:cNvPicPr>
+            <a:picLocks noChangeAspect="1"/>
+          </p:cNvPicPr>
+          <p:nvPr/>
+        </p:nvPicPr>
+        <p:blipFill>
+          <a:blip r:embed="rId3"/>
+          <a:stretch>
+            <a:fillRect/>
+          </a:stretch>
+        </p:blipFill>
+        <p:spPr>
+          <a:xfrm>
+            <a:off x="1167424" y="3071636"/>
+            <a:ext cx="5715000" cy="990600"/>
+          </a:xfrm>
+          <a:prstGeom prst="rect">
+            <a:avLst/>
+          </a:prstGeom>
+        </p:spPr>
+      </p:pic>
       <p:sp>
         <p:nvSpPr>
-          <p:cNvPr id="2" name="Title 1">
+          <p:cNvPr id="10" name="Title 9">
             <a:extLst>
               <a:ext uri="{FF2B5EF4-FFF2-40B4-BE49-F238E27FC236}">
-                <a16:creationId xmlns:a16="http://schemas.microsoft.com/office/drawing/2014/main" id="{D34D5E7A-2A79-420F-9CDA-DF2A39E979F6}"/>
+                <a16:creationId xmlns:a16="http://schemas.microsoft.com/office/drawing/2014/main" id="{DCA076EB-0851-4A9F-BE5F-6E3AD6EE62A3}"/>
               </a:ext>
             </a:extLst>
           </p:cNvPr>
@@ -34726,292 +34696,28 @@
         </p:nvSpPr>
         <p:spPr/>
         <p:txBody>
-          <a:bodyPr/>
+          <a:bodyPr>
+            <a:normAutofit/>
+          </a:bodyPr>
           <a:lstStyle/>
           <a:p>
             <a:r>
-              <a:rPr lang="en-US" sz="6000" dirty="0"/>
-              <a:t>SQLSaturday.com/694</a:t>
-            </a:r>
-            <a:endParaRPr lang="en-US" dirty="0"/>
+              <a:rPr lang="en-US" dirty="0"/>
+              <a:t>Community Ambassador</a:t>
+            </a:r>
           </a:p>
         </p:txBody>
       </p:sp>
-      <p:sp>
-        <p:nvSpPr>
-          <p:cNvPr id="4" name="Content Placeholder 3">
-            <a:extLst>
-              <a:ext uri="{FF2B5EF4-FFF2-40B4-BE49-F238E27FC236}">
-                <a16:creationId xmlns:a16="http://schemas.microsoft.com/office/drawing/2014/main" id="{4F57A0BC-A416-4D3A-A617-2D6BF544CAFF}"/>
-              </a:ext>
-            </a:extLst>
-          </p:cNvPr>
-          <p:cNvSpPr>
-            <a:spLocks noGrp="1"/>
-          </p:cNvSpPr>
-          <p:nvPr>
-            <p:ph sz="quarter" idx="13"/>
-          </p:nvPr>
-        </p:nvSpPr>
-        <p:spPr/>
-        <p:txBody>
-          <a:bodyPr>
-            <a:normAutofit fontScale="70000" lnSpcReduction="20000"/>
-          </a:bodyPr>
-          <a:lstStyle/>
-          <a:p>
-            <a:r>
-              <a:rPr lang="en-US" dirty="0"/>
-              <a:t>December 9</a:t>
-            </a:r>
-            <a:r>
-              <a:rPr lang="en-US" baseline="30000" dirty="0"/>
-              <a:t>th</a:t>
-            </a:r>
-            <a:endParaRPr lang="en-US" dirty="0"/>
-          </a:p>
-          <a:p>
-            <a:pPr lvl="1"/>
-            <a:r>
-              <a:rPr lang="en-US" dirty="0"/>
-              <a:t>Bryant College</a:t>
-            </a:r>
-          </a:p>
-          <a:p>
-            <a:pPr lvl="1"/>
-            <a:r>
-              <a:rPr lang="en-US" dirty="0"/>
-              <a:t>Smithfield, RI</a:t>
-            </a:r>
-          </a:p>
-          <a:p>
-            <a:endParaRPr lang="en-US" dirty="0"/>
-          </a:p>
-          <a:p>
-            <a:r>
-              <a:rPr lang="en-US" dirty="0"/>
-              <a:t>Full-day Pre-con Dec 8</a:t>
-            </a:r>
-          </a:p>
-          <a:p>
-            <a:pPr lvl="1"/>
-            <a:r>
-              <a:rPr lang="en-US" dirty="0"/>
-              <a:t>Data Science with R from A to Z</a:t>
-            </a:r>
-          </a:p>
-          <a:p>
-            <a:pPr lvl="1"/>
-            <a:r>
-              <a:rPr lang="en-US" strike="sngStrike" dirty="0"/>
-              <a:t>$150</a:t>
-            </a:r>
-          </a:p>
-          <a:p>
-            <a:pPr lvl="1"/>
-            <a:r>
-              <a:rPr lang="en-US" b="1" dirty="0"/>
-              <a:t>$120</a:t>
-            </a:r>
-            <a:r>
-              <a:rPr lang="en-US" dirty="0"/>
-              <a:t> with code </a:t>
-            </a:r>
-            <a:r>
-              <a:rPr lang="en-US" b="1" dirty="0">
-                <a:solidFill>
-                  <a:schemeClr val="accent1"/>
-                </a:solidFill>
-              </a:rPr>
-              <a:t>Microsoft</a:t>
-            </a:r>
-            <a:endParaRPr lang="en-US" dirty="0">
-              <a:solidFill>
-                <a:schemeClr val="accent1"/>
-              </a:solidFill>
-            </a:endParaRPr>
-          </a:p>
-          <a:p>
-            <a:pPr lvl="1"/>
-            <a:r>
-              <a:rPr lang="en-US" sz="3400" dirty="0"/>
-              <a:t>r_programming.Eventbrite.com</a:t>
-            </a:r>
-          </a:p>
-        </p:txBody>
-      </p:sp>
-      <p:pic>
-        <p:nvPicPr>
-          <p:cNvPr id="6" name="Content Placeholder 5">
-            <a:extLst>
-              <a:ext uri="{FF2B5EF4-FFF2-40B4-BE49-F238E27FC236}">
-                <a16:creationId xmlns:a16="http://schemas.microsoft.com/office/drawing/2014/main" id="{3677FE54-2149-40E2-9949-9D3B21CB10E0}"/>
-              </a:ext>
-            </a:extLst>
-          </p:cNvPr>
-          <p:cNvPicPr>
-            <a:picLocks noGrp="1" noChangeAspect="1"/>
-          </p:cNvPicPr>
-          <p:nvPr>
-            <p:ph sz="quarter" idx="14"/>
-          </p:nvPr>
-        </p:nvPicPr>
-        <p:blipFill>
-          <a:blip r:embed="rId2"/>
-          <a:stretch>
-            <a:fillRect/>
-          </a:stretch>
-        </p:blipFill>
-        <p:spPr>
-          <a:xfrm>
-            <a:off x="6871494" y="1746843"/>
-            <a:ext cx="4357688" cy="4357688"/>
-          </a:xfrm>
-          <a:prstGeom prst="rect">
-            <a:avLst/>
-          </a:prstGeom>
-        </p:spPr>
-      </p:pic>
     </p:spTree>
     <p:extLst>
       <p:ext uri="{BB962C8B-B14F-4D97-AF65-F5344CB8AC3E}">
-        <p14:creationId xmlns:p14="http://schemas.microsoft.com/office/powerpoint/2010/main" val="1514363372"/>
+        <p14:creationId xmlns:p14="http://schemas.microsoft.com/office/powerpoint/2010/main" val="3650232302"/>
       </p:ext>
     </p:extLst>
   </p:cSld>
   <p:clrMapOvr>
     <a:masterClrMapping/>
   </p:clrMapOvr>
-  <p:timing>
-    <p:tnLst>
-      <p:par>
-        <p:cTn id="1" dur="indefinite" restart="never" nodeType="tmRoot">
-          <p:childTnLst>
-            <p:seq concurrent="1" nextAc="seek">
-              <p:cTn id="2" dur="indefinite" nodeType="mainSeq">
-                <p:childTnLst>
-                  <p:par>
-                    <p:cTn id="3" fill="hold">
-                      <p:stCondLst>
-                        <p:cond delay="indefinite"/>
-                        <p:cond evt="onBegin" delay="0">
-                          <p:tn val="2"/>
-                        </p:cond>
-                      </p:stCondLst>
-                      <p:childTnLst>
-                        <p:par>
-                          <p:cTn id="4" fill="hold">
-                            <p:stCondLst>
-                              <p:cond delay="0"/>
-                            </p:stCondLst>
-                            <p:childTnLst>
-                              <p:par>
-                                <p:cTn id="5" presetID="10" presetClass="entr" presetSubtype="0" fill="hold" nodeType="afterEffect">
-                                  <p:stCondLst>
-                                    <p:cond delay="500"/>
-                                  </p:stCondLst>
-                                  <p:childTnLst>
-                                    <p:set>
-                                      <p:cBhvr>
-                                        <p:cTn id="6" dur="1" fill="hold">
-                                          <p:stCondLst>
-                                            <p:cond delay="0"/>
-                                          </p:stCondLst>
-                                        </p:cTn>
-                                        <p:tgtEl>
-                                          <p:spTgt spid="6"/>
-                                        </p:tgtEl>
-                                        <p:attrNameLst>
-                                          <p:attrName>style.visibility</p:attrName>
-                                        </p:attrNameLst>
-                                      </p:cBhvr>
-                                      <p:to>
-                                        <p:strVal val="visible"/>
-                                      </p:to>
-                                    </p:set>
-                                    <p:animEffect transition="in" filter="fade">
-                                      <p:cBhvr>
-                                        <p:cTn id="7" dur="500"/>
-                                        <p:tgtEl>
-                                          <p:spTgt spid="6"/>
-                                        </p:tgtEl>
-                                      </p:cBhvr>
-                                    </p:animEffect>
-                                  </p:childTnLst>
-                                </p:cTn>
-                              </p:par>
-                            </p:childTnLst>
-                          </p:cTn>
-                        </p:par>
-                        <p:par>
-                          <p:cTn id="8" fill="hold">
-                            <p:stCondLst>
-                              <p:cond delay="1000"/>
-                            </p:stCondLst>
-                            <p:childTnLst>
-                              <p:par>
-                                <p:cTn id="9" presetID="10" presetClass="exit" presetSubtype="0" fill="hold" nodeType="afterEffect">
-                                  <p:stCondLst>
-                                    <p:cond delay="0"/>
-                                  </p:stCondLst>
-                                  <p:childTnLst>
-                                    <p:animEffect transition="out" filter="fade">
-                                      <p:cBhvr>
-                                        <p:cTn id="10" dur="500"/>
-                                        <p:tgtEl>
-                                          <p:spTgt spid="6"/>
-                                        </p:tgtEl>
-                                      </p:cBhvr>
-                                    </p:animEffect>
-                                    <p:set>
-                                      <p:cBhvr>
-                                        <p:cTn id="11" dur="1" fill="hold">
-                                          <p:stCondLst>
-                                            <p:cond delay="499"/>
-                                          </p:stCondLst>
-                                        </p:cTn>
-                                        <p:tgtEl>
-                                          <p:spTgt spid="6"/>
-                                        </p:tgtEl>
-                                        <p:attrNameLst>
-                                          <p:attrName>style.visibility</p:attrName>
-                                        </p:attrNameLst>
-                                      </p:cBhvr>
-                                      <p:to>
-                                        <p:strVal val="hidden"/>
-                                      </p:to>
-                                    </p:set>
-                                  </p:childTnLst>
-                                </p:cTn>
-                              </p:par>
-                            </p:childTnLst>
-                          </p:cTn>
-                        </p:par>
-                      </p:childTnLst>
-                    </p:cTn>
-                  </p:par>
-                </p:childTnLst>
-              </p:cTn>
-              <p:prevCondLst>
-                <p:cond evt="onPrev" delay="0">
-                  <p:tgtEl>
-                    <p:sldTgt/>
-                  </p:tgtEl>
-                </p:cond>
-              </p:prevCondLst>
-              <p:nextCondLst>
-                <p:cond evt="onNext" delay="0">
-                  <p:tgtEl>
-                    <p:sldTgt/>
-                  </p:tgtEl>
-                </p:cond>
-              </p:nextCondLst>
-            </p:seq>
-          </p:childTnLst>
-        </p:cTn>
-      </p:par>
-    </p:tnLst>
-  </p:timing>
 </p:sld>
 </file>
 

</xml_diff>

<commit_message>
Update bio & headshots
</commit_message>
<xml_diff>
--- a/Demystifying-Data-Compression/Data_Compression.pptx
+++ b/Demystifying-Data-Compression/Data_Compression.pptx
@@ -9,8 +9,8 @@
   </p:notesMasterIdLst>
   <p:sldIdLst>
     <p:sldId id="348" r:id="rId2"/>
-    <p:sldId id="397" r:id="rId3"/>
-    <p:sldId id="399" r:id="rId4"/>
+    <p:sldId id="440" r:id="rId3"/>
+    <p:sldId id="441" r:id="rId4"/>
     <p:sldId id="345" r:id="rId5"/>
     <p:sldId id="344" r:id="rId6"/>
     <p:sldId id="343" r:id="rId7"/>
@@ -172,7 +172,7 @@
 <file path=ppt/revisionInfo.xml><?xml version="1.0" encoding="utf-8"?>
 <p1510:revInfo xmlns:a="http://schemas.openxmlformats.org/drawingml/2006/main" xmlns:r="http://schemas.openxmlformats.org/officeDocument/2006/relationships" xmlns:p1510="http://schemas.microsoft.com/office/powerpoint/2015/10/main">
   <p1510:revLst>
-    <p1510:client id="{BA7195E6-C228-48F5-9CD6-CAD008C1BD8D}" v="3" dt="2020-04-16T01:13:48.532"/>
+    <p1510:client id="{BA7195E6-C228-48F5-9CD6-CAD008C1BD8D}" v="7" dt="2020-04-16T01:17:54.670"/>
   </p1510:revLst>
 </p1510:revInfo>
 </file>
@@ -208,8 +208,8 @@
   </pc:docChgLst>
   <pc:docChgLst>
     <pc:chgData name="Andy Mallon" userId="8ed075f77b608d91" providerId="LiveId" clId="{BA7195E6-C228-48F5-9CD6-CAD008C1BD8D}"/>
-    <pc:docChg chg="modSld">
-      <pc:chgData name="Andy Mallon" userId="8ed075f77b608d91" providerId="LiveId" clId="{BA7195E6-C228-48F5-9CD6-CAD008C1BD8D}" dt="2020-04-16T01:13:48.532" v="2" actId="20577"/>
+    <pc:docChg chg="undo custSel delSld modSld">
+      <pc:chgData name="Andy Mallon" userId="8ed075f77b608d91" providerId="LiveId" clId="{BA7195E6-C228-48F5-9CD6-CAD008C1BD8D}" dt="2020-04-16T01:18:09.518" v="10" actId="14100"/>
       <pc:docMkLst>
         <pc:docMk/>
       </pc:docMkLst>
@@ -227,6 +227,59 @@
             <ac:spMk id="13" creationId="{00000000-0000-0000-0000-000000000000}"/>
           </ac:spMkLst>
         </pc:spChg>
+      </pc:sldChg>
+      <pc:sldChg chg="addSp delSp modSp">
+        <pc:chgData name="Andy Mallon" userId="8ed075f77b608d91" providerId="LiveId" clId="{BA7195E6-C228-48F5-9CD6-CAD008C1BD8D}" dt="2020-04-16T01:18:09.518" v="10" actId="14100"/>
+        <pc:sldMkLst>
+          <pc:docMk/>
+          <pc:sldMk cId="1240573574" sldId="348"/>
+        </pc:sldMkLst>
+        <pc:spChg chg="del">
+          <ac:chgData name="Andy Mallon" userId="8ed075f77b608d91" providerId="LiveId" clId="{BA7195E6-C228-48F5-9CD6-CAD008C1BD8D}" dt="2020-04-16T01:17:50.156" v="5" actId="478"/>
+          <ac:spMkLst>
+            <pc:docMk/>
+            <pc:sldMk cId="1240573574" sldId="348"/>
+            <ac:spMk id="3" creationId="{00000000-0000-0000-0000-000000000000}"/>
+          </ac:spMkLst>
+        </pc:spChg>
+        <pc:spChg chg="add del mod">
+          <ac:chgData name="Andy Mallon" userId="8ed075f77b608d91" providerId="LiveId" clId="{BA7195E6-C228-48F5-9CD6-CAD008C1BD8D}" dt="2020-04-16T01:17:54.670" v="8"/>
+          <ac:spMkLst>
+            <pc:docMk/>
+            <pc:sldMk cId="1240573574" sldId="348"/>
+            <ac:spMk id="5" creationId="{70E18BC4-8B4F-45D0-9B9D-13A996ACE287}"/>
+          </ac:spMkLst>
+        </pc:spChg>
+        <pc:spChg chg="add del">
+          <ac:chgData name="Andy Mallon" userId="8ed075f77b608d91" providerId="LiveId" clId="{BA7195E6-C228-48F5-9CD6-CAD008C1BD8D}" dt="2020-04-16T01:17:51.773" v="7"/>
+          <ac:spMkLst>
+            <pc:docMk/>
+            <pc:sldMk cId="1240573574" sldId="348"/>
+            <ac:spMk id="6" creationId="{D3A5A7EF-BB83-440A-A861-800D5001FABD}"/>
+          </ac:spMkLst>
+        </pc:spChg>
+        <pc:spChg chg="add mod">
+          <ac:chgData name="Andy Mallon" userId="8ed075f77b608d91" providerId="LiveId" clId="{BA7195E6-C228-48F5-9CD6-CAD008C1BD8D}" dt="2020-04-16T01:18:09.518" v="10" actId="14100"/>
+          <ac:spMkLst>
+            <pc:docMk/>
+            <pc:sldMk cId="1240573574" sldId="348"/>
+            <ac:spMk id="7" creationId="{E6CE65DE-DE93-4FE2-8B42-449D5CBBA716}"/>
+          </ac:spMkLst>
+        </pc:spChg>
+      </pc:sldChg>
+      <pc:sldChg chg="del">
+        <pc:chgData name="Andy Mallon" userId="8ed075f77b608d91" providerId="LiveId" clId="{BA7195E6-C228-48F5-9CD6-CAD008C1BD8D}" dt="2020-04-16T01:17:29.501" v="3" actId="2696"/>
+        <pc:sldMkLst>
+          <pc:docMk/>
+          <pc:sldMk cId="2367324778" sldId="397"/>
+        </pc:sldMkLst>
+      </pc:sldChg>
+      <pc:sldChg chg="del">
+        <pc:chgData name="Andy Mallon" userId="8ed075f77b608d91" providerId="LiveId" clId="{BA7195E6-C228-48F5-9CD6-CAD008C1BD8D}" dt="2020-04-16T01:17:29.554" v="4" actId="2696"/>
+        <pc:sldMkLst>
+          <pc:docMk/>
+          <pc:sldMk cId="1602673492" sldId="399"/>
+        </pc:sldMkLst>
       </pc:sldChg>
     </pc:docChg>
   </pc:docChgLst>
@@ -7526,30 +7579,6 @@
       </p:grpSpPr>
       <p:sp>
         <p:nvSpPr>
-          <p:cNvPr id="3" name="Subtitle 2"/>
-          <p:cNvSpPr>
-            <a:spLocks noGrp="1"/>
-          </p:cNvSpPr>
-          <p:nvPr>
-            <p:ph type="subTitle" idx="1"/>
-          </p:nvPr>
-        </p:nvSpPr>
-        <p:spPr/>
-        <p:txBody>
-          <a:bodyPr>
-            <a:normAutofit/>
-          </a:bodyPr>
-          <a:lstStyle/>
-          <a:p>
-            <a:r>
-              <a:rPr lang="en-US" sz="2800" dirty="0"/>
-              <a:t>Andy Mallon</a:t>
-            </a:r>
-          </a:p>
-        </p:txBody>
-      </p:sp>
-      <p:sp>
-        <p:nvSpPr>
           <p:cNvPr id="2" name="Title 1"/>
           <p:cNvSpPr>
             <a:spLocks noGrp="1"/>
@@ -7566,6 +7595,46 @@
             <a:r>
               <a:rPr lang="en-US" dirty="0"/>
               <a:t>Demystifying Data Compression</a:t>
+            </a:r>
+          </a:p>
+        </p:txBody>
+      </p:sp>
+      <p:sp>
+        <p:nvSpPr>
+          <p:cNvPr id="7" name="Subtitle 2">
+            <a:extLst>
+              <a:ext uri="{FF2B5EF4-FFF2-40B4-BE49-F238E27FC236}">
+                <a16:creationId xmlns:a16="http://schemas.microsoft.com/office/drawing/2014/main" id="{E6CE65DE-DE93-4FE2-8B42-449D5CBBA716}"/>
+              </a:ext>
+            </a:extLst>
+          </p:cNvPr>
+          <p:cNvSpPr>
+            <a:spLocks noGrp="1"/>
+          </p:cNvSpPr>
+          <p:nvPr>
+            <p:ph type="subTitle" idx="1"/>
+          </p:nvPr>
+        </p:nvSpPr>
+        <p:spPr>
+          <a:xfrm>
+            <a:off x="3149600" y="6049963"/>
+            <a:ext cx="8686800" cy="685800"/>
+          </a:xfrm>
+        </p:spPr>
+        <p:txBody>
+          <a:bodyPr>
+            <a:normAutofit/>
+          </a:bodyPr>
+          <a:lstStyle/>
+          <a:p>
+            <a:pPr>
+              <a:tabLst>
+                <a:tab pos="7315200" algn="l"/>
+              </a:tabLst>
+            </a:pPr>
+            <a:r>
+              <a:rPr lang="en-US" sz="2800" dirty="0"/>
+              <a:t>Andy Mallon	he/him</a:t>
             </a:r>
           </a:p>
         </p:txBody>
@@ -11163,13 +11232,13 @@
         </p:nvSpPr>
         <p:spPr>
           <a:xfrm>
-            <a:off x="816864" y="1803400"/>
-            <a:ext cx="10871200" cy="4460834"/>
+            <a:off x="816863" y="1803400"/>
+            <a:ext cx="11078151" cy="4460834"/>
           </a:xfrm>
         </p:spPr>
         <p:txBody>
           <a:bodyPr>
-            <a:normAutofit lnSpcReduction="10000"/>
+            <a:normAutofit fontScale="92500" lnSpcReduction="10000"/>
           </a:bodyPr>
           <a:lstStyle/>
           <a:p>
@@ -11182,7 +11251,7 @@
             <a:pPr lvl="1"/>
             <a:r>
               <a:rPr lang="en-US" dirty="0"/>
-              <a:t>Database Architect at Wayfair.com</a:t>
+              <a:t>Database Architect at Wayfair.com*</a:t>
             </a:r>
           </a:p>
           <a:p>
@@ -11210,15 +11279,77 @@
             </a:r>
           </a:p>
           <a:p>
+            <a:pPr marL="0" indent="0">
+              <a:buNone/>
+            </a:pPr>
+            <a:r>
+              <a:rPr lang="en-US" sz="1900" dirty="0"/>
+              <a:t>* The views &amp; opinions expressed in this presentation are mine alone and do </a:t>
+            </a:r>
+            <a:r>
+              <a:rPr lang="en-US" sz="1900"/>
+              <a:t>not reflect </a:t>
+            </a:r>
+            <a:r>
+              <a:rPr lang="en-US" sz="1900" dirty="0"/>
+              <a:t>the views of my employer.</a:t>
+            </a:r>
+          </a:p>
+          <a:p>
             <a:pPr lvl="1"/>
             <a:endParaRPr lang="en-US" dirty="0"/>
           </a:p>
         </p:txBody>
       </p:sp>
+      <p:pic>
+        <p:nvPicPr>
+          <p:cNvPr id="1026" name="Picture 2" descr="Related image">
+            <a:extLst>
+              <a:ext uri="{FF2B5EF4-FFF2-40B4-BE49-F238E27FC236}">
+                <a16:creationId xmlns:a16="http://schemas.microsoft.com/office/drawing/2014/main" id="{81AD33C5-0214-467D-8968-80C675072218}"/>
+              </a:ext>
+            </a:extLst>
+          </p:cNvPr>
+          <p:cNvPicPr>
+            <a:picLocks noChangeAspect="1" noChangeArrowheads="1"/>
+          </p:cNvPicPr>
+          <p:nvPr/>
+        </p:nvPicPr>
+        <p:blipFill rotWithShape="1">
+          <a:blip r:embed="rId3">
+            <a:extLst>
+              <a:ext uri="{28A0092B-C50C-407E-A947-70E740481C1C}">
+                <a14:useLocalDpi xmlns:a14="http://schemas.microsoft.com/office/drawing/2010/main" val="0"/>
+              </a:ext>
+            </a:extLst>
+          </a:blip>
+          <a:srcRect l="8126" t="23695" r="9261" b="25016"/>
+          <a:stretch/>
+        </p:blipFill>
+        <p:spPr bwMode="auto">
+          <a:xfrm>
+            <a:off x="8026400" y="1865923"/>
+            <a:ext cx="3985846" cy="1005281"/>
+          </a:xfrm>
+          <a:prstGeom prst="rect">
+            <a:avLst/>
+          </a:prstGeom>
+          <a:noFill/>
+          <a:extLst>
+            <a:ext uri="{909E8E84-426E-40DD-AFC4-6F175D3DCCD1}">
+              <a14:hiddenFill xmlns:a14="http://schemas.microsoft.com/office/drawing/2010/main">
+                <a:solidFill>
+                  <a:srgbClr val="FFFFFF"/>
+                </a:solidFill>
+              </a14:hiddenFill>
+            </a:ext>
+          </a:extLst>
+        </p:spPr>
+      </p:pic>
     </p:spTree>
     <p:extLst>
       <p:ext uri="{BB962C8B-B14F-4D97-AF65-F5344CB8AC3E}">
-        <p14:creationId xmlns:p14="http://schemas.microsoft.com/office/powerpoint/2010/main" val="2367324778"/>
+        <p14:creationId xmlns:p14="http://schemas.microsoft.com/office/powerpoint/2010/main" val="1633895870"/>
       </p:ext>
     </p:extLst>
   </p:cSld>
@@ -17155,119 +17286,25 @@
       </p:grpSpPr>
       <p:pic>
         <p:nvPicPr>
-          <p:cNvPr id="16" name="Picture 6" descr="https://igcdn-photos-f-a.akamaihd.net/hphotos-ak-xpa1/t51.2885-15/11189591_897526703601277_1624430821_n.jpg"/>
+          <p:cNvPr id="11" name="Picture 10"/>
           <p:cNvPicPr>
-            <a:picLocks noChangeAspect="1" noChangeArrowheads="1"/>
+            <a:picLocks noChangeAspect="1"/>
           </p:cNvPicPr>
           <p:nvPr/>
         </p:nvPicPr>
-        <p:blipFill rotWithShape="1">
-          <a:blip r:embed="rId3">
-            <a:extLst>
-              <a:ext uri="{28A0092B-C50C-407E-A947-70E740481C1C}">
-                <a14:useLocalDpi xmlns:a14="http://schemas.microsoft.com/office/drawing/2010/main" val="0"/>
-              </a:ext>
-            </a:extLst>
-          </a:blip>
-          <a:srcRect l="5147" t="5147" r="4329" b="4329"/>
+        <p:blipFill>
+          <a:blip r:embed="rId3"/>
+          <a:srcRect/>
           <a:stretch/>
         </p:blipFill>
-        <p:spPr bwMode="auto">
+        <p:spPr>
           <a:xfrm>
-            <a:off x="3814402" y="103291"/>
-            <a:ext cx="3277515" cy="3277515"/>
+            <a:off x="413777" y="172009"/>
+            <a:ext cx="4394812" cy="4394812"/>
           </a:xfrm>
           <a:prstGeom prst="rect">
             <a:avLst/>
           </a:prstGeom>
-          <a:noFill/>
-          <a:extLst>
-            <a:ext uri="{909E8E84-426E-40DD-AFC4-6F175D3DCCD1}">
-              <a14:hiddenFill xmlns:a14="http://schemas.microsoft.com/office/drawing/2010/main">
-                <a:solidFill>
-                  <a:srgbClr val="FFFFFF"/>
-                </a:solidFill>
-              </a14:hiddenFill>
-            </a:ext>
-          </a:extLst>
-        </p:spPr>
-      </p:pic>
-      <p:pic>
-        <p:nvPicPr>
-          <p:cNvPr id="18" name="Picture 14" descr="https://scontent-lga1-1.xx.fbcdn.net/hphotos-xap1/v/t1.0-9/s720x720/68136_10101720166808721_132590210251102469_n.jpg?oh=3e5a58671cb5fa2387b7adbd563b3dfc&amp;oe=564A0B1B"/>
-          <p:cNvPicPr>
-            <a:picLocks noChangeAspect="1" noChangeArrowheads="1"/>
-          </p:cNvPicPr>
-          <p:nvPr/>
-        </p:nvPicPr>
-        <p:blipFill rotWithShape="1">
-          <a:blip r:embed="rId4">
-            <a:extLst>
-              <a:ext uri="{28A0092B-C50C-407E-A947-70E740481C1C}">
-                <a14:useLocalDpi xmlns:a14="http://schemas.microsoft.com/office/drawing/2010/main" val="0"/>
-              </a:ext>
-            </a:extLst>
-          </a:blip>
-          <a:srcRect t="16054" b="17444"/>
-          <a:stretch/>
-        </p:blipFill>
-        <p:spPr bwMode="auto">
-          <a:xfrm>
-            <a:off x="413777" y="103291"/>
-            <a:ext cx="3281038" cy="3279769"/>
-          </a:xfrm>
-          <a:prstGeom prst="rect">
-            <a:avLst/>
-          </a:prstGeom>
-          <a:noFill/>
-          <a:extLst>
-            <a:ext uri="{909E8E84-426E-40DD-AFC4-6F175D3DCCD1}">
-              <a14:hiddenFill xmlns:a14="http://schemas.microsoft.com/office/drawing/2010/main">
-                <a:solidFill>
-                  <a:srgbClr val="FFFFFF"/>
-                </a:solidFill>
-              </a14:hiddenFill>
-            </a:ext>
-          </a:extLst>
-        </p:spPr>
-      </p:pic>
-      <p:pic>
-        <p:nvPicPr>
-          <p:cNvPr id="17" name="Picture 8" descr="https://igcdn-photos-d-a.akamaihd.net/hphotos-ak-xap1/t51.2885-15/11186841_793274697407251_668407686_n.jpg"/>
-          <p:cNvPicPr>
-            <a:picLocks noChangeAspect="1" noChangeArrowheads="1"/>
-          </p:cNvPicPr>
-          <p:nvPr/>
-        </p:nvPicPr>
-        <p:blipFill rotWithShape="1">
-          <a:blip r:embed="rId5">
-            <a:extLst>
-              <a:ext uri="{28A0092B-C50C-407E-A947-70E740481C1C}">
-                <a14:useLocalDpi xmlns:a14="http://schemas.microsoft.com/office/drawing/2010/main" val="0"/>
-              </a:ext>
-            </a:extLst>
-          </a:blip>
-          <a:srcRect l="4236" t="5599" r="5599" b="4236"/>
-          <a:stretch/>
-        </p:blipFill>
-        <p:spPr bwMode="auto">
-          <a:xfrm>
-            <a:off x="3816127" y="3472935"/>
-            <a:ext cx="3275790" cy="3275790"/>
-          </a:xfrm>
-          <a:prstGeom prst="rect">
-            <a:avLst/>
-          </a:prstGeom>
-          <a:noFill/>
-          <a:extLst>
-            <a:ext uri="{909E8E84-426E-40DD-AFC4-6F175D3DCCD1}">
-              <a14:hiddenFill xmlns:a14="http://schemas.microsoft.com/office/drawing/2010/main">
-                <a:solidFill>
-                  <a:srgbClr val="FFFFFF"/>
-                </a:solidFill>
-              </a14:hiddenFill>
-            </a:ext>
-          </a:extLst>
         </p:spPr>
       </p:pic>
       <p:pic>
@@ -17279,14 +17316,14 @@
           <p:nvPr/>
         </p:nvPicPr>
         <p:blipFill>
-          <a:blip r:embed="rId6"/>
+          <a:blip r:embed="rId4"/>
           <a:stretch>
             <a:fillRect/>
           </a:stretch>
         </p:blipFill>
         <p:spPr>
           <a:xfrm>
-            <a:off x="7358105" y="4821695"/>
+            <a:off x="400255" y="4890413"/>
             <a:ext cx="4421856" cy="1784051"/>
           </a:xfrm>
           <a:prstGeom prst="rect">
@@ -17294,69 +17331,177 @@
           </a:prstGeom>
         </p:spPr>
       </p:pic>
-      <p:pic>
-        <p:nvPicPr>
-          <p:cNvPr id="11" name="Picture 10"/>
-          <p:cNvPicPr>
-            <a:picLocks noChangeAspect="1"/>
-          </p:cNvPicPr>
-          <p:nvPr/>
-        </p:nvPicPr>
-        <p:blipFill>
-          <a:blip r:embed="rId7">
-            <a:extLst>
-              <a:ext uri="{28A0092B-C50C-407E-A947-70E740481C1C}">
-                <a14:useLocalDpi xmlns:a14="http://schemas.microsoft.com/office/drawing/2010/main" val="0"/>
-              </a:ext>
-            </a:extLst>
-          </a:blip>
-          <a:stretch>
-            <a:fillRect/>
-          </a:stretch>
-        </p:blipFill>
-        <p:spPr>
-          <a:xfrm>
-            <a:off x="7360359" y="103291"/>
-            <a:ext cx="4394812" cy="4394812"/>
-          </a:xfrm>
-          <a:prstGeom prst="rect">
-            <a:avLst/>
-          </a:prstGeom>
-        </p:spPr>
-      </p:pic>
-      <p:pic>
-        <p:nvPicPr>
-          <p:cNvPr id="9" name="Picture 8">
+      <p:grpSp>
+        <p:nvGrpSpPr>
+          <p:cNvPr id="2" name="Group 1">
             <a:extLst>
               <a:ext uri="{FF2B5EF4-FFF2-40B4-BE49-F238E27FC236}">
-                <a16:creationId xmlns:a16="http://schemas.microsoft.com/office/drawing/2014/main" id="{3DB53842-78CA-4F6E-A1F6-491D1C00734E}"/>
+                <a16:creationId xmlns:a16="http://schemas.microsoft.com/office/drawing/2014/main" id="{9F4DB41A-6EA6-4C14-AD51-A465DA07699D}"/>
               </a:ext>
             </a:extLst>
           </p:cNvPr>
-          <p:cNvPicPr>
-            <a:picLocks noChangeAspect="1"/>
-          </p:cNvPicPr>
+          <p:cNvGrpSpPr/>
           <p:nvPr/>
-        </p:nvPicPr>
-        <p:blipFill rotWithShape="1">
-          <a:blip r:embed="rId8"/>
-          <a:srcRect l="11277" r="7473"/>
-          <a:stretch/>
-        </p:blipFill>
-        <p:spPr>
+        </p:nvGrpSpPr>
+        <p:grpSpPr>
           <a:xfrm>
-            <a:off x="417799" y="3472935"/>
-            <a:ext cx="3275790" cy="3275790"/>
+            <a:off x="5100083" y="103291"/>
+            <a:ext cx="6678140" cy="6645434"/>
+            <a:chOff x="413777" y="103291"/>
+            <a:chExt cx="6678140" cy="6645434"/>
           </a:xfrm>
-          <a:prstGeom prst="rect">
-            <a:avLst/>
-          </a:prstGeom>
-        </p:spPr>
-      </p:pic>
+        </p:grpSpPr>
+        <p:pic>
+          <p:nvPicPr>
+            <p:cNvPr id="16" name="Picture 6" descr="https://igcdn-photos-f-a.akamaihd.net/hphotos-ak-xpa1/t51.2885-15/11189591_897526703601277_1624430821_n.jpg"/>
+            <p:cNvPicPr>
+              <a:picLocks noChangeAspect="1" noChangeArrowheads="1"/>
+            </p:cNvPicPr>
+            <p:nvPr/>
+          </p:nvPicPr>
+          <p:blipFill rotWithShape="1">
+            <a:blip r:embed="rId5">
+              <a:extLst>
+                <a:ext uri="{28A0092B-C50C-407E-A947-70E740481C1C}">
+                  <a14:useLocalDpi xmlns:a14="http://schemas.microsoft.com/office/drawing/2010/main" val="0"/>
+                </a:ext>
+              </a:extLst>
+            </a:blip>
+            <a:srcRect l="5147" t="5147" r="4329" b="4329"/>
+            <a:stretch/>
+          </p:blipFill>
+          <p:spPr bwMode="auto">
+            <a:xfrm>
+              <a:off x="3814402" y="103291"/>
+              <a:ext cx="3277515" cy="3277515"/>
+            </a:xfrm>
+            <a:prstGeom prst="rect">
+              <a:avLst/>
+            </a:prstGeom>
+            <a:noFill/>
+            <a:extLst>
+              <a:ext uri="{909E8E84-426E-40DD-AFC4-6F175D3DCCD1}">
+                <a14:hiddenFill xmlns:a14="http://schemas.microsoft.com/office/drawing/2010/main">
+                  <a:solidFill>
+                    <a:srgbClr val="FFFFFF"/>
+                  </a:solidFill>
+                </a14:hiddenFill>
+              </a:ext>
+            </a:extLst>
+          </p:spPr>
+        </p:pic>
+        <p:pic>
+          <p:nvPicPr>
+            <p:cNvPr id="18" name="Picture 14" descr="https://scontent-lga1-1.xx.fbcdn.net/hphotos-xap1/v/t1.0-9/s720x720/68136_10101720166808721_132590210251102469_n.jpg?oh=3e5a58671cb5fa2387b7adbd563b3dfc&amp;oe=564A0B1B"/>
+            <p:cNvPicPr>
+              <a:picLocks noChangeAspect="1" noChangeArrowheads="1"/>
+            </p:cNvPicPr>
+            <p:nvPr/>
+          </p:nvPicPr>
+          <p:blipFill rotWithShape="1">
+            <a:blip r:embed="rId6">
+              <a:extLst>
+                <a:ext uri="{28A0092B-C50C-407E-A947-70E740481C1C}">
+                  <a14:useLocalDpi xmlns:a14="http://schemas.microsoft.com/office/drawing/2010/main" val="0"/>
+                </a:ext>
+              </a:extLst>
+            </a:blip>
+            <a:srcRect t="16054" b="17444"/>
+            <a:stretch/>
+          </p:blipFill>
+          <p:spPr bwMode="auto">
+            <a:xfrm>
+              <a:off x="413777" y="103291"/>
+              <a:ext cx="3281038" cy="3279769"/>
+            </a:xfrm>
+            <a:prstGeom prst="rect">
+              <a:avLst/>
+            </a:prstGeom>
+            <a:noFill/>
+            <a:extLst>
+              <a:ext uri="{909E8E84-426E-40DD-AFC4-6F175D3DCCD1}">
+                <a14:hiddenFill xmlns:a14="http://schemas.microsoft.com/office/drawing/2010/main">
+                  <a:solidFill>
+                    <a:srgbClr val="FFFFFF"/>
+                  </a:solidFill>
+                </a14:hiddenFill>
+              </a:ext>
+            </a:extLst>
+          </p:spPr>
+        </p:pic>
+        <p:pic>
+          <p:nvPicPr>
+            <p:cNvPr id="17" name="Picture 8" descr="https://igcdn-photos-d-a.akamaihd.net/hphotos-ak-xap1/t51.2885-15/11186841_793274697407251_668407686_n.jpg"/>
+            <p:cNvPicPr>
+              <a:picLocks noChangeAspect="1" noChangeArrowheads="1"/>
+            </p:cNvPicPr>
+            <p:nvPr/>
+          </p:nvPicPr>
+          <p:blipFill rotWithShape="1">
+            <a:blip r:embed="rId7">
+              <a:extLst>
+                <a:ext uri="{28A0092B-C50C-407E-A947-70E740481C1C}">
+                  <a14:useLocalDpi xmlns:a14="http://schemas.microsoft.com/office/drawing/2010/main" val="0"/>
+                </a:ext>
+              </a:extLst>
+            </a:blip>
+            <a:srcRect l="4236" t="5599" r="5599" b="4236"/>
+            <a:stretch/>
+          </p:blipFill>
+          <p:spPr bwMode="auto">
+            <a:xfrm>
+              <a:off x="3816127" y="3472935"/>
+              <a:ext cx="3275790" cy="3275790"/>
+            </a:xfrm>
+            <a:prstGeom prst="rect">
+              <a:avLst/>
+            </a:prstGeom>
+            <a:noFill/>
+            <a:extLst>
+              <a:ext uri="{909E8E84-426E-40DD-AFC4-6F175D3DCCD1}">
+                <a14:hiddenFill xmlns:a14="http://schemas.microsoft.com/office/drawing/2010/main">
+                  <a:solidFill>
+                    <a:srgbClr val="FFFFFF"/>
+                  </a:solidFill>
+                </a14:hiddenFill>
+              </a:ext>
+            </a:extLst>
+          </p:spPr>
+        </p:pic>
+        <p:pic>
+          <p:nvPicPr>
+            <p:cNvPr id="9" name="Picture 8">
+              <a:extLst>
+                <a:ext uri="{FF2B5EF4-FFF2-40B4-BE49-F238E27FC236}">
+                  <a16:creationId xmlns:a16="http://schemas.microsoft.com/office/drawing/2014/main" id="{3DB53842-78CA-4F6E-A1F6-491D1C00734E}"/>
+                </a:ext>
+              </a:extLst>
+            </p:cNvPr>
+            <p:cNvPicPr>
+              <a:picLocks noChangeAspect="1"/>
+            </p:cNvPicPr>
+            <p:nvPr/>
+          </p:nvPicPr>
+          <p:blipFill rotWithShape="1">
+            <a:blip r:embed="rId8"/>
+            <a:srcRect l="11277" r="7473"/>
+            <a:stretch/>
+          </p:blipFill>
+          <p:spPr>
+            <a:xfrm>
+              <a:off x="417799" y="3472935"/>
+              <a:ext cx="3275790" cy="3275790"/>
+            </a:xfrm>
+            <a:prstGeom prst="rect">
+              <a:avLst/>
+            </a:prstGeom>
+          </p:spPr>
+        </p:pic>
+      </p:grpSp>
     </p:spTree>
     <p:extLst>
       <p:ext uri="{BB962C8B-B14F-4D97-AF65-F5344CB8AC3E}">
-        <p14:creationId xmlns:p14="http://schemas.microsoft.com/office/powerpoint/2010/main" val="1602673492"/>
+        <p14:creationId xmlns:p14="http://schemas.microsoft.com/office/powerpoint/2010/main" val="2678543267"/>
       </p:ext>
     </p:extLst>
   </p:cSld>

</xml_diff>